<commit_message>
Update compilation_flow, make PL and assembly common ancestors
</commit_message>
<xml_diff>
--- a/Figures/Figures.pptx
+++ b/Figures/Figures.pptx
@@ -5,7 +5,7 @@
     <p:sldMasterId id="2147483648" r:id="rId1"/>
   </p:sldMasterIdLst>
   <p:sldIdLst>
-    <p:sldId id="256" r:id="rId2"/>
+    <p:sldId id="258" r:id="rId2"/>
     <p:sldId id="257" r:id="rId3"/>
   </p:sldIdLst>
   <p:sldSz cx="12192000" cy="6858000"/>
@@ -105,6 +105,11 @@
       </a:defRPr>
     </a:lvl9pPr>
   </p:defaultTextStyle>
+  <p:extLst>
+    <p:ext uri="{EFAFB233-063F-42B5-8137-9DF3F51BA10A}">
+      <p15:sldGuideLst xmlns:p15="http://schemas.microsoft.com/office/powerpoint/2012/main"/>
+    </p:ext>
+  </p:extLst>
 </p:presentation>
 </file>
 
@@ -1602,49 +1607,758 @@
 </dgm:colorsDef>
 </file>
 
+<file path=ppt/diagrams/colors3.xml><?xml version="1.0" encoding="utf-8"?>
+<dgm:colorsDef xmlns:dgm="http://schemas.openxmlformats.org/drawingml/2006/diagram" xmlns:a="http://schemas.openxmlformats.org/drawingml/2006/main" uniqueId="urn:microsoft.com/office/officeart/2005/8/colors/accent1_2">
+  <dgm:title val=""/>
+  <dgm:desc val=""/>
+  <dgm:catLst>
+    <dgm:cat type="accent1" pri="11200"/>
+  </dgm:catLst>
+  <dgm:styleLbl name="node0">
+    <dgm:fillClrLst meth="repeat">
+      <a:schemeClr val="accent1"/>
+    </dgm:fillClrLst>
+    <dgm:linClrLst meth="repeat">
+      <a:schemeClr val="lt1"/>
+    </dgm:linClrLst>
+    <dgm:effectClrLst/>
+    <dgm:txLinClrLst/>
+    <dgm:txFillClrLst/>
+    <dgm:txEffectClrLst/>
+  </dgm:styleLbl>
+  <dgm:styleLbl name="alignNode1">
+    <dgm:fillClrLst meth="repeat">
+      <a:schemeClr val="accent1"/>
+    </dgm:fillClrLst>
+    <dgm:linClrLst meth="repeat">
+      <a:schemeClr val="accent1"/>
+    </dgm:linClrLst>
+    <dgm:effectClrLst/>
+    <dgm:txLinClrLst/>
+    <dgm:txFillClrLst/>
+    <dgm:txEffectClrLst/>
+  </dgm:styleLbl>
+  <dgm:styleLbl name="node1">
+    <dgm:fillClrLst meth="repeat">
+      <a:schemeClr val="accent1"/>
+    </dgm:fillClrLst>
+    <dgm:linClrLst meth="repeat">
+      <a:schemeClr val="lt1"/>
+    </dgm:linClrLst>
+    <dgm:effectClrLst/>
+    <dgm:txLinClrLst/>
+    <dgm:txFillClrLst/>
+    <dgm:txEffectClrLst/>
+  </dgm:styleLbl>
+  <dgm:styleLbl name="lnNode1">
+    <dgm:fillClrLst meth="repeat">
+      <a:schemeClr val="accent1"/>
+    </dgm:fillClrLst>
+    <dgm:linClrLst meth="repeat">
+      <a:schemeClr val="lt1"/>
+    </dgm:linClrLst>
+    <dgm:effectClrLst/>
+    <dgm:txLinClrLst/>
+    <dgm:txFillClrLst/>
+    <dgm:txEffectClrLst/>
+  </dgm:styleLbl>
+  <dgm:styleLbl name="vennNode1">
+    <dgm:fillClrLst meth="repeat">
+      <a:schemeClr val="accent1">
+        <a:alpha val="50000"/>
+      </a:schemeClr>
+    </dgm:fillClrLst>
+    <dgm:linClrLst meth="repeat">
+      <a:schemeClr val="lt1"/>
+    </dgm:linClrLst>
+    <dgm:effectClrLst/>
+    <dgm:txLinClrLst/>
+    <dgm:txFillClrLst/>
+    <dgm:txEffectClrLst/>
+  </dgm:styleLbl>
+  <dgm:styleLbl name="node2">
+    <dgm:fillClrLst meth="repeat">
+      <a:schemeClr val="accent1"/>
+    </dgm:fillClrLst>
+    <dgm:linClrLst meth="repeat">
+      <a:schemeClr val="lt1"/>
+    </dgm:linClrLst>
+    <dgm:effectClrLst/>
+    <dgm:txLinClrLst/>
+    <dgm:txFillClrLst/>
+    <dgm:txEffectClrLst/>
+  </dgm:styleLbl>
+  <dgm:styleLbl name="node3">
+    <dgm:fillClrLst meth="repeat">
+      <a:schemeClr val="accent1"/>
+    </dgm:fillClrLst>
+    <dgm:linClrLst meth="repeat">
+      <a:schemeClr val="lt1"/>
+    </dgm:linClrLst>
+    <dgm:effectClrLst/>
+    <dgm:txLinClrLst/>
+    <dgm:txFillClrLst/>
+    <dgm:txEffectClrLst/>
+  </dgm:styleLbl>
+  <dgm:styleLbl name="node4">
+    <dgm:fillClrLst meth="repeat">
+      <a:schemeClr val="accent1"/>
+    </dgm:fillClrLst>
+    <dgm:linClrLst meth="repeat">
+      <a:schemeClr val="lt1"/>
+    </dgm:linClrLst>
+    <dgm:effectClrLst/>
+    <dgm:txLinClrLst/>
+    <dgm:txFillClrLst/>
+    <dgm:txEffectClrLst/>
+  </dgm:styleLbl>
+  <dgm:styleLbl name="fgImgPlace1">
+    <dgm:fillClrLst meth="repeat">
+      <a:schemeClr val="accent1">
+        <a:tint val="50000"/>
+      </a:schemeClr>
+    </dgm:fillClrLst>
+    <dgm:linClrLst meth="repeat">
+      <a:schemeClr val="lt1"/>
+    </dgm:linClrLst>
+    <dgm:effectClrLst/>
+    <dgm:txLinClrLst/>
+    <dgm:txFillClrLst meth="repeat">
+      <a:schemeClr val="lt1"/>
+    </dgm:txFillClrLst>
+    <dgm:txEffectClrLst/>
+  </dgm:styleLbl>
+  <dgm:styleLbl name="alignImgPlace1">
+    <dgm:fillClrLst meth="repeat">
+      <a:schemeClr val="accent1">
+        <a:tint val="50000"/>
+      </a:schemeClr>
+    </dgm:fillClrLst>
+    <dgm:linClrLst meth="repeat">
+      <a:schemeClr val="lt1"/>
+    </dgm:linClrLst>
+    <dgm:effectClrLst/>
+    <dgm:txLinClrLst/>
+    <dgm:txFillClrLst meth="repeat">
+      <a:schemeClr val="lt1"/>
+    </dgm:txFillClrLst>
+    <dgm:txEffectClrLst/>
+  </dgm:styleLbl>
+  <dgm:styleLbl name="bgImgPlace1">
+    <dgm:fillClrLst meth="repeat">
+      <a:schemeClr val="accent1">
+        <a:tint val="50000"/>
+      </a:schemeClr>
+    </dgm:fillClrLst>
+    <dgm:linClrLst meth="repeat">
+      <a:schemeClr val="lt1"/>
+    </dgm:linClrLst>
+    <dgm:effectClrLst/>
+    <dgm:txLinClrLst/>
+    <dgm:txFillClrLst meth="repeat">
+      <a:schemeClr val="lt1"/>
+    </dgm:txFillClrLst>
+    <dgm:txEffectClrLst/>
+  </dgm:styleLbl>
+  <dgm:styleLbl name="sibTrans2D1">
+    <dgm:fillClrLst meth="repeat">
+      <a:schemeClr val="accent1">
+        <a:tint val="60000"/>
+      </a:schemeClr>
+    </dgm:fillClrLst>
+    <dgm:linClrLst meth="repeat">
+      <a:schemeClr val="accent1">
+        <a:tint val="60000"/>
+      </a:schemeClr>
+    </dgm:linClrLst>
+    <dgm:effectClrLst/>
+    <dgm:txLinClrLst/>
+    <dgm:txFillClrLst/>
+    <dgm:txEffectClrLst/>
+  </dgm:styleLbl>
+  <dgm:styleLbl name="fgSibTrans2D1">
+    <dgm:fillClrLst meth="repeat">
+      <a:schemeClr val="accent1">
+        <a:tint val="60000"/>
+      </a:schemeClr>
+    </dgm:fillClrLst>
+    <dgm:linClrLst meth="repeat">
+      <a:schemeClr val="accent1">
+        <a:tint val="60000"/>
+      </a:schemeClr>
+    </dgm:linClrLst>
+    <dgm:effectClrLst/>
+    <dgm:txLinClrLst/>
+    <dgm:txFillClrLst/>
+    <dgm:txEffectClrLst/>
+  </dgm:styleLbl>
+  <dgm:styleLbl name="bgSibTrans2D1">
+    <dgm:fillClrLst meth="repeat">
+      <a:schemeClr val="accent1">
+        <a:tint val="60000"/>
+      </a:schemeClr>
+    </dgm:fillClrLst>
+    <dgm:linClrLst meth="repeat">
+      <a:schemeClr val="accent1">
+        <a:tint val="60000"/>
+      </a:schemeClr>
+    </dgm:linClrLst>
+    <dgm:effectClrLst/>
+    <dgm:txLinClrLst/>
+    <dgm:txFillClrLst/>
+    <dgm:txEffectClrLst/>
+  </dgm:styleLbl>
+  <dgm:styleLbl name="sibTrans1D1">
+    <dgm:fillClrLst meth="repeat">
+      <a:schemeClr val="accent1"/>
+    </dgm:fillClrLst>
+    <dgm:linClrLst meth="repeat">
+      <a:schemeClr val="accent1"/>
+    </dgm:linClrLst>
+    <dgm:effectClrLst/>
+    <dgm:txLinClrLst/>
+    <dgm:txFillClrLst meth="repeat">
+      <a:schemeClr val="tx1"/>
+    </dgm:txFillClrLst>
+    <dgm:txEffectClrLst/>
+  </dgm:styleLbl>
+  <dgm:styleLbl name="callout">
+    <dgm:fillClrLst meth="repeat">
+      <a:schemeClr val="accent1"/>
+    </dgm:fillClrLst>
+    <dgm:linClrLst meth="repeat">
+      <a:schemeClr val="accent1">
+        <a:tint val="50000"/>
+      </a:schemeClr>
+    </dgm:linClrLst>
+    <dgm:effectClrLst/>
+    <dgm:txLinClrLst/>
+    <dgm:txFillClrLst meth="repeat">
+      <a:schemeClr val="tx1"/>
+    </dgm:txFillClrLst>
+    <dgm:txEffectClrLst/>
+  </dgm:styleLbl>
+  <dgm:styleLbl name="asst0">
+    <dgm:fillClrLst meth="repeat">
+      <a:schemeClr val="accent1"/>
+    </dgm:fillClrLst>
+    <dgm:linClrLst meth="repeat">
+      <a:schemeClr val="lt1"/>
+    </dgm:linClrLst>
+    <dgm:effectClrLst/>
+    <dgm:txLinClrLst/>
+    <dgm:txFillClrLst/>
+    <dgm:txEffectClrLst/>
+  </dgm:styleLbl>
+  <dgm:styleLbl name="asst1">
+    <dgm:fillClrLst meth="repeat">
+      <a:schemeClr val="accent1"/>
+    </dgm:fillClrLst>
+    <dgm:linClrLst meth="repeat">
+      <a:schemeClr val="lt1"/>
+    </dgm:linClrLst>
+    <dgm:effectClrLst/>
+    <dgm:txLinClrLst/>
+    <dgm:txFillClrLst/>
+    <dgm:txEffectClrLst/>
+  </dgm:styleLbl>
+  <dgm:styleLbl name="asst2">
+    <dgm:fillClrLst meth="repeat">
+      <a:schemeClr val="accent1"/>
+    </dgm:fillClrLst>
+    <dgm:linClrLst meth="repeat">
+      <a:schemeClr val="lt1"/>
+    </dgm:linClrLst>
+    <dgm:effectClrLst/>
+    <dgm:txLinClrLst/>
+    <dgm:txFillClrLst/>
+    <dgm:txEffectClrLst/>
+  </dgm:styleLbl>
+  <dgm:styleLbl name="asst3">
+    <dgm:fillClrLst meth="repeat">
+      <a:schemeClr val="accent1"/>
+    </dgm:fillClrLst>
+    <dgm:linClrLst meth="repeat">
+      <a:schemeClr val="lt1"/>
+    </dgm:linClrLst>
+    <dgm:effectClrLst/>
+    <dgm:txLinClrLst/>
+    <dgm:txFillClrLst/>
+    <dgm:txEffectClrLst/>
+  </dgm:styleLbl>
+  <dgm:styleLbl name="asst4">
+    <dgm:fillClrLst meth="repeat">
+      <a:schemeClr val="accent1"/>
+    </dgm:fillClrLst>
+    <dgm:linClrLst meth="repeat">
+      <a:schemeClr val="lt1"/>
+    </dgm:linClrLst>
+    <dgm:effectClrLst/>
+    <dgm:txLinClrLst/>
+    <dgm:txFillClrLst/>
+    <dgm:txEffectClrLst/>
+  </dgm:styleLbl>
+  <dgm:styleLbl name="parChTrans2D1">
+    <dgm:fillClrLst meth="repeat">
+      <a:schemeClr val="accent1">
+        <a:tint val="60000"/>
+      </a:schemeClr>
+    </dgm:fillClrLst>
+    <dgm:linClrLst meth="repeat">
+      <a:schemeClr val="accent1">
+        <a:tint val="60000"/>
+      </a:schemeClr>
+    </dgm:linClrLst>
+    <dgm:effectClrLst/>
+    <dgm:txLinClrLst/>
+    <dgm:txFillClrLst meth="repeat">
+      <a:schemeClr val="lt1"/>
+    </dgm:txFillClrLst>
+    <dgm:txEffectClrLst/>
+  </dgm:styleLbl>
+  <dgm:styleLbl name="parChTrans2D2">
+    <dgm:fillClrLst meth="repeat">
+      <a:schemeClr val="accent1"/>
+    </dgm:fillClrLst>
+    <dgm:linClrLst meth="repeat">
+      <a:schemeClr val="accent1"/>
+    </dgm:linClrLst>
+    <dgm:effectClrLst/>
+    <dgm:txLinClrLst/>
+    <dgm:txFillClrLst meth="repeat">
+      <a:schemeClr val="lt1"/>
+    </dgm:txFillClrLst>
+    <dgm:txEffectClrLst/>
+  </dgm:styleLbl>
+  <dgm:styleLbl name="parChTrans2D3">
+    <dgm:fillClrLst meth="repeat">
+      <a:schemeClr val="accent1"/>
+    </dgm:fillClrLst>
+    <dgm:linClrLst meth="repeat">
+      <a:schemeClr val="accent1"/>
+    </dgm:linClrLst>
+    <dgm:effectClrLst/>
+    <dgm:txLinClrLst/>
+    <dgm:txFillClrLst meth="repeat">
+      <a:schemeClr val="lt1"/>
+    </dgm:txFillClrLst>
+    <dgm:txEffectClrLst/>
+  </dgm:styleLbl>
+  <dgm:styleLbl name="parChTrans2D4">
+    <dgm:fillClrLst meth="repeat">
+      <a:schemeClr val="accent1"/>
+    </dgm:fillClrLst>
+    <dgm:linClrLst meth="repeat">
+      <a:schemeClr val="accent1"/>
+    </dgm:linClrLst>
+    <dgm:effectClrLst/>
+    <dgm:txLinClrLst/>
+    <dgm:txFillClrLst meth="repeat">
+      <a:schemeClr val="lt1"/>
+    </dgm:txFillClrLst>
+    <dgm:txEffectClrLst/>
+  </dgm:styleLbl>
+  <dgm:styleLbl name="parChTrans1D1">
+    <dgm:fillClrLst meth="repeat">
+      <a:schemeClr val="accent1"/>
+    </dgm:fillClrLst>
+    <dgm:linClrLst meth="repeat">
+      <a:schemeClr val="accent1">
+        <a:shade val="60000"/>
+      </a:schemeClr>
+    </dgm:linClrLst>
+    <dgm:effectClrLst/>
+    <dgm:txLinClrLst/>
+    <dgm:txFillClrLst meth="repeat">
+      <a:schemeClr val="tx1"/>
+    </dgm:txFillClrLst>
+    <dgm:txEffectClrLst/>
+  </dgm:styleLbl>
+  <dgm:styleLbl name="parChTrans1D2">
+    <dgm:fillClrLst meth="repeat">
+      <a:schemeClr val="accent1"/>
+    </dgm:fillClrLst>
+    <dgm:linClrLst meth="repeat">
+      <a:schemeClr val="accent1">
+        <a:shade val="60000"/>
+      </a:schemeClr>
+    </dgm:linClrLst>
+    <dgm:effectClrLst/>
+    <dgm:txLinClrLst/>
+    <dgm:txFillClrLst meth="repeat">
+      <a:schemeClr val="tx1"/>
+    </dgm:txFillClrLst>
+    <dgm:txEffectClrLst/>
+  </dgm:styleLbl>
+  <dgm:styleLbl name="parChTrans1D3">
+    <dgm:fillClrLst meth="repeat">
+      <a:schemeClr val="accent1"/>
+    </dgm:fillClrLst>
+    <dgm:linClrLst meth="repeat">
+      <a:schemeClr val="accent1">
+        <a:shade val="80000"/>
+      </a:schemeClr>
+    </dgm:linClrLst>
+    <dgm:effectClrLst/>
+    <dgm:txLinClrLst/>
+    <dgm:txFillClrLst meth="repeat">
+      <a:schemeClr val="tx1"/>
+    </dgm:txFillClrLst>
+    <dgm:txEffectClrLst/>
+  </dgm:styleLbl>
+  <dgm:styleLbl name="parChTrans1D4">
+    <dgm:fillClrLst meth="repeat">
+      <a:schemeClr val="accent1"/>
+    </dgm:fillClrLst>
+    <dgm:linClrLst meth="repeat">
+      <a:schemeClr val="accent1">
+        <a:shade val="80000"/>
+      </a:schemeClr>
+    </dgm:linClrLst>
+    <dgm:effectClrLst/>
+    <dgm:txLinClrLst/>
+    <dgm:txFillClrLst meth="repeat">
+      <a:schemeClr val="tx1"/>
+    </dgm:txFillClrLst>
+    <dgm:txEffectClrLst/>
+  </dgm:styleLbl>
+  <dgm:styleLbl name="fgAcc1">
+    <dgm:fillClrLst meth="repeat">
+      <a:schemeClr val="lt1">
+        <a:alpha val="90000"/>
+      </a:schemeClr>
+    </dgm:fillClrLst>
+    <dgm:linClrLst meth="repeat">
+      <a:schemeClr val="accent1"/>
+    </dgm:linClrLst>
+    <dgm:effectClrLst/>
+    <dgm:txLinClrLst/>
+    <dgm:txFillClrLst meth="repeat">
+      <a:schemeClr val="dk1"/>
+    </dgm:txFillClrLst>
+    <dgm:txEffectClrLst/>
+  </dgm:styleLbl>
+  <dgm:styleLbl name="conFgAcc1">
+    <dgm:fillClrLst meth="repeat">
+      <a:schemeClr val="lt1">
+        <a:alpha val="90000"/>
+      </a:schemeClr>
+    </dgm:fillClrLst>
+    <dgm:linClrLst meth="repeat">
+      <a:schemeClr val="accent1"/>
+    </dgm:linClrLst>
+    <dgm:effectClrLst/>
+    <dgm:txLinClrLst/>
+    <dgm:txFillClrLst meth="repeat">
+      <a:schemeClr val="dk1"/>
+    </dgm:txFillClrLst>
+    <dgm:txEffectClrLst/>
+  </dgm:styleLbl>
+  <dgm:styleLbl name="alignAcc1">
+    <dgm:fillClrLst meth="repeat">
+      <a:schemeClr val="lt1">
+        <a:alpha val="90000"/>
+      </a:schemeClr>
+    </dgm:fillClrLst>
+    <dgm:linClrLst meth="repeat">
+      <a:schemeClr val="accent1"/>
+    </dgm:linClrLst>
+    <dgm:effectClrLst/>
+    <dgm:txLinClrLst/>
+    <dgm:txFillClrLst meth="repeat">
+      <a:schemeClr val="dk1"/>
+    </dgm:txFillClrLst>
+    <dgm:txEffectClrLst/>
+  </dgm:styleLbl>
+  <dgm:styleLbl name="trAlignAcc1">
+    <dgm:fillClrLst meth="repeat">
+      <a:schemeClr val="lt1">
+        <a:alpha val="40000"/>
+      </a:schemeClr>
+    </dgm:fillClrLst>
+    <dgm:linClrLst meth="repeat">
+      <a:schemeClr val="accent1"/>
+    </dgm:linClrLst>
+    <dgm:effectClrLst/>
+    <dgm:txLinClrLst/>
+    <dgm:txFillClrLst meth="repeat">
+      <a:schemeClr val="dk1"/>
+    </dgm:txFillClrLst>
+    <dgm:txEffectClrLst/>
+  </dgm:styleLbl>
+  <dgm:styleLbl name="bgAcc1">
+    <dgm:fillClrLst meth="repeat">
+      <a:schemeClr val="lt1">
+        <a:alpha val="90000"/>
+      </a:schemeClr>
+    </dgm:fillClrLst>
+    <dgm:linClrLst meth="repeat">
+      <a:schemeClr val="accent1"/>
+    </dgm:linClrLst>
+    <dgm:effectClrLst/>
+    <dgm:txLinClrLst/>
+    <dgm:txFillClrLst meth="repeat">
+      <a:schemeClr val="dk1"/>
+    </dgm:txFillClrLst>
+    <dgm:txEffectClrLst/>
+  </dgm:styleLbl>
+  <dgm:styleLbl name="solidFgAcc1">
+    <dgm:fillClrLst meth="repeat">
+      <a:schemeClr val="lt1"/>
+    </dgm:fillClrLst>
+    <dgm:linClrLst meth="repeat">
+      <a:schemeClr val="accent1"/>
+    </dgm:linClrLst>
+    <dgm:effectClrLst/>
+    <dgm:txLinClrLst/>
+    <dgm:txFillClrLst meth="repeat">
+      <a:schemeClr val="dk1"/>
+    </dgm:txFillClrLst>
+    <dgm:txEffectClrLst/>
+  </dgm:styleLbl>
+  <dgm:styleLbl name="solidAlignAcc1">
+    <dgm:fillClrLst meth="repeat">
+      <a:schemeClr val="lt1"/>
+    </dgm:fillClrLst>
+    <dgm:linClrLst meth="repeat">
+      <a:schemeClr val="accent1"/>
+    </dgm:linClrLst>
+    <dgm:effectClrLst/>
+    <dgm:txLinClrLst/>
+    <dgm:txFillClrLst meth="repeat">
+      <a:schemeClr val="dk1"/>
+    </dgm:txFillClrLst>
+    <dgm:txEffectClrLst/>
+  </dgm:styleLbl>
+  <dgm:styleLbl name="solidBgAcc1">
+    <dgm:fillClrLst meth="repeat">
+      <a:schemeClr val="lt1"/>
+    </dgm:fillClrLst>
+    <dgm:linClrLst meth="repeat">
+      <a:schemeClr val="accent1"/>
+    </dgm:linClrLst>
+    <dgm:effectClrLst/>
+    <dgm:txLinClrLst/>
+    <dgm:txFillClrLst meth="repeat">
+      <a:schemeClr val="dk1"/>
+    </dgm:txFillClrLst>
+    <dgm:txEffectClrLst/>
+  </dgm:styleLbl>
+  <dgm:styleLbl name="fgAccFollowNode1">
+    <dgm:fillClrLst meth="repeat">
+      <a:schemeClr val="accent1">
+        <a:alpha val="90000"/>
+        <a:tint val="40000"/>
+      </a:schemeClr>
+    </dgm:fillClrLst>
+    <dgm:linClrLst meth="repeat">
+      <a:schemeClr val="accent1">
+        <a:alpha val="90000"/>
+        <a:tint val="40000"/>
+      </a:schemeClr>
+    </dgm:linClrLst>
+    <dgm:effectClrLst/>
+    <dgm:txLinClrLst/>
+    <dgm:txFillClrLst meth="repeat">
+      <a:schemeClr val="dk1"/>
+    </dgm:txFillClrLst>
+    <dgm:txEffectClrLst/>
+  </dgm:styleLbl>
+  <dgm:styleLbl name="alignAccFollowNode1">
+    <dgm:fillClrLst meth="repeat">
+      <a:schemeClr val="accent1">
+        <a:alpha val="90000"/>
+        <a:tint val="40000"/>
+      </a:schemeClr>
+    </dgm:fillClrLst>
+    <dgm:linClrLst meth="repeat">
+      <a:schemeClr val="accent1">
+        <a:alpha val="90000"/>
+        <a:tint val="40000"/>
+      </a:schemeClr>
+    </dgm:linClrLst>
+    <dgm:effectClrLst/>
+    <dgm:txLinClrLst/>
+    <dgm:txFillClrLst meth="repeat">
+      <a:schemeClr val="dk1"/>
+    </dgm:txFillClrLst>
+    <dgm:txEffectClrLst/>
+  </dgm:styleLbl>
+  <dgm:styleLbl name="bgAccFollowNode1">
+    <dgm:fillClrLst meth="repeat">
+      <a:schemeClr val="accent1">
+        <a:alpha val="90000"/>
+        <a:tint val="40000"/>
+      </a:schemeClr>
+    </dgm:fillClrLst>
+    <dgm:linClrLst meth="repeat">
+      <a:schemeClr val="accent1">
+        <a:alpha val="90000"/>
+        <a:tint val="40000"/>
+      </a:schemeClr>
+    </dgm:linClrLst>
+    <dgm:effectClrLst/>
+    <dgm:txLinClrLst/>
+    <dgm:txFillClrLst meth="repeat">
+      <a:schemeClr val="dk1"/>
+    </dgm:txFillClrLst>
+    <dgm:txEffectClrLst/>
+  </dgm:styleLbl>
+  <dgm:styleLbl name="fgAcc0">
+    <dgm:fillClrLst meth="repeat">
+      <a:schemeClr val="lt1">
+        <a:alpha val="90000"/>
+      </a:schemeClr>
+    </dgm:fillClrLst>
+    <dgm:linClrLst meth="repeat">
+      <a:schemeClr val="accent1"/>
+    </dgm:linClrLst>
+    <dgm:effectClrLst/>
+    <dgm:txLinClrLst/>
+    <dgm:txFillClrLst meth="repeat">
+      <a:schemeClr val="dk1"/>
+    </dgm:txFillClrLst>
+    <dgm:txEffectClrLst/>
+  </dgm:styleLbl>
+  <dgm:styleLbl name="fgAcc2">
+    <dgm:fillClrLst meth="repeat">
+      <a:schemeClr val="lt1">
+        <a:alpha val="90000"/>
+      </a:schemeClr>
+    </dgm:fillClrLst>
+    <dgm:linClrLst meth="repeat">
+      <a:schemeClr val="accent1"/>
+    </dgm:linClrLst>
+    <dgm:effectClrLst/>
+    <dgm:txLinClrLst/>
+    <dgm:txFillClrLst meth="repeat">
+      <a:schemeClr val="dk1"/>
+    </dgm:txFillClrLst>
+    <dgm:txEffectClrLst/>
+  </dgm:styleLbl>
+  <dgm:styleLbl name="fgAcc3">
+    <dgm:fillClrLst meth="repeat">
+      <a:schemeClr val="lt1">
+        <a:alpha val="90000"/>
+      </a:schemeClr>
+    </dgm:fillClrLst>
+    <dgm:linClrLst meth="repeat">
+      <a:schemeClr val="accent1"/>
+    </dgm:linClrLst>
+    <dgm:effectClrLst/>
+    <dgm:txLinClrLst/>
+    <dgm:txFillClrLst meth="repeat">
+      <a:schemeClr val="dk1"/>
+    </dgm:txFillClrLst>
+    <dgm:txEffectClrLst/>
+  </dgm:styleLbl>
+  <dgm:styleLbl name="fgAcc4">
+    <dgm:fillClrLst meth="repeat">
+      <a:schemeClr val="lt1">
+        <a:alpha val="90000"/>
+      </a:schemeClr>
+    </dgm:fillClrLst>
+    <dgm:linClrLst meth="repeat">
+      <a:schemeClr val="accent1"/>
+    </dgm:linClrLst>
+    <dgm:effectClrLst/>
+    <dgm:txLinClrLst/>
+    <dgm:txFillClrLst meth="repeat">
+      <a:schemeClr val="dk1"/>
+    </dgm:txFillClrLst>
+    <dgm:txEffectClrLst/>
+  </dgm:styleLbl>
+  <dgm:styleLbl name="bgShp">
+    <dgm:fillClrLst meth="repeat">
+      <a:schemeClr val="accent1">
+        <a:tint val="40000"/>
+      </a:schemeClr>
+    </dgm:fillClrLst>
+    <dgm:linClrLst meth="repeat">
+      <a:schemeClr val="accent1"/>
+    </dgm:linClrLst>
+    <dgm:effectClrLst/>
+    <dgm:txLinClrLst/>
+    <dgm:txFillClrLst meth="repeat">
+      <a:schemeClr val="dk1"/>
+    </dgm:txFillClrLst>
+    <dgm:txEffectClrLst/>
+  </dgm:styleLbl>
+  <dgm:styleLbl name="dkBgShp">
+    <dgm:fillClrLst meth="repeat">
+      <a:schemeClr val="accent1">
+        <a:shade val="80000"/>
+      </a:schemeClr>
+    </dgm:fillClrLst>
+    <dgm:linClrLst meth="repeat">
+      <a:schemeClr val="accent1"/>
+    </dgm:linClrLst>
+    <dgm:effectClrLst/>
+    <dgm:txLinClrLst/>
+    <dgm:txFillClrLst meth="repeat">
+      <a:schemeClr val="lt1"/>
+    </dgm:txFillClrLst>
+    <dgm:txEffectClrLst/>
+  </dgm:styleLbl>
+  <dgm:styleLbl name="trBgShp">
+    <dgm:fillClrLst meth="repeat">
+      <a:schemeClr val="accent1">
+        <a:tint val="50000"/>
+        <a:alpha val="40000"/>
+      </a:schemeClr>
+    </dgm:fillClrLst>
+    <dgm:linClrLst meth="repeat">
+      <a:schemeClr val="accent1"/>
+    </dgm:linClrLst>
+    <dgm:effectClrLst/>
+    <dgm:txLinClrLst/>
+    <dgm:txFillClrLst meth="repeat">
+      <a:schemeClr val="lt1"/>
+    </dgm:txFillClrLst>
+    <dgm:txEffectClrLst/>
+  </dgm:styleLbl>
+  <dgm:styleLbl name="fgShp">
+    <dgm:fillClrLst meth="repeat">
+      <a:schemeClr val="accent1">
+        <a:tint val="60000"/>
+      </a:schemeClr>
+    </dgm:fillClrLst>
+    <dgm:linClrLst meth="repeat">
+      <a:schemeClr val="lt1"/>
+    </dgm:linClrLst>
+    <dgm:effectClrLst/>
+    <dgm:txLinClrLst/>
+    <dgm:txFillClrLst meth="repeat">
+      <a:schemeClr val="dk1"/>
+    </dgm:txFillClrLst>
+    <dgm:txEffectClrLst/>
+  </dgm:styleLbl>
+  <dgm:styleLbl name="revTx">
+    <dgm:fillClrLst meth="repeat">
+      <a:schemeClr val="lt1">
+        <a:alpha val="0"/>
+      </a:schemeClr>
+    </dgm:fillClrLst>
+    <dgm:linClrLst meth="repeat">
+      <a:schemeClr val="dk1">
+        <a:alpha val="0"/>
+      </a:schemeClr>
+    </dgm:linClrLst>
+    <dgm:effectClrLst/>
+    <dgm:txLinClrLst/>
+    <dgm:txFillClrLst meth="repeat">
+      <a:schemeClr val="tx1"/>
+    </dgm:txFillClrLst>
+    <dgm:txEffectClrLst/>
+  </dgm:styleLbl>
+</dgm:colorsDef>
+</file>
+
 <file path=ppt/diagrams/data1.xml><?xml version="1.0" encoding="utf-8"?>
 <dgm:dataModel xmlns:dgm="http://schemas.openxmlformats.org/drawingml/2006/diagram" xmlns:a="http://schemas.openxmlformats.org/drawingml/2006/main">
   <dgm:ptLst>
     <dgm:pt modelId="{273B9DA9-DB4F-1143-B310-F2729709A260}" type="doc">
       <dgm:prSet loTypeId="urn:microsoft.com/office/officeart/2005/8/layout/chevron2" loCatId="" qsTypeId="urn:microsoft.com/office/officeart/2005/8/quickstyle/simple1" qsCatId="simple" csTypeId="urn:microsoft.com/office/officeart/2005/8/colors/accent1_2" csCatId="accent1" phldr="1"/>
-      <dgm:spPr/>
-      <dgm:t>
-        <a:bodyPr/>
-        <a:lstStyle/>
-        <a:p>
-          <a:endParaRPr lang="en-US"/>
-        </a:p>
-      </dgm:t>
-    </dgm:pt>
-    <dgm:pt modelId="{E3073277-69A1-9D40-B0EB-10E04BFF0043}">
-      <dgm:prSet phldrT="[Text]" custT="1"/>
-      <dgm:spPr/>
-      <dgm:t>
-        <a:bodyPr/>
-        <a:lstStyle/>
-        <a:p>
-          <a:r>
-            <a:rPr lang="en-US" sz="1400" dirty="0">
-              <a:latin typeface="Avenir Book" panose="02000503020000020003" pitchFamily="2" charset="0"/>
-            </a:rPr>
-            <a:t>Assembly</a:t>
-          </a:r>
-        </a:p>
-      </dgm:t>
-    </dgm:pt>
-    <dgm:pt modelId="{96F58729-3396-474C-BD72-954CD9177BB7}" type="parTrans" cxnId="{F993D5B7-592A-7A47-8C15-6DF4AE5AD7E6}">
-      <dgm:prSet/>
-      <dgm:spPr/>
-      <dgm:t>
-        <a:bodyPr/>
-        <a:lstStyle/>
-        <a:p>
-          <a:endParaRPr lang="en-US"/>
-        </a:p>
-      </dgm:t>
-    </dgm:pt>
-    <dgm:pt modelId="{5FC6E58E-A679-0645-98A4-BF3C4B33FC4A}" type="sibTrans" cxnId="{F993D5B7-592A-7A47-8C15-6DF4AE5AD7E6}">
-      <dgm:prSet/>
       <dgm:spPr/>
       <dgm:t>
         <a:bodyPr/>
@@ -1730,77 +2444,6 @@
         </a:p>
       </dgm:t>
     </dgm:pt>
-    <dgm:pt modelId="{196FE557-64AE-5341-9D44-71650117F63B}">
-      <dgm:prSet phldrT="[Text]" custT="1"/>
-      <dgm:spPr/>
-      <dgm:t>
-        <a:bodyPr/>
-        <a:lstStyle/>
-        <a:p>
-          <a:r>
-            <a:rPr lang="en-US" sz="1300" dirty="0">
-              <a:latin typeface="Avenir Book" panose="02000503020000020003" pitchFamily="2" charset="0"/>
-            </a:rPr>
-            <a:t>Programming Language</a:t>
-          </a:r>
-        </a:p>
-      </dgm:t>
-    </dgm:pt>
-    <dgm:pt modelId="{E623E65E-5427-704A-A32E-9A6DC0383EBB}" type="sibTrans" cxnId="{0E2F536E-F002-B947-A926-3254765EB592}">
-      <dgm:prSet/>
-      <dgm:spPr/>
-      <dgm:t>
-        <a:bodyPr/>
-        <a:lstStyle/>
-        <a:p>
-          <a:endParaRPr lang="en-US"/>
-        </a:p>
-      </dgm:t>
-    </dgm:pt>
-    <dgm:pt modelId="{7138C314-33EA-7346-A110-3316302B0E4F}" type="parTrans" cxnId="{0E2F536E-F002-B947-A926-3254765EB592}">
-      <dgm:prSet/>
-      <dgm:spPr/>
-      <dgm:t>
-        <a:bodyPr/>
-        <a:lstStyle/>
-        <a:p>
-          <a:endParaRPr lang="en-US"/>
-        </a:p>
-      </dgm:t>
-    </dgm:pt>
-    <dgm:pt modelId="{8F3DEA4B-71A5-F348-B3D8-280B5092E57B}">
-      <dgm:prSet/>
-      <dgm:spPr/>
-      <dgm:t>
-        <a:bodyPr/>
-        <a:lstStyle/>
-        <a:p>
-          <a:endParaRPr lang="en-US" dirty="0"/>
-        </a:p>
-      </dgm:t>
-    </dgm:pt>
-    <dgm:pt modelId="{F1F9811D-5DD0-5049-8FF1-DC24ACDBDDE7}" type="parTrans" cxnId="{D9A87A75-272D-094A-972F-E285199ECDBA}">
-      <dgm:prSet/>
-      <dgm:spPr/>
-      <dgm:t>
-        <a:bodyPr/>
-        <a:lstStyle/>
-        <a:p>
-          <a:endParaRPr lang="en-US"/>
-        </a:p>
-      </dgm:t>
-    </dgm:pt>
-    <dgm:pt modelId="{D7A39830-48BB-6A49-AE06-1815DAEF1195}" type="sibTrans" cxnId="{D9A87A75-272D-094A-972F-E285199ECDBA}">
-      <dgm:prSet/>
-      <dgm:spPr/>
-      <dgm:t>
-        <a:bodyPr/>
-        <a:lstStyle/>
-        <a:p>
-          <a:endParaRPr lang="en-US"/>
-        </a:p>
-      </dgm:t>
-    </dgm:pt>
     <dgm:pt modelId="{595E53A7-BD59-DB43-8BD1-52CC293142E8}" type="pres">
       <dgm:prSet presAssocID="{273B9DA9-DB4F-1143-B310-F2729709A260}" presName="linearFlow" presStyleCnt="0">
         <dgm:presLayoutVars>
@@ -1811,62 +2454,12 @@
       </dgm:prSet>
       <dgm:spPr/>
     </dgm:pt>
-    <dgm:pt modelId="{84B495F1-FEEA-794F-A0A2-F87DF842484D}" type="pres">
-      <dgm:prSet presAssocID="{196FE557-64AE-5341-9D44-71650117F63B}" presName="composite" presStyleCnt="0"/>
-      <dgm:spPr/>
-    </dgm:pt>
-    <dgm:pt modelId="{99A5FD1B-91DB-2842-9636-E5A790233E79}" type="pres">
-      <dgm:prSet presAssocID="{196FE557-64AE-5341-9D44-71650117F63B}" presName="parentText" presStyleLbl="alignNode1" presStyleIdx="0" presStyleCnt="4" custScaleY="99993">
-        <dgm:presLayoutVars>
-          <dgm:chMax val="1"/>
-          <dgm:bulletEnabled val="1"/>
-        </dgm:presLayoutVars>
-      </dgm:prSet>
-      <dgm:spPr/>
-    </dgm:pt>
-    <dgm:pt modelId="{2637CEAD-EA99-9044-9148-1EF72D751351}" type="pres">
-      <dgm:prSet presAssocID="{196FE557-64AE-5341-9D44-71650117F63B}" presName="descendantText" presStyleLbl="alignAcc1" presStyleIdx="0" presStyleCnt="4">
-        <dgm:presLayoutVars>
-          <dgm:bulletEnabled val="1"/>
-        </dgm:presLayoutVars>
-      </dgm:prSet>
-      <dgm:spPr/>
-    </dgm:pt>
-    <dgm:pt modelId="{F18EFCD4-0681-3348-BBA0-1855DD5BAD72}" type="pres">
-      <dgm:prSet presAssocID="{E623E65E-5427-704A-A32E-9A6DC0383EBB}" presName="sp" presStyleCnt="0"/>
-      <dgm:spPr/>
-    </dgm:pt>
-    <dgm:pt modelId="{D3DDC0DC-2176-AC4D-8B19-F273D0258EFA}" type="pres">
-      <dgm:prSet presAssocID="{E3073277-69A1-9D40-B0EB-10E04BFF0043}" presName="composite" presStyleCnt="0"/>
-      <dgm:spPr/>
-    </dgm:pt>
-    <dgm:pt modelId="{DC4BE693-26D0-5B4B-91CA-15A22285CF71}" type="pres">
-      <dgm:prSet presAssocID="{E3073277-69A1-9D40-B0EB-10E04BFF0043}" presName="parentText" presStyleLbl="alignNode1" presStyleIdx="1" presStyleCnt="4">
-        <dgm:presLayoutVars>
-          <dgm:chMax val="1"/>
-          <dgm:bulletEnabled val="1"/>
-        </dgm:presLayoutVars>
-      </dgm:prSet>
-      <dgm:spPr/>
-    </dgm:pt>
-    <dgm:pt modelId="{05F70A16-A5CA-5445-B409-FC47219F053B}" type="pres">
-      <dgm:prSet presAssocID="{E3073277-69A1-9D40-B0EB-10E04BFF0043}" presName="descendantText" presStyleLbl="alignAcc1" presStyleIdx="1" presStyleCnt="4">
-        <dgm:presLayoutVars>
-          <dgm:bulletEnabled val="1"/>
-        </dgm:presLayoutVars>
-      </dgm:prSet>
-      <dgm:spPr/>
-    </dgm:pt>
-    <dgm:pt modelId="{457BA5DB-5165-F246-9995-D4873C3B3823}" type="pres">
-      <dgm:prSet presAssocID="{5FC6E58E-A679-0645-98A4-BF3C4B33FC4A}" presName="sp" presStyleCnt="0"/>
-      <dgm:spPr/>
-    </dgm:pt>
     <dgm:pt modelId="{4E1F5DB8-BD3F-E84B-96A7-BDF1C9364F3A}" type="pres">
       <dgm:prSet presAssocID="{B09BE9B4-6DC5-034F-8E96-FA65B4A0E20E}" presName="composite" presStyleCnt="0"/>
       <dgm:spPr/>
     </dgm:pt>
     <dgm:pt modelId="{7A2EC0E8-A254-7E4C-A5A9-2943A4792BE9}" type="pres">
-      <dgm:prSet presAssocID="{B09BE9B4-6DC5-034F-8E96-FA65B4A0E20E}" presName="parentText" presStyleLbl="alignNode1" presStyleIdx="2" presStyleCnt="4">
+      <dgm:prSet presAssocID="{B09BE9B4-6DC5-034F-8E96-FA65B4A0E20E}" presName="parentText" presStyleLbl="alignNode1" presStyleIdx="0" presStyleCnt="2">
         <dgm:presLayoutVars>
           <dgm:chMax val="1"/>
           <dgm:bulletEnabled val="1"/>
@@ -1875,7 +2468,7 @@
       <dgm:spPr/>
     </dgm:pt>
     <dgm:pt modelId="{5F730E07-D20A-B74D-AC3F-EBAFC1E70EF0}" type="pres">
-      <dgm:prSet presAssocID="{B09BE9B4-6DC5-034F-8E96-FA65B4A0E20E}" presName="descendantText" presStyleLbl="alignAcc1" presStyleIdx="2" presStyleCnt="4">
+      <dgm:prSet presAssocID="{B09BE9B4-6DC5-034F-8E96-FA65B4A0E20E}" presName="descendantText" presStyleLbl="alignAcc1" presStyleIdx="0" presStyleCnt="2">
         <dgm:presLayoutVars>
           <dgm:bulletEnabled val="1"/>
         </dgm:presLayoutVars>
@@ -1891,7 +2484,7 @@
       <dgm:spPr/>
     </dgm:pt>
     <dgm:pt modelId="{F670D4C5-F516-5C4C-A5BB-937ED38A7F71}" type="pres">
-      <dgm:prSet presAssocID="{7B360798-BE4A-3E44-91F9-C6D480479D0F}" presName="parentText" presStyleLbl="alignNode1" presStyleIdx="3" presStyleCnt="4">
+      <dgm:prSet presAssocID="{7B360798-BE4A-3E44-91F9-C6D480479D0F}" presName="parentText" presStyleLbl="alignNode1" presStyleIdx="1" presStyleCnt="2">
         <dgm:presLayoutVars>
           <dgm:chMax val="1"/>
           <dgm:bulletEnabled val="1"/>
@@ -1900,7 +2493,7 @@
       <dgm:spPr/>
     </dgm:pt>
     <dgm:pt modelId="{908F1443-8FFD-1048-A979-BC26D9CCBC55}" type="pres">
-      <dgm:prSet presAssocID="{7B360798-BE4A-3E44-91F9-C6D480479D0F}" presName="descendantText" presStyleLbl="alignAcc1" presStyleIdx="3" presStyleCnt="4">
+      <dgm:prSet presAssocID="{7B360798-BE4A-3E44-91F9-C6D480479D0F}" presName="descendantText" presStyleLbl="alignAcc1" presStyleIdx="1" presStyleCnt="2">
         <dgm:presLayoutVars>
           <dgm:bulletEnabled val="1"/>
         </dgm:presLayoutVars>
@@ -1909,30 +2502,16 @@
     </dgm:pt>
   </dgm:ptLst>
   <dgm:cxnLst>
-    <dgm:cxn modelId="{96EBD50A-1867-5A47-BB26-3202C01F94DC}" type="presOf" srcId="{8F3DEA4B-71A5-F348-B3D8-280B5092E57B}" destId="{2637CEAD-EA99-9044-9148-1EF72D751351}" srcOrd="0" destOrd="0" presId="urn:microsoft.com/office/officeart/2005/8/layout/chevron2"/>
-    <dgm:cxn modelId="{C26C2320-5155-474C-A907-0F1EBE542E28}" type="presOf" srcId="{196FE557-64AE-5341-9D44-71650117F63B}" destId="{99A5FD1B-91DB-2842-9636-E5A790233E79}" srcOrd="0" destOrd="0" presId="urn:microsoft.com/office/officeart/2005/8/layout/chevron2"/>
     <dgm:cxn modelId="{EF29FA29-F903-5941-BDB4-4AC4C57ED382}" type="presOf" srcId="{7B360798-BE4A-3E44-91F9-C6D480479D0F}" destId="{F670D4C5-F516-5C4C-A5BB-937ED38A7F71}" srcOrd="0" destOrd="0" presId="urn:microsoft.com/office/officeart/2005/8/layout/chevron2"/>
-    <dgm:cxn modelId="{8020BA2A-B4E7-BF4C-9666-E0BC33ACE1BA}" srcId="{273B9DA9-DB4F-1143-B310-F2729709A260}" destId="{7B360798-BE4A-3E44-91F9-C6D480479D0F}" srcOrd="3" destOrd="0" parTransId="{9F3F0030-DBCE-1E4E-9065-DB576A33C46D}" sibTransId="{88F37FA6-25AF-B44A-B90A-2E61B057D6F9}"/>
-    <dgm:cxn modelId="{FE98E740-F828-A54B-B9C9-3C7D2C6CCB50}" srcId="{273B9DA9-DB4F-1143-B310-F2729709A260}" destId="{B09BE9B4-6DC5-034F-8E96-FA65B4A0E20E}" srcOrd="2" destOrd="0" parTransId="{B7276EBE-FDEA-D04F-8386-2BE45A993BB7}" sibTransId="{F54ABB33-3D1C-B442-9380-58E443C9F748}"/>
-    <dgm:cxn modelId="{DD363842-D478-344B-B953-99552B885136}" type="presOf" srcId="{E3073277-69A1-9D40-B0EB-10E04BFF0043}" destId="{DC4BE693-26D0-5B4B-91CA-15A22285CF71}" srcOrd="0" destOrd="0" presId="urn:microsoft.com/office/officeart/2005/8/layout/chevron2"/>
+    <dgm:cxn modelId="{8020BA2A-B4E7-BF4C-9666-E0BC33ACE1BA}" srcId="{273B9DA9-DB4F-1143-B310-F2729709A260}" destId="{7B360798-BE4A-3E44-91F9-C6D480479D0F}" srcOrd="1" destOrd="0" parTransId="{9F3F0030-DBCE-1E4E-9065-DB576A33C46D}" sibTransId="{88F37FA6-25AF-B44A-B90A-2E61B057D6F9}"/>
+    <dgm:cxn modelId="{FE98E740-F828-A54B-B9C9-3C7D2C6CCB50}" srcId="{273B9DA9-DB4F-1143-B310-F2729709A260}" destId="{B09BE9B4-6DC5-034F-8E96-FA65B4A0E20E}" srcOrd="0" destOrd="0" parTransId="{B7276EBE-FDEA-D04F-8386-2BE45A993BB7}" sibTransId="{F54ABB33-3D1C-B442-9380-58E443C9F748}"/>
     <dgm:cxn modelId="{46D5B06C-6BA5-2546-8133-B63B84BF5542}" type="presOf" srcId="{273B9DA9-DB4F-1143-B310-F2729709A260}" destId="{595E53A7-BD59-DB43-8BD1-52CC293142E8}" srcOrd="0" destOrd="0" presId="urn:microsoft.com/office/officeart/2005/8/layout/chevron2"/>
-    <dgm:cxn modelId="{0E2F536E-F002-B947-A926-3254765EB592}" srcId="{273B9DA9-DB4F-1143-B310-F2729709A260}" destId="{196FE557-64AE-5341-9D44-71650117F63B}" srcOrd="0" destOrd="0" parTransId="{7138C314-33EA-7346-A110-3316302B0E4F}" sibTransId="{E623E65E-5427-704A-A32E-9A6DC0383EBB}"/>
-    <dgm:cxn modelId="{D9A87A75-272D-094A-972F-E285199ECDBA}" srcId="{196FE557-64AE-5341-9D44-71650117F63B}" destId="{8F3DEA4B-71A5-F348-B3D8-280B5092E57B}" srcOrd="0" destOrd="0" parTransId="{F1F9811D-5DD0-5049-8FF1-DC24ACDBDDE7}" sibTransId="{D7A39830-48BB-6A49-AE06-1815DAEF1195}"/>
     <dgm:cxn modelId="{A84059B2-136D-D84C-AD57-38FD2DD1C4B5}" type="presOf" srcId="{B09BE9B4-6DC5-034F-8E96-FA65B4A0E20E}" destId="{7A2EC0E8-A254-7E4C-A5A9-2943A4792BE9}" srcOrd="0" destOrd="0" presId="urn:microsoft.com/office/officeart/2005/8/layout/chevron2"/>
-    <dgm:cxn modelId="{F993D5B7-592A-7A47-8C15-6DF4AE5AD7E6}" srcId="{273B9DA9-DB4F-1143-B310-F2729709A260}" destId="{E3073277-69A1-9D40-B0EB-10E04BFF0043}" srcOrd="1" destOrd="0" parTransId="{96F58729-3396-474C-BD72-954CD9177BB7}" sibTransId="{5FC6E58E-A679-0645-98A4-BF3C4B33FC4A}"/>
-    <dgm:cxn modelId="{08736E93-D668-F14C-B307-1E46109D3882}" type="presParOf" srcId="{595E53A7-BD59-DB43-8BD1-52CC293142E8}" destId="{84B495F1-FEEA-794F-A0A2-F87DF842484D}" srcOrd="0" destOrd="0" presId="urn:microsoft.com/office/officeart/2005/8/layout/chevron2"/>
-    <dgm:cxn modelId="{5448026C-135E-5B41-8A32-A5F87916E7F2}" type="presParOf" srcId="{84B495F1-FEEA-794F-A0A2-F87DF842484D}" destId="{99A5FD1B-91DB-2842-9636-E5A790233E79}" srcOrd="0" destOrd="0" presId="urn:microsoft.com/office/officeart/2005/8/layout/chevron2"/>
-    <dgm:cxn modelId="{AD440EB6-CC10-8945-B9D2-2EBF382BEF66}" type="presParOf" srcId="{84B495F1-FEEA-794F-A0A2-F87DF842484D}" destId="{2637CEAD-EA99-9044-9148-1EF72D751351}" srcOrd="1" destOrd="0" presId="urn:microsoft.com/office/officeart/2005/8/layout/chevron2"/>
-    <dgm:cxn modelId="{27FC7072-82D9-8245-87C9-A66356577EBF}" type="presParOf" srcId="{595E53A7-BD59-DB43-8BD1-52CC293142E8}" destId="{F18EFCD4-0681-3348-BBA0-1855DD5BAD72}" srcOrd="1" destOrd="0" presId="urn:microsoft.com/office/officeart/2005/8/layout/chevron2"/>
-    <dgm:cxn modelId="{EE805429-BDD3-9F44-B488-DDD0B6E259E6}" type="presParOf" srcId="{595E53A7-BD59-DB43-8BD1-52CC293142E8}" destId="{D3DDC0DC-2176-AC4D-8B19-F273D0258EFA}" srcOrd="2" destOrd="0" presId="urn:microsoft.com/office/officeart/2005/8/layout/chevron2"/>
-    <dgm:cxn modelId="{52A7D97A-EFC8-2646-AF23-4E9CD81E46B8}" type="presParOf" srcId="{D3DDC0DC-2176-AC4D-8B19-F273D0258EFA}" destId="{DC4BE693-26D0-5B4B-91CA-15A22285CF71}" srcOrd="0" destOrd="0" presId="urn:microsoft.com/office/officeart/2005/8/layout/chevron2"/>
-    <dgm:cxn modelId="{54A380F2-8527-6640-AC5D-C65A9B1DA16F}" type="presParOf" srcId="{D3DDC0DC-2176-AC4D-8B19-F273D0258EFA}" destId="{05F70A16-A5CA-5445-B409-FC47219F053B}" srcOrd="1" destOrd="0" presId="urn:microsoft.com/office/officeart/2005/8/layout/chevron2"/>
-    <dgm:cxn modelId="{2BDA149D-8CF2-9546-A271-55BC9B44A952}" type="presParOf" srcId="{595E53A7-BD59-DB43-8BD1-52CC293142E8}" destId="{457BA5DB-5165-F246-9995-D4873C3B3823}" srcOrd="3" destOrd="0" presId="urn:microsoft.com/office/officeart/2005/8/layout/chevron2"/>
-    <dgm:cxn modelId="{42B651CB-8287-B045-BF6D-4635E6C84513}" type="presParOf" srcId="{595E53A7-BD59-DB43-8BD1-52CC293142E8}" destId="{4E1F5DB8-BD3F-E84B-96A7-BDF1C9364F3A}" srcOrd="4" destOrd="0" presId="urn:microsoft.com/office/officeart/2005/8/layout/chevron2"/>
+    <dgm:cxn modelId="{42B651CB-8287-B045-BF6D-4635E6C84513}" type="presParOf" srcId="{595E53A7-BD59-DB43-8BD1-52CC293142E8}" destId="{4E1F5DB8-BD3F-E84B-96A7-BDF1C9364F3A}" srcOrd="0" destOrd="0" presId="urn:microsoft.com/office/officeart/2005/8/layout/chevron2"/>
     <dgm:cxn modelId="{E8AC2835-E39C-B348-AF3A-5332791FDBE6}" type="presParOf" srcId="{4E1F5DB8-BD3F-E84B-96A7-BDF1C9364F3A}" destId="{7A2EC0E8-A254-7E4C-A5A9-2943A4792BE9}" srcOrd="0" destOrd="0" presId="urn:microsoft.com/office/officeart/2005/8/layout/chevron2"/>
     <dgm:cxn modelId="{1699B884-C2C8-1440-97A4-03ADF1DC2093}" type="presParOf" srcId="{4E1F5DB8-BD3F-E84B-96A7-BDF1C9364F3A}" destId="{5F730E07-D20A-B74D-AC3F-EBAFC1E70EF0}" srcOrd="1" destOrd="0" presId="urn:microsoft.com/office/officeart/2005/8/layout/chevron2"/>
-    <dgm:cxn modelId="{3C66FB0F-C4FE-A14B-B2FF-6B1FBF5C8524}" type="presParOf" srcId="{595E53A7-BD59-DB43-8BD1-52CC293142E8}" destId="{B26866B0-9D17-9049-B970-DBAAF512FA8E}" srcOrd="5" destOrd="0" presId="urn:microsoft.com/office/officeart/2005/8/layout/chevron2"/>
-    <dgm:cxn modelId="{180E09C9-89A8-5D47-AB10-112E13D7D201}" type="presParOf" srcId="{595E53A7-BD59-DB43-8BD1-52CC293142E8}" destId="{2585C671-91D6-9A4B-8C99-4A77A5249D2A}" srcOrd="6" destOrd="0" presId="urn:microsoft.com/office/officeart/2005/8/layout/chevron2"/>
+    <dgm:cxn modelId="{3C66FB0F-C4FE-A14B-B2FF-6B1FBF5C8524}" type="presParOf" srcId="{595E53A7-BD59-DB43-8BD1-52CC293142E8}" destId="{B26866B0-9D17-9049-B970-DBAAF512FA8E}" srcOrd="1" destOrd="0" presId="urn:microsoft.com/office/officeart/2005/8/layout/chevron2"/>
+    <dgm:cxn modelId="{180E09C9-89A8-5D47-AB10-112E13D7D201}" type="presParOf" srcId="{595E53A7-BD59-DB43-8BD1-52CC293142E8}" destId="{2585C671-91D6-9A4B-8C99-4A77A5249D2A}" srcOrd="2" destOrd="0" presId="urn:microsoft.com/office/officeart/2005/8/layout/chevron2"/>
     <dgm:cxn modelId="{89CFB1CD-7357-2A49-8F5E-136F203C6ED6}" type="presParOf" srcId="{2585C671-91D6-9A4B-8C99-4A77A5249D2A}" destId="{F670D4C5-F516-5C4C-A5BB-937ED38A7F71}" srcOrd="0" destOrd="0" presId="urn:microsoft.com/office/officeart/2005/8/layout/chevron2"/>
     <dgm:cxn modelId="{79762E48-3271-594D-B633-5C1CE5764231}" type="presParOf" srcId="{2585C671-91D6-9A4B-8C99-4A77A5249D2A}" destId="{908F1443-8FFD-1048-A979-BC26D9CCBC55}" srcOrd="1" destOrd="0" presId="urn:microsoft.com/office/officeart/2005/8/layout/chevron2"/>
   </dgm:cxnLst>
@@ -1951,44 +2530,6 @@
   <dgm:ptLst>
     <dgm:pt modelId="{273B9DA9-DB4F-1143-B310-F2729709A260}" type="doc">
       <dgm:prSet loTypeId="urn:microsoft.com/office/officeart/2005/8/layout/chevron2" loCatId="" qsTypeId="urn:microsoft.com/office/officeart/2005/8/quickstyle/simple1" qsCatId="simple" csTypeId="urn:microsoft.com/office/officeart/2005/8/colors/accent1_2" csCatId="accent1" phldr="1"/>
-      <dgm:spPr/>
-      <dgm:t>
-        <a:bodyPr/>
-        <a:lstStyle/>
-        <a:p>
-          <a:endParaRPr lang="en-US"/>
-        </a:p>
-      </dgm:t>
-    </dgm:pt>
-    <dgm:pt modelId="{E3073277-69A1-9D40-B0EB-10E04BFF0043}">
-      <dgm:prSet phldrT="[Text]" custT="1"/>
-      <dgm:spPr/>
-      <dgm:t>
-        <a:bodyPr/>
-        <a:lstStyle/>
-        <a:p>
-          <a:r>
-            <a:rPr lang="en-US" sz="1400" dirty="0">
-              <a:latin typeface="Avenir Book" panose="02000503020000020003" pitchFamily="2" charset="0"/>
-            </a:rPr>
-            <a:t>Assembly</a:t>
-          </a:r>
-        </a:p>
-      </dgm:t>
-    </dgm:pt>
-    <dgm:pt modelId="{96F58729-3396-474C-BD72-954CD9177BB7}" type="parTrans" cxnId="{F993D5B7-592A-7A47-8C15-6DF4AE5AD7E6}">
-      <dgm:prSet/>
-      <dgm:spPr/>
-      <dgm:t>
-        <a:bodyPr/>
-        <a:lstStyle/>
-        <a:p>
-          <a:endParaRPr lang="en-US"/>
-        </a:p>
-      </dgm:t>
-    </dgm:pt>
-    <dgm:pt modelId="{5FC6E58E-A679-0645-98A4-BF3C4B33FC4A}" type="sibTrans" cxnId="{F993D5B7-592A-7A47-8C15-6DF4AE5AD7E6}">
-      <dgm:prSet/>
       <dgm:spPr/>
       <dgm:t>
         <a:bodyPr/>
@@ -2092,7 +2633,102 @@
         </a:p>
       </dgm:t>
     </dgm:pt>
-    <dgm:pt modelId="{196FE557-64AE-5341-9D44-71650117F63B}">
+    <dgm:pt modelId="{595E53A7-BD59-DB43-8BD1-52CC293142E8}" type="pres">
+      <dgm:prSet presAssocID="{273B9DA9-DB4F-1143-B310-F2729709A260}" presName="linearFlow" presStyleCnt="0">
+        <dgm:presLayoutVars>
+          <dgm:dir/>
+          <dgm:animLvl val="lvl"/>
+          <dgm:resizeHandles val="exact"/>
+        </dgm:presLayoutVars>
+      </dgm:prSet>
+      <dgm:spPr/>
+    </dgm:pt>
+    <dgm:pt modelId="{4E1F5DB8-BD3F-E84B-96A7-BDF1C9364F3A}" type="pres">
+      <dgm:prSet presAssocID="{B09BE9B4-6DC5-034F-8E96-FA65B4A0E20E}" presName="composite" presStyleCnt="0"/>
+      <dgm:spPr/>
+    </dgm:pt>
+    <dgm:pt modelId="{7A2EC0E8-A254-7E4C-A5A9-2943A4792BE9}" type="pres">
+      <dgm:prSet presAssocID="{B09BE9B4-6DC5-034F-8E96-FA65B4A0E20E}" presName="parentText" presStyleLbl="alignNode1" presStyleIdx="0" presStyleCnt="2">
+        <dgm:presLayoutVars>
+          <dgm:chMax val="1"/>
+          <dgm:bulletEnabled val="1"/>
+        </dgm:presLayoutVars>
+      </dgm:prSet>
+      <dgm:spPr/>
+    </dgm:pt>
+    <dgm:pt modelId="{5F730E07-D20A-B74D-AC3F-EBAFC1E70EF0}" type="pres">
+      <dgm:prSet presAssocID="{B09BE9B4-6DC5-034F-8E96-FA65B4A0E20E}" presName="descendantText" presStyleLbl="alignAcc1" presStyleIdx="0" presStyleCnt="2">
+        <dgm:presLayoutVars>
+          <dgm:bulletEnabled val="1"/>
+        </dgm:presLayoutVars>
+      </dgm:prSet>
+      <dgm:spPr/>
+    </dgm:pt>
+    <dgm:pt modelId="{B26866B0-9D17-9049-B970-DBAAF512FA8E}" type="pres">
+      <dgm:prSet presAssocID="{F54ABB33-3D1C-B442-9380-58E443C9F748}" presName="sp" presStyleCnt="0"/>
+      <dgm:spPr/>
+    </dgm:pt>
+    <dgm:pt modelId="{2585C671-91D6-9A4B-8C99-4A77A5249D2A}" type="pres">
+      <dgm:prSet presAssocID="{7B360798-BE4A-3E44-91F9-C6D480479D0F}" presName="composite" presStyleCnt="0"/>
+      <dgm:spPr/>
+    </dgm:pt>
+    <dgm:pt modelId="{F670D4C5-F516-5C4C-A5BB-937ED38A7F71}" type="pres">
+      <dgm:prSet presAssocID="{7B360798-BE4A-3E44-91F9-C6D480479D0F}" presName="parentText" presStyleLbl="alignNode1" presStyleIdx="1" presStyleCnt="2">
+        <dgm:presLayoutVars>
+          <dgm:chMax val="1"/>
+          <dgm:bulletEnabled val="1"/>
+        </dgm:presLayoutVars>
+      </dgm:prSet>
+      <dgm:spPr/>
+    </dgm:pt>
+    <dgm:pt modelId="{908F1443-8FFD-1048-A979-BC26D9CCBC55}" type="pres">
+      <dgm:prSet presAssocID="{7B360798-BE4A-3E44-91F9-C6D480479D0F}" presName="descendantText" presStyleLbl="alignAcc1" presStyleIdx="1" presStyleCnt="2">
+        <dgm:presLayoutVars>
+          <dgm:bulletEnabled val="1"/>
+        </dgm:presLayoutVars>
+      </dgm:prSet>
+      <dgm:spPr/>
+    </dgm:pt>
+  </dgm:ptLst>
+  <dgm:cxnLst>
+    <dgm:cxn modelId="{EF29FA29-F903-5941-BDB4-4AC4C57ED382}" type="presOf" srcId="{7B360798-BE4A-3E44-91F9-C6D480479D0F}" destId="{F670D4C5-F516-5C4C-A5BB-937ED38A7F71}" srcOrd="0" destOrd="0" presId="urn:microsoft.com/office/officeart/2005/8/layout/chevron2"/>
+    <dgm:cxn modelId="{8020BA2A-B4E7-BF4C-9666-E0BC33ACE1BA}" srcId="{273B9DA9-DB4F-1143-B310-F2729709A260}" destId="{7B360798-BE4A-3E44-91F9-C6D480479D0F}" srcOrd="1" destOrd="0" parTransId="{9F3F0030-DBCE-1E4E-9065-DB576A33C46D}" sibTransId="{88F37FA6-25AF-B44A-B90A-2E61B057D6F9}"/>
+    <dgm:cxn modelId="{FE98E740-F828-A54B-B9C9-3C7D2C6CCB50}" srcId="{273B9DA9-DB4F-1143-B310-F2729709A260}" destId="{B09BE9B4-6DC5-034F-8E96-FA65B4A0E20E}" srcOrd="0" destOrd="0" parTransId="{B7276EBE-FDEA-D04F-8386-2BE45A993BB7}" sibTransId="{F54ABB33-3D1C-B442-9380-58E443C9F748}"/>
+    <dgm:cxn modelId="{46D5B06C-6BA5-2546-8133-B63B84BF5542}" type="presOf" srcId="{273B9DA9-DB4F-1143-B310-F2729709A260}" destId="{595E53A7-BD59-DB43-8BD1-52CC293142E8}" srcOrd="0" destOrd="0" presId="urn:microsoft.com/office/officeart/2005/8/layout/chevron2"/>
+    <dgm:cxn modelId="{A84059B2-136D-D84C-AD57-38FD2DD1C4B5}" type="presOf" srcId="{B09BE9B4-6DC5-034F-8E96-FA65B4A0E20E}" destId="{7A2EC0E8-A254-7E4C-A5A9-2943A4792BE9}" srcOrd="0" destOrd="0" presId="urn:microsoft.com/office/officeart/2005/8/layout/chevron2"/>
+    <dgm:cxn modelId="{42B651CB-8287-B045-BF6D-4635E6C84513}" type="presParOf" srcId="{595E53A7-BD59-DB43-8BD1-52CC293142E8}" destId="{4E1F5DB8-BD3F-E84B-96A7-BDF1C9364F3A}" srcOrd="0" destOrd="0" presId="urn:microsoft.com/office/officeart/2005/8/layout/chevron2"/>
+    <dgm:cxn modelId="{E8AC2835-E39C-B348-AF3A-5332791FDBE6}" type="presParOf" srcId="{4E1F5DB8-BD3F-E84B-96A7-BDF1C9364F3A}" destId="{7A2EC0E8-A254-7E4C-A5A9-2943A4792BE9}" srcOrd="0" destOrd="0" presId="urn:microsoft.com/office/officeart/2005/8/layout/chevron2"/>
+    <dgm:cxn modelId="{1699B884-C2C8-1440-97A4-03ADF1DC2093}" type="presParOf" srcId="{4E1F5DB8-BD3F-E84B-96A7-BDF1C9364F3A}" destId="{5F730E07-D20A-B74D-AC3F-EBAFC1E70EF0}" srcOrd="1" destOrd="0" presId="urn:microsoft.com/office/officeart/2005/8/layout/chevron2"/>
+    <dgm:cxn modelId="{3C66FB0F-C4FE-A14B-B2FF-6B1FBF5C8524}" type="presParOf" srcId="{595E53A7-BD59-DB43-8BD1-52CC293142E8}" destId="{B26866B0-9D17-9049-B970-DBAAF512FA8E}" srcOrd="1" destOrd="0" presId="urn:microsoft.com/office/officeart/2005/8/layout/chevron2"/>
+    <dgm:cxn modelId="{180E09C9-89A8-5D47-AB10-112E13D7D201}" type="presParOf" srcId="{595E53A7-BD59-DB43-8BD1-52CC293142E8}" destId="{2585C671-91D6-9A4B-8C99-4A77A5249D2A}" srcOrd="2" destOrd="0" presId="urn:microsoft.com/office/officeart/2005/8/layout/chevron2"/>
+    <dgm:cxn modelId="{89CFB1CD-7357-2A49-8F5E-136F203C6ED6}" type="presParOf" srcId="{2585C671-91D6-9A4B-8C99-4A77A5249D2A}" destId="{F670D4C5-F516-5C4C-A5BB-937ED38A7F71}" srcOrd="0" destOrd="0" presId="urn:microsoft.com/office/officeart/2005/8/layout/chevron2"/>
+    <dgm:cxn modelId="{79762E48-3271-594D-B633-5C1CE5764231}" type="presParOf" srcId="{2585C671-91D6-9A4B-8C99-4A77A5249D2A}" destId="{908F1443-8FFD-1048-A979-BC26D9CCBC55}" srcOrd="1" destOrd="0" presId="urn:microsoft.com/office/officeart/2005/8/layout/chevron2"/>
+  </dgm:cxnLst>
+  <dgm:bg/>
+  <dgm:whole/>
+  <dgm:extLst>
+    <a:ext uri="http://schemas.microsoft.com/office/drawing/2008/diagram">
+      <dsp:dataModelExt xmlns:dsp="http://schemas.microsoft.com/office/drawing/2008/diagram" relId="rId13" minVer="http://schemas.openxmlformats.org/drawingml/2006/diagram"/>
+    </a:ext>
+  </dgm:extLst>
+</dgm:dataModel>
+</file>
+
+<file path=ppt/diagrams/data3.xml><?xml version="1.0" encoding="utf-8"?>
+<dgm:dataModel xmlns:dgm="http://schemas.openxmlformats.org/drawingml/2006/diagram" xmlns:a="http://schemas.openxmlformats.org/drawingml/2006/main">
+  <dgm:ptLst>
+    <dgm:pt modelId="{273B9DA9-DB4F-1143-B310-F2729709A260}" type="doc">
+      <dgm:prSet loTypeId="urn:microsoft.com/office/officeart/2005/8/layout/chevron2" loCatId="" qsTypeId="urn:microsoft.com/office/officeart/2005/8/quickstyle/simple1" qsCatId="simple" csTypeId="urn:microsoft.com/office/officeart/2005/8/colors/accent1_2" csCatId="accent1" phldr="1"/>
+      <dgm:spPr/>
+      <dgm:t>
+        <a:bodyPr/>
+        <a:lstStyle/>
+        <a:p>
+          <a:endParaRPr lang="en-US"/>
+        </a:p>
+      </dgm:t>
+    </dgm:pt>
+    <dgm:pt modelId="{B09BE9B4-6DC5-034F-8E96-FA65B4A0E20E}">
       <dgm:prSet phldrT="[Text]" custT="1"/>
       <dgm:spPr/>
       <dgm:t>
@@ -2100,7 +2736,7 @@
         <a:lstStyle/>
         <a:p>
           <a:r>
-            <a:rPr lang="en-US" sz="1300" dirty="0">
+            <a:rPr lang="en-US" sz="1370" dirty="0">
               <a:latin typeface="Avenir Book" panose="02000503020000020003" pitchFamily="2" charset="0"/>
             </a:rPr>
             <a:t>Programming Language</a:t>
@@ -2108,7 +2744,7 @@
         </a:p>
       </dgm:t>
     </dgm:pt>
-    <dgm:pt modelId="{E623E65E-5427-704A-A32E-9A6DC0383EBB}" type="sibTrans" cxnId="{0E2F536E-F002-B947-A926-3254765EB592}">
+    <dgm:pt modelId="{B7276EBE-FDEA-D04F-8386-2BE45A993BB7}" type="parTrans" cxnId="{FE98E740-F828-A54B-B9C9-3C7D2C6CCB50}">
       <dgm:prSet/>
       <dgm:spPr/>
       <dgm:t>
@@ -2119,7 +2755,7 @@
         </a:p>
       </dgm:t>
     </dgm:pt>
-    <dgm:pt modelId="{7138C314-33EA-7346-A110-3316302B0E4F}" type="parTrans" cxnId="{0E2F536E-F002-B947-A926-3254765EB592}">
+    <dgm:pt modelId="{F54ABB33-3D1C-B442-9380-58E443C9F748}" type="sibTrans" cxnId="{FE98E740-F828-A54B-B9C9-3C7D2C6CCB50}">
       <dgm:prSet/>
       <dgm:spPr/>
       <dgm:t>
@@ -2130,18 +2766,23 @@
         </a:p>
       </dgm:t>
     </dgm:pt>
-    <dgm:pt modelId="{8F3DEA4B-71A5-F348-B3D8-280B5092E57B}">
-      <dgm:prSet/>
+    <dgm:pt modelId="{7B360798-BE4A-3E44-91F9-C6D480479D0F}">
+      <dgm:prSet phldrT="[Text]" custT="1"/>
       <dgm:spPr/>
       <dgm:t>
         <a:bodyPr/>
         <a:lstStyle/>
         <a:p>
-          <a:endParaRPr lang="en-US" dirty="0"/>
+          <a:r>
+            <a:rPr lang="en-US" sz="1400" dirty="0">
+              <a:latin typeface="Avenir Book" panose="02000503020000020003" pitchFamily="2" charset="0"/>
+            </a:rPr>
+            <a:t>Assembly</a:t>
+          </a:r>
         </a:p>
       </dgm:t>
     </dgm:pt>
-    <dgm:pt modelId="{F1F9811D-5DD0-5049-8FF1-DC24ACDBDDE7}" type="parTrans" cxnId="{D9A87A75-272D-094A-972F-E285199ECDBA}">
+    <dgm:pt modelId="{9F3F0030-DBCE-1E4E-9065-DB576A33C46D}" type="parTrans" cxnId="{8020BA2A-B4E7-BF4C-9666-E0BC33ACE1BA}">
       <dgm:prSet/>
       <dgm:spPr/>
       <dgm:t>
@@ -2152,7 +2793,7 @@
         </a:p>
       </dgm:t>
     </dgm:pt>
-    <dgm:pt modelId="{D7A39830-48BB-6A49-AE06-1815DAEF1195}" type="sibTrans" cxnId="{D9A87A75-272D-094A-972F-E285199ECDBA}">
+    <dgm:pt modelId="{88F37FA6-25AF-B44A-B90A-2E61B057D6F9}" type="sibTrans" cxnId="{8020BA2A-B4E7-BF4C-9666-E0BC33ACE1BA}">
       <dgm:prSet/>
       <dgm:spPr/>
       <dgm:t>
@@ -2173,62 +2814,12 @@
       </dgm:prSet>
       <dgm:spPr/>
     </dgm:pt>
-    <dgm:pt modelId="{84B495F1-FEEA-794F-A0A2-F87DF842484D}" type="pres">
-      <dgm:prSet presAssocID="{196FE557-64AE-5341-9D44-71650117F63B}" presName="composite" presStyleCnt="0"/>
-      <dgm:spPr/>
-    </dgm:pt>
-    <dgm:pt modelId="{99A5FD1B-91DB-2842-9636-E5A790233E79}" type="pres">
-      <dgm:prSet presAssocID="{196FE557-64AE-5341-9D44-71650117F63B}" presName="parentText" presStyleLbl="alignNode1" presStyleIdx="0" presStyleCnt="4" custScaleY="99993">
-        <dgm:presLayoutVars>
-          <dgm:chMax val="1"/>
-          <dgm:bulletEnabled val="1"/>
-        </dgm:presLayoutVars>
-      </dgm:prSet>
-      <dgm:spPr/>
-    </dgm:pt>
-    <dgm:pt modelId="{2637CEAD-EA99-9044-9148-1EF72D751351}" type="pres">
-      <dgm:prSet presAssocID="{196FE557-64AE-5341-9D44-71650117F63B}" presName="descendantText" presStyleLbl="alignAcc1" presStyleIdx="0" presStyleCnt="4">
-        <dgm:presLayoutVars>
-          <dgm:bulletEnabled val="1"/>
-        </dgm:presLayoutVars>
-      </dgm:prSet>
-      <dgm:spPr/>
-    </dgm:pt>
-    <dgm:pt modelId="{F18EFCD4-0681-3348-BBA0-1855DD5BAD72}" type="pres">
-      <dgm:prSet presAssocID="{E623E65E-5427-704A-A32E-9A6DC0383EBB}" presName="sp" presStyleCnt="0"/>
-      <dgm:spPr/>
-    </dgm:pt>
-    <dgm:pt modelId="{D3DDC0DC-2176-AC4D-8B19-F273D0258EFA}" type="pres">
-      <dgm:prSet presAssocID="{E3073277-69A1-9D40-B0EB-10E04BFF0043}" presName="composite" presStyleCnt="0"/>
-      <dgm:spPr/>
-    </dgm:pt>
-    <dgm:pt modelId="{DC4BE693-26D0-5B4B-91CA-15A22285CF71}" type="pres">
-      <dgm:prSet presAssocID="{E3073277-69A1-9D40-B0EB-10E04BFF0043}" presName="parentText" presStyleLbl="alignNode1" presStyleIdx="1" presStyleCnt="4">
-        <dgm:presLayoutVars>
-          <dgm:chMax val="1"/>
-          <dgm:bulletEnabled val="1"/>
-        </dgm:presLayoutVars>
-      </dgm:prSet>
-      <dgm:spPr/>
-    </dgm:pt>
-    <dgm:pt modelId="{05F70A16-A5CA-5445-B409-FC47219F053B}" type="pres">
-      <dgm:prSet presAssocID="{E3073277-69A1-9D40-B0EB-10E04BFF0043}" presName="descendantText" presStyleLbl="alignAcc1" presStyleIdx="1" presStyleCnt="4">
-        <dgm:presLayoutVars>
-          <dgm:bulletEnabled val="1"/>
-        </dgm:presLayoutVars>
-      </dgm:prSet>
-      <dgm:spPr/>
-    </dgm:pt>
-    <dgm:pt modelId="{457BA5DB-5165-F246-9995-D4873C3B3823}" type="pres">
-      <dgm:prSet presAssocID="{5FC6E58E-A679-0645-98A4-BF3C4B33FC4A}" presName="sp" presStyleCnt="0"/>
-      <dgm:spPr/>
-    </dgm:pt>
     <dgm:pt modelId="{4E1F5DB8-BD3F-E84B-96A7-BDF1C9364F3A}" type="pres">
       <dgm:prSet presAssocID="{B09BE9B4-6DC5-034F-8E96-FA65B4A0E20E}" presName="composite" presStyleCnt="0"/>
       <dgm:spPr/>
     </dgm:pt>
     <dgm:pt modelId="{7A2EC0E8-A254-7E4C-A5A9-2943A4792BE9}" type="pres">
-      <dgm:prSet presAssocID="{B09BE9B4-6DC5-034F-8E96-FA65B4A0E20E}" presName="parentText" presStyleLbl="alignNode1" presStyleIdx="2" presStyleCnt="4">
+      <dgm:prSet presAssocID="{B09BE9B4-6DC5-034F-8E96-FA65B4A0E20E}" presName="parentText" presStyleLbl="alignNode1" presStyleIdx="0" presStyleCnt="2">
         <dgm:presLayoutVars>
           <dgm:chMax val="1"/>
           <dgm:bulletEnabled val="1"/>
@@ -2237,7 +2828,7 @@
       <dgm:spPr/>
     </dgm:pt>
     <dgm:pt modelId="{5F730E07-D20A-B74D-AC3F-EBAFC1E70EF0}" type="pres">
-      <dgm:prSet presAssocID="{B09BE9B4-6DC5-034F-8E96-FA65B4A0E20E}" presName="descendantText" presStyleLbl="alignAcc1" presStyleIdx="2" presStyleCnt="4">
+      <dgm:prSet presAssocID="{B09BE9B4-6DC5-034F-8E96-FA65B4A0E20E}" presName="descendantText" presStyleLbl="alignAcc1" presStyleIdx="0" presStyleCnt="2">
         <dgm:presLayoutVars>
           <dgm:bulletEnabled val="1"/>
         </dgm:presLayoutVars>
@@ -2253,7 +2844,7 @@
       <dgm:spPr/>
     </dgm:pt>
     <dgm:pt modelId="{F670D4C5-F516-5C4C-A5BB-937ED38A7F71}" type="pres">
-      <dgm:prSet presAssocID="{7B360798-BE4A-3E44-91F9-C6D480479D0F}" presName="parentText" presStyleLbl="alignNode1" presStyleIdx="3" presStyleCnt="4">
+      <dgm:prSet presAssocID="{7B360798-BE4A-3E44-91F9-C6D480479D0F}" presName="parentText" presStyleLbl="alignNode1" presStyleIdx="1" presStyleCnt="2">
         <dgm:presLayoutVars>
           <dgm:chMax val="1"/>
           <dgm:bulletEnabled val="1"/>
@@ -2262,7 +2853,7 @@
       <dgm:spPr/>
     </dgm:pt>
     <dgm:pt modelId="{908F1443-8FFD-1048-A979-BC26D9CCBC55}" type="pres">
-      <dgm:prSet presAssocID="{7B360798-BE4A-3E44-91F9-C6D480479D0F}" presName="descendantText" presStyleLbl="alignAcc1" presStyleIdx="3" presStyleCnt="4">
+      <dgm:prSet presAssocID="{7B360798-BE4A-3E44-91F9-C6D480479D0F}" presName="descendantText" presStyleLbl="alignAcc1" presStyleIdx="1" presStyleCnt="2">
         <dgm:presLayoutVars>
           <dgm:bulletEnabled val="1"/>
         </dgm:presLayoutVars>
@@ -2271,30 +2862,16 @@
     </dgm:pt>
   </dgm:ptLst>
   <dgm:cxnLst>
-    <dgm:cxn modelId="{96EBD50A-1867-5A47-BB26-3202C01F94DC}" type="presOf" srcId="{8F3DEA4B-71A5-F348-B3D8-280B5092E57B}" destId="{2637CEAD-EA99-9044-9148-1EF72D751351}" srcOrd="0" destOrd="0" presId="urn:microsoft.com/office/officeart/2005/8/layout/chevron2"/>
-    <dgm:cxn modelId="{C26C2320-5155-474C-A907-0F1EBE542E28}" type="presOf" srcId="{196FE557-64AE-5341-9D44-71650117F63B}" destId="{99A5FD1B-91DB-2842-9636-E5A790233E79}" srcOrd="0" destOrd="0" presId="urn:microsoft.com/office/officeart/2005/8/layout/chevron2"/>
     <dgm:cxn modelId="{EF29FA29-F903-5941-BDB4-4AC4C57ED382}" type="presOf" srcId="{7B360798-BE4A-3E44-91F9-C6D480479D0F}" destId="{F670D4C5-F516-5C4C-A5BB-937ED38A7F71}" srcOrd="0" destOrd="0" presId="urn:microsoft.com/office/officeart/2005/8/layout/chevron2"/>
-    <dgm:cxn modelId="{8020BA2A-B4E7-BF4C-9666-E0BC33ACE1BA}" srcId="{273B9DA9-DB4F-1143-B310-F2729709A260}" destId="{7B360798-BE4A-3E44-91F9-C6D480479D0F}" srcOrd="3" destOrd="0" parTransId="{9F3F0030-DBCE-1E4E-9065-DB576A33C46D}" sibTransId="{88F37FA6-25AF-B44A-B90A-2E61B057D6F9}"/>
-    <dgm:cxn modelId="{FE98E740-F828-A54B-B9C9-3C7D2C6CCB50}" srcId="{273B9DA9-DB4F-1143-B310-F2729709A260}" destId="{B09BE9B4-6DC5-034F-8E96-FA65B4A0E20E}" srcOrd="2" destOrd="0" parTransId="{B7276EBE-FDEA-D04F-8386-2BE45A993BB7}" sibTransId="{F54ABB33-3D1C-B442-9380-58E443C9F748}"/>
-    <dgm:cxn modelId="{DD363842-D478-344B-B953-99552B885136}" type="presOf" srcId="{E3073277-69A1-9D40-B0EB-10E04BFF0043}" destId="{DC4BE693-26D0-5B4B-91CA-15A22285CF71}" srcOrd="0" destOrd="0" presId="urn:microsoft.com/office/officeart/2005/8/layout/chevron2"/>
+    <dgm:cxn modelId="{8020BA2A-B4E7-BF4C-9666-E0BC33ACE1BA}" srcId="{273B9DA9-DB4F-1143-B310-F2729709A260}" destId="{7B360798-BE4A-3E44-91F9-C6D480479D0F}" srcOrd="1" destOrd="0" parTransId="{9F3F0030-DBCE-1E4E-9065-DB576A33C46D}" sibTransId="{88F37FA6-25AF-B44A-B90A-2E61B057D6F9}"/>
+    <dgm:cxn modelId="{FE98E740-F828-A54B-B9C9-3C7D2C6CCB50}" srcId="{273B9DA9-DB4F-1143-B310-F2729709A260}" destId="{B09BE9B4-6DC5-034F-8E96-FA65B4A0E20E}" srcOrd="0" destOrd="0" parTransId="{B7276EBE-FDEA-D04F-8386-2BE45A993BB7}" sibTransId="{F54ABB33-3D1C-B442-9380-58E443C9F748}"/>
     <dgm:cxn modelId="{46D5B06C-6BA5-2546-8133-B63B84BF5542}" type="presOf" srcId="{273B9DA9-DB4F-1143-B310-F2729709A260}" destId="{595E53A7-BD59-DB43-8BD1-52CC293142E8}" srcOrd="0" destOrd="0" presId="urn:microsoft.com/office/officeart/2005/8/layout/chevron2"/>
-    <dgm:cxn modelId="{0E2F536E-F002-B947-A926-3254765EB592}" srcId="{273B9DA9-DB4F-1143-B310-F2729709A260}" destId="{196FE557-64AE-5341-9D44-71650117F63B}" srcOrd="0" destOrd="0" parTransId="{7138C314-33EA-7346-A110-3316302B0E4F}" sibTransId="{E623E65E-5427-704A-A32E-9A6DC0383EBB}"/>
-    <dgm:cxn modelId="{D9A87A75-272D-094A-972F-E285199ECDBA}" srcId="{196FE557-64AE-5341-9D44-71650117F63B}" destId="{8F3DEA4B-71A5-F348-B3D8-280B5092E57B}" srcOrd="0" destOrd="0" parTransId="{F1F9811D-5DD0-5049-8FF1-DC24ACDBDDE7}" sibTransId="{D7A39830-48BB-6A49-AE06-1815DAEF1195}"/>
     <dgm:cxn modelId="{A84059B2-136D-D84C-AD57-38FD2DD1C4B5}" type="presOf" srcId="{B09BE9B4-6DC5-034F-8E96-FA65B4A0E20E}" destId="{7A2EC0E8-A254-7E4C-A5A9-2943A4792BE9}" srcOrd="0" destOrd="0" presId="urn:microsoft.com/office/officeart/2005/8/layout/chevron2"/>
-    <dgm:cxn modelId="{F993D5B7-592A-7A47-8C15-6DF4AE5AD7E6}" srcId="{273B9DA9-DB4F-1143-B310-F2729709A260}" destId="{E3073277-69A1-9D40-B0EB-10E04BFF0043}" srcOrd="1" destOrd="0" parTransId="{96F58729-3396-474C-BD72-954CD9177BB7}" sibTransId="{5FC6E58E-A679-0645-98A4-BF3C4B33FC4A}"/>
-    <dgm:cxn modelId="{08736E93-D668-F14C-B307-1E46109D3882}" type="presParOf" srcId="{595E53A7-BD59-DB43-8BD1-52CC293142E8}" destId="{84B495F1-FEEA-794F-A0A2-F87DF842484D}" srcOrd="0" destOrd="0" presId="urn:microsoft.com/office/officeart/2005/8/layout/chevron2"/>
-    <dgm:cxn modelId="{5448026C-135E-5B41-8A32-A5F87916E7F2}" type="presParOf" srcId="{84B495F1-FEEA-794F-A0A2-F87DF842484D}" destId="{99A5FD1B-91DB-2842-9636-E5A790233E79}" srcOrd="0" destOrd="0" presId="urn:microsoft.com/office/officeart/2005/8/layout/chevron2"/>
-    <dgm:cxn modelId="{AD440EB6-CC10-8945-B9D2-2EBF382BEF66}" type="presParOf" srcId="{84B495F1-FEEA-794F-A0A2-F87DF842484D}" destId="{2637CEAD-EA99-9044-9148-1EF72D751351}" srcOrd="1" destOrd="0" presId="urn:microsoft.com/office/officeart/2005/8/layout/chevron2"/>
-    <dgm:cxn modelId="{27FC7072-82D9-8245-87C9-A66356577EBF}" type="presParOf" srcId="{595E53A7-BD59-DB43-8BD1-52CC293142E8}" destId="{F18EFCD4-0681-3348-BBA0-1855DD5BAD72}" srcOrd="1" destOrd="0" presId="urn:microsoft.com/office/officeart/2005/8/layout/chevron2"/>
-    <dgm:cxn modelId="{EE805429-BDD3-9F44-B488-DDD0B6E259E6}" type="presParOf" srcId="{595E53A7-BD59-DB43-8BD1-52CC293142E8}" destId="{D3DDC0DC-2176-AC4D-8B19-F273D0258EFA}" srcOrd="2" destOrd="0" presId="urn:microsoft.com/office/officeart/2005/8/layout/chevron2"/>
-    <dgm:cxn modelId="{52A7D97A-EFC8-2646-AF23-4E9CD81E46B8}" type="presParOf" srcId="{D3DDC0DC-2176-AC4D-8B19-F273D0258EFA}" destId="{DC4BE693-26D0-5B4B-91CA-15A22285CF71}" srcOrd="0" destOrd="0" presId="urn:microsoft.com/office/officeart/2005/8/layout/chevron2"/>
-    <dgm:cxn modelId="{54A380F2-8527-6640-AC5D-C65A9B1DA16F}" type="presParOf" srcId="{D3DDC0DC-2176-AC4D-8B19-F273D0258EFA}" destId="{05F70A16-A5CA-5445-B409-FC47219F053B}" srcOrd="1" destOrd="0" presId="urn:microsoft.com/office/officeart/2005/8/layout/chevron2"/>
-    <dgm:cxn modelId="{2BDA149D-8CF2-9546-A271-55BC9B44A952}" type="presParOf" srcId="{595E53A7-BD59-DB43-8BD1-52CC293142E8}" destId="{457BA5DB-5165-F246-9995-D4873C3B3823}" srcOrd="3" destOrd="0" presId="urn:microsoft.com/office/officeart/2005/8/layout/chevron2"/>
-    <dgm:cxn modelId="{42B651CB-8287-B045-BF6D-4635E6C84513}" type="presParOf" srcId="{595E53A7-BD59-DB43-8BD1-52CC293142E8}" destId="{4E1F5DB8-BD3F-E84B-96A7-BDF1C9364F3A}" srcOrd="4" destOrd="0" presId="urn:microsoft.com/office/officeart/2005/8/layout/chevron2"/>
+    <dgm:cxn modelId="{42B651CB-8287-B045-BF6D-4635E6C84513}" type="presParOf" srcId="{595E53A7-BD59-DB43-8BD1-52CC293142E8}" destId="{4E1F5DB8-BD3F-E84B-96A7-BDF1C9364F3A}" srcOrd="0" destOrd="0" presId="urn:microsoft.com/office/officeart/2005/8/layout/chevron2"/>
     <dgm:cxn modelId="{E8AC2835-E39C-B348-AF3A-5332791FDBE6}" type="presParOf" srcId="{4E1F5DB8-BD3F-E84B-96A7-BDF1C9364F3A}" destId="{7A2EC0E8-A254-7E4C-A5A9-2943A4792BE9}" srcOrd="0" destOrd="0" presId="urn:microsoft.com/office/officeart/2005/8/layout/chevron2"/>
     <dgm:cxn modelId="{1699B884-C2C8-1440-97A4-03ADF1DC2093}" type="presParOf" srcId="{4E1F5DB8-BD3F-E84B-96A7-BDF1C9364F3A}" destId="{5F730E07-D20A-B74D-AC3F-EBAFC1E70EF0}" srcOrd="1" destOrd="0" presId="urn:microsoft.com/office/officeart/2005/8/layout/chevron2"/>
-    <dgm:cxn modelId="{3C66FB0F-C4FE-A14B-B2FF-6B1FBF5C8524}" type="presParOf" srcId="{595E53A7-BD59-DB43-8BD1-52CC293142E8}" destId="{B26866B0-9D17-9049-B970-DBAAF512FA8E}" srcOrd="5" destOrd="0" presId="urn:microsoft.com/office/officeart/2005/8/layout/chevron2"/>
-    <dgm:cxn modelId="{180E09C9-89A8-5D47-AB10-112E13D7D201}" type="presParOf" srcId="{595E53A7-BD59-DB43-8BD1-52CC293142E8}" destId="{2585C671-91D6-9A4B-8C99-4A77A5249D2A}" srcOrd="6" destOrd="0" presId="urn:microsoft.com/office/officeart/2005/8/layout/chevron2"/>
+    <dgm:cxn modelId="{3C66FB0F-C4FE-A14B-B2FF-6B1FBF5C8524}" type="presParOf" srcId="{595E53A7-BD59-DB43-8BD1-52CC293142E8}" destId="{B26866B0-9D17-9049-B970-DBAAF512FA8E}" srcOrd="1" destOrd="0" presId="urn:microsoft.com/office/officeart/2005/8/layout/chevron2"/>
+    <dgm:cxn modelId="{180E09C9-89A8-5D47-AB10-112E13D7D201}" type="presParOf" srcId="{595E53A7-BD59-DB43-8BD1-52CC293142E8}" destId="{2585C671-91D6-9A4B-8C99-4A77A5249D2A}" srcOrd="2" destOrd="0" presId="urn:microsoft.com/office/officeart/2005/8/layout/chevron2"/>
     <dgm:cxn modelId="{89CFB1CD-7357-2A49-8F5E-136F203C6ED6}" type="presParOf" srcId="{2585C671-91D6-9A4B-8C99-4A77A5249D2A}" destId="{F670D4C5-F516-5C4C-A5BB-937ED38A7F71}" srcOrd="0" destOrd="0" presId="urn:microsoft.com/office/officeart/2005/8/layout/chevron2"/>
     <dgm:cxn modelId="{79762E48-3271-594D-B633-5C1CE5764231}" type="presParOf" srcId="{2585C671-91D6-9A4B-8C99-4A77A5249D2A}" destId="{908F1443-8FFD-1048-A979-BC26D9CCBC55}" srcOrd="1" destOrd="0" presId="urn:microsoft.com/office/officeart/2005/8/layout/chevron2"/>
   </dgm:cxnLst>
@@ -2302,7 +2879,7 @@
   <dgm:whole/>
   <dgm:extLst>
     <a:ext uri="http://schemas.microsoft.com/office/drawing/2008/diagram">
-      <dsp:dataModelExt xmlns:dsp="http://schemas.microsoft.com/office/drawing/2008/diagram" relId="rId15" minVer="http://schemas.openxmlformats.org/drawingml/2006/diagram"/>
+      <dsp:dataModelExt xmlns:dsp="http://schemas.microsoft.com/office/drawing/2008/diagram" relId="rId20" minVer="http://schemas.openxmlformats.org/drawingml/2006/diagram"/>
     </a:ext>
   </dgm:extLst>
 </dgm:dataModel>
@@ -2316,289 +2893,6 @@
       <dsp:cNvGrpSpPr/>
     </dsp:nvGrpSpPr>
     <dsp:grpSpPr/>
-    <dsp:sp modelId="{99A5FD1B-91DB-2842-9636-E5A790233E79}">
-      <dsp:nvSpPr>
-        <dsp:cNvPr id="0" name=""/>
-        <dsp:cNvSpPr/>
-      </dsp:nvSpPr>
-      <dsp:spPr>
-        <a:xfrm rot="5400000">
-          <a:off x="-223580" y="225049"/>
-          <a:ext cx="1490782" cy="1043620"/>
-        </a:xfrm>
-        <a:prstGeom prst="chevron">
-          <a:avLst/>
-        </a:prstGeom>
-        <a:solidFill>
-          <a:schemeClr val="accent1">
-            <a:hueOff val="0"/>
-            <a:satOff val="0"/>
-            <a:lumOff val="0"/>
-            <a:alphaOff val="0"/>
-          </a:schemeClr>
-        </a:solidFill>
-        <a:ln w="12700" cap="flat" cmpd="sng" algn="ctr">
-          <a:solidFill>
-            <a:schemeClr val="accent1">
-              <a:hueOff val="0"/>
-              <a:satOff val="0"/>
-              <a:lumOff val="0"/>
-              <a:alphaOff val="0"/>
-            </a:schemeClr>
-          </a:solidFill>
-          <a:prstDash val="solid"/>
-          <a:miter lim="800000"/>
-        </a:ln>
-        <a:effectLst/>
-      </dsp:spPr>
-      <dsp:style>
-        <a:lnRef idx="2">
-          <a:scrgbClr r="0" g="0" b="0"/>
-        </a:lnRef>
-        <a:fillRef idx="1">
-          <a:scrgbClr r="0" g="0" b="0"/>
-        </a:fillRef>
-        <a:effectRef idx="0">
-          <a:scrgbClr r="0" g="0" b="0"/>
-        </a:effectRef>
-        <a:fontRef idx="minor">
-          <a:schemeClr val="lt1"/>
-        </a:fontRef>
-      </dsp:style>
-      <dsp:txBody>
-        <a:bodyPr spcFirstLastPara="0" vert="horz" wrap="square" lIns="8255" tIns="8255" rIns="8255" bIns="8255" numCol="1" spcCol="1270" anchor="ctr" anchorCtr="0">
-          <a:noAutofit/>
-        </a:bodyPr>
-        <a:lstStyle/>
-        <a:p>
-          <a:pPr marL="0" lvl="0" indent="0" algn="ctr" defTabSz="577850">
-            <a:lnSpc>
-              <a:spcPct val="90000"/>
-            </a:lnSpc>
-            <a:spcBef>
-              <a:spcPct val="0"/>
-            </a:spcBef>
-            <a:spcAft>
-              <a:spcPct val="35000"/>
-            </a:spcAft>
-            <a:buNone/>
-          </a:pPr>
-          <a:r>
-            <a:rPr lang="en-US" sz="1300" kern="1200" dirty="0">
-              <a:latin typeface="Avenir Book" panose="02000503020000020003" pitchFamily="2" charset="0"/>
-            </a:rPr>
-            <a:t>Programming Language</a:t>
-          </a:r>
-        </a:p>
-      </dsp:txBody>
-      <dsp:txXfrm rot="-5400000">
-        <a:off x="1" y="523278"/>
-        <a:ext cx="1043620" cy="447162"/>
-      </dsp:txXfrm>
-    </dsp:sp>
-    <dsp:sp modelId="{2637CEAD-EA99-9044-9148-1EF72D751351}">
-      <dsp:nvSpPr>
-        <dsp:cNvPr id="0" name=""/>
-        <dsp:cNvSpPr/>
-      </dsp:nvSpPr>
-      <dsp:spPr>
-        <a:xfrm rot="5400000">
-          <a:off x="1859941" y="-814852"/>
-          <a:ext cx="969076" cy="2601718"/>
-        </a:xfrm>
-        <a:prstGeom prst="round2SameRect">
-          <a:avLst/>
-        </a:prstGeom>
-        <a:solidFill>
-          <a:schemeClr val="lt1">
-            <a:alpha val="90000"/>
-            <a:hueOff val="0"/>
-            <a:satOff val="0"/>
-            <a:lumOff val="0"/>
-            <a:alphaOff val="0"/>
-          </a:schemeClr>
-        </a:solidFill>
-        <a:ln w="12700" cap="flat" cmpd="sng" algn="ctr">
-          <a:solidFill>
-            <a:schemeClr val="accent1">
-              <a:hueOff val="0"/>
-              <a:satOff val="0"/>
-              <a:lumOff val="0"/>
-              <a:alphaOff val="0"/>
-            </a:schemeClr>
-          </a:solidFill>
-          <a:prstDash val="solid"/>
-          <a:miter lim="800000"/>
-        </a:ln>
-        <a:effectLst/>
-      </dsp:spPr>
-      <dsp:style>
-        <a:lnRef idx="2">
-          <a:scrgbClr r="0" g="0" b="0"/>
-        </a:lnRef>
-        <a:fillRef idx="1">
-          <a:scrgbClr r="0" g="0" b="0"/>
-        </a:fillRef>
-        <a:effectRef idx="0">
-          <a:scrgbClr r="0" g="0" b="0"/>
-        </a:effectRef>
-        <a:fontRef idx="minor"/>
-      </dsp:style>
-      <dsp:txBody>
-        <a:bodyPr spcFirstLastPara="0" vert="horz" wrap="square" lIns="405384" tIns="36195" rIns="36195" bIns="36195" numCol="1" spcCol="1270" anchor="ctr" anchorCtr="0">
-          <a:noAutofit/>
-        </a:bodyPr>
-        <a:lstStyle/>
-        <a:p>
-          <a:pPr marL="285750" lvl="1" indent="-285750" algn="l" defTabSz="2533650">
-            <a:lnSpc>
-              <a:spcPct val="90000"/>
-            </a:lnSpc>
-            <a:spcBef>
-              <a:spcPct val="0"/>
-            </a:spcBef>
-            <a:spcAft>
-              <a:spcPct val="15000"/>
-            </a:spcAft>
-            <a:buChar char="•"/>
-          </a:pPr>
-          <a:endParaRPr lang="en-US" sz="5700" kern="1200" dirty="0"/>
-        </a:p>
-      </dsp:txBody>
-      <dsp:txXfrm rot="-5400000">
-        <a:off x="1043620" y="48775"/>
-        <a:ext cx="2554412" cy="874464"/>
-      </dsp:txXfrm>
-    </dsp:sp>
-    <dsp:sp modelId="{DC4BE693-26D0-5B4B-91CA-15A22285CF71}">
-      <dsp:nvSpPr>
-        <dsp:cNvPr id="0" name=""/>
-        <dsp:cNvSpPr/>
-      </dsp:nvSpPr>
-      <dsp:spPr>
-        <a:xfrm rot="5400000">
-          <a:off x="-223633" y="1533312"/>
-          <a:ext cx="1490886" cy="1043620"/>
-        </a:xfrm>
-        <a:prstGeom prst="chevron">
-          <a:avLst/>
-        </a:prstGeom>
-        <a:solidFill>
-          <a:schemeClr val="accent1">
-            <a:hueOff val="0"/>
-            <a:satOff val="0"/>
-            <a:lumOff val="0"/>
-            <a:alphaOff val="0"/>
-          </a:schemeClr>
-        </a:solidFill>
-        <a:ln w="12700" cap="flat" cmpd="sng" algn="ctr">
-          <a:solidFill>
-            <a:schemeClr val="accent1">
-              <a:hueOff val="0"/>
-              <a:satOff val="0"/>
-              <a:lumOff val="0"/>
-              <a:alphaOff val="0"/>
-            </a:schemeClr>
-          </a:solidFill>
-          <a:prstDash val="solid"/>
-          <a:miter lim="800000"/>
-        </a:ln>
-        <a:effectLst/>
-      </dsp:spPr>
-      <dsp:style>
-        <a:lnRef idx="2">
-          <a:scrgbClr r="0" g="0" b="0"/>
-        </a:lnRef>
-        <a:fillRef idx="1">
-          <a:scrgbClr r="0" g="0" b="0"/>
-        </a:fillRef>
-        <a:effectRef idx="0">
-          <a:scrgbClr r="0" g="0" b="0"/>
-        </a:effectRef>
-        <a:fontRef idx="minor">
-          <a:schemeClr val="lt1"/>
-        </a:fontRef>
-      </dsp:style>
-      <dsp:txBody>
-        <a:bodyPr spcFirstLastPara="0" vert="horz" wrap="square" lIns="8890" tIns="8890" rIns="8890" bIns="8890" numCol="1" spcCol="1270" anchor="ctr" anchorCtr="0">
-          <a:noAutofit/>
-        </a:bodyPr>
-        <a:lstStyle/>
-        <a:p>
-          <a:pPr marL="0" lvl="0" indent="0" algn="ctr" defTabSz="622300">
-            <a:lnSpc>
-              <a:spcPct val="90000"/>
-            </a:lnSpc>
-            <a:spcBef>
-              <a:spcPct val="0"/>
-            </a:spcBef>
-            <a:spcAft>
-              <a:spcPct val="35000"/>
-            </a:spcAft>
-            <a:buNone/>
-          </a:pPr>
-          <a:r>
-            <a:rPr lang="en-US" sz="1400" kern="1200" dirty="0">
-              <a:latin typeface="Avenir Book" panose="02000503020000020003" pitchFamily="2" charset="0"/>
-            </a:rPr>
-            <a:t>Assembly</a:t>
-          </a:r>
-        </a:p>
-      </dsp:txBody>
-      <dsp:txXfrm rot="-5400000">
-        <a:off x="0" y="1831489"/>
-        <a:ext cx="1043620" cy="447266"/>
-      </dsp:txXfrm>
-    </dsp:sp>
-    <dsp:sp modelId="{05F70A16-A5CA-5445-B409-FC47219F053B}">
-      <dsp:nvSpPr>
-        <dsp:cNvPr id="0" name=""/>
-        <dsp:cNvSpPr/>
-      </dsp:nvSpPr>
-      <dsp:spPr>
-        <a:xfrm rot="5400000">
-          <a:off x="1859941" y="493358"/>
-          <a:ext cx="969076" cy="2601718"/>
-        </a:xfrm>
-        <a:prstGeom prst="round2SameRect">
-          <a:avLst/>
-        </a:prstGeom>
-        <a:solidFill>
-          <a:schemeClr val="lt1">
-            <a:alpha val="90000"/>
-            <a:hueOff val="0"/>
-            <a:satOff val="0"/>
-            <a:lumOff val="0"/>
-            <a:alphaOff val="0"/>
-          </a:schemeClr>
-        </a:solidFill>
-        <a:ln w="12700" cap="flat" cmpd="sng" algn="ctr">
-          <a:solidFill>
-            <a:schemeClr val="accent1">
-              <a:hueOff val="0"/>
-              <a:satOff val="0"/>
-              <a:lumOff val="0"/>
-              <a:alphaOff val="0"/>
-            </a:schemeClr>
-          </a:solidFill>
-          <a:prstDash val="solid"/>
-          <a:miter lim="800000"/>
-        </a:ln>
-        <a:effectLst/>
-      </dsp:spPr>
-      <dsp:style>
-        <a:lnRef idx="2">
-          <a:scrgbClr r="0" g="0" b="0"/>
-        </a:lnRef>
-        <a:fillRef idx="1">
-          <a:scrgbClr r="0" g="0" b="0"/>
-        </a:fillRef>
-        <a:effectRef idx="0">
-          <a:scrgbClr r="0" g="0" b="0"/>
-        </a:effectRef>
-        <a:fontRef idx="minor"/>
-      </dsp:style>
-    </dsp:sp>
     <dsp:sp modelId="{7A2EC0E8-A254-7E4C-A5A9-2943A4792BE9}">
       <dsp:nvSpPr>
         <dsp:cNvPr id="0" name=""/>
@@ -2606,8 +2900,8 @@
       </dsp:nvSpPr>
       <dsp:spPr>
         <a:xfrm rot="5400000">
-          <a:off x="-223633" y="2841629"/>
-          <a:ext cx="1490886" cy="1043620"/>
+          <a:off x="-231851" y="232428"/>
+          <a:ext cx="1545676" cy="1081973"/>
         </a:xfrm>
         <a:prstGeom prst="chevron">
           <a:avLst/>
@@ -2675,8 +2969,8 @@
         </a:p>
       </dsp:txBody>
       <dsp:txXfrm rot="-5400000">
-        <a:off x="0" y="3139806"/>
-        <a:ext cx="1043620" cy="447266"/>
+        <a:off x="1" y="541564"/>
+        <a:ext cx="1081973" cy="463703"/>
       </dsp:txXfrm>
     </dsp:sp>
     <dsp:sp modelId="{5F730E07-D20A-B74D-AC3F-EBAFC1E70EF0}">
@@ -2686,8 +2980,8 @@
       </dsp:nvSpPr>
       <dsp:spPr>
         <a:xfrm rot="5400000">
-          <a:off x="1859941" y="1801675"/>
-          <a:ext cx="969076" cy="2601718"/>
+          <a:off x="1861311" y="-778760"/>
+          <a:ext cx="1004689" cy="2563365"/>
         </a:xfrm>
         <a:prstGeom prst="round2SameRect">
           <a:avLst/>
@@ -2735,8 +3029,8 @@
       </dsp:nvSpPr>
       <dsp:spPr>
         <a:xfrm rot="5400000">
-          <a:off x="-223633" y="4149945"/>
-          <a:ext cx="1490886" cy="1043620"/>
+          <a:off x="-231851" y="1482016"/>
+          <a:ext cx="1545676" cy="1081973"/>
         </a:xfrm>
         <a:prstGeom prst="chevron">
           <a:avLst/>
@@ -2804,8 +3098,8 @@
         </a:p>
       </dsp:txBody>
       <dsp:txXfrm rot="-5400000">
-        <a:off x="0" y="4448122"/>
-        <a:ext cx="1043620" cy="447266"/>
+        <a:off x="1" y="1791152"/>
+        <a:ext cx="1081973" cy="463703"/>
       </dsp:txXfrm>
     </dsp:sp>
     <dsp:sp modelId="{908F1443-8FFD-1048-A979-BC26D9CCBC55}">
@@ -2815,8 +3109,8 @@
       </dsp:nvSpPr>
       <dsp:spPr>
         <a:xfrm rot="5400000">
-          <a:off x="1859941" y="3109991"/>
-          <a:ext cx="969076" cy="2601718"/>
+          <a:off x="1861311" y="470827"/>
+          <a:ext cx="1004689" cy="2563365"/>
         </a:xfrm>
         <a:prstGeom prst="round2SameRect">
           <a:avLst/>
@@ -2869,289 +3163,6 @@
       <dsp:cNvGrpSpPr/>
     </dsp:nvGrpSpPr>
     <dsp:grpSpPr/>
-    <dsp:sp modelId="{99A5FD1B-91DB-2842-9636-E5A790233E79}">
-      <dsp:nvSpPr>
-        <dsp:cNvPr id="0" name=""/>
-        <dsp:cNvSpPr/>
-      </dsp:nvSpPr>
-      <dsp:spPr>
-        <a:xfrm rot="5400000">
-          <a:off x="-223580" y="225049"/>
-          <a:ext cx="1490782" cy="1043620"/>
-        </a:xfrm>
-        <a:prstGeom prst="chevron">
-          <a:avLst/>
-        </a:prstGeom>
-        <a:solidFill>
-          <a:schemeClr val="accent1">
-            <a:hueOff val="0"/>
-            <a:satOff val="0"/>
-            <a:lumOff val="0"/>
-            <a:alphaOff val="0"/>
-          </a:schemeClr>
-        </a:solidFill>
-        <a:ln w="12700" cap="flat" cmpd="sng" algn="ctr">
-          <a:solidFill>
-            <a:schemeClr val="accent1">
-              <a:hueOff val="0"/>
-              <a:satOff val="0"/>
-              <a:lumOff val="0"/>
-              <a:alphaOff val="0"/>
-            </a:schemeClr>
-          </a:solidFill>
-          <a:prstDash val="solid"/>
-          <a:miter lim="800000"/>
-        </a:ln>
-        <a:effectLst/>
-      </dsp:spPr>
-      <dsp:style>
-        <a:lnRef idx="2">
-          <a:scrgbClr r="0" g="0" b="0"/>
-        </a:lnRef>
-        <a:fillRef idx="1">
-          <a:scrgbClr r="0" g="0" b="0"/>
-        </a:fillRef>
-        <a:effectRef idx="0">
-          <a:scrgbClr r="0" g="0" b="0"/>
-        </a:effectRef>
-        <a:fontRef idx="minor">
-          <a:schemeClr val="lt1"/>
-        </a:fontRef>
-      </dsp:style>
-      <dsp:txBody>
-        <a:bodyPr spcFirstLastPara="0" vert="horz" wrap="square" lIns="8255" tIns="8255" rIns="8255" bIns="8255" numCol="1" spcCol="1270" anchor="ctr" anchorCtr="0">
-          <a:noAutofit/>
-        </a:bodyPr>
-        <a:lstStyle/>
-        <a:p>
-          <a:pPr marL="0" lvl="0" indent="0" algn="ctr" defTabSz="577850">
-            <a:lnSpc>
-              <a:spcPct val="90000"/>
-            </a:lnSpc>
-            <a:spcBef>
-              <a:spcPct val="0"/>
-            </a:spcBef>
-            <a:spcAft>
-              <a:spcPct val="35000"/>
-            </a:spcAft>
-            <a:buNone/>
-          </a:pPr>
-          <a:r>
-            <a:rPr lang="en-US" sz="1300" kern="1200" dirty="0">
-              <a:latin typeface="Avenir Book" panose="02000503020000020003" pitchFamily="2" charset="0"/>
-            </a:rPr>
-            <a:t>Programming Language</a:t>
-          </a:r>
-        </a:p>
-      </dsp:txBody>
-      <dsp:txXfrm rot="-5400000">
-        <a:off x="1" y="523278"/>
-        <a:ext cx="1043620" cy="447162"/>
-      </dsp:txXfrm>
-    </dsp:sp>
-    <dsp:sp modelId="{2637CEAD-EA99-9044-9148-1EF72D751351}">
-      <dsp:nvSpPr>
-        <dsp:cNvPr id="0" name=""/>
-        <dsp:cNvSpPr/>
-      </dsp:nvSpPr>
-      <dsp:spPr>
-        <a:xfrm rot="5400000">
-          <a:off x="1859941" y="-814852"/>
-          <a:ext cx="969076" cy="2601718"/>
-        </a:xfrm>
-        <a:prstGeom prst="round2SameRect">
-          <a:avLst/>
-        </a:prstGeom>
-        <a:solidFill>
-          <a:schemeClr val="lt1">
-            <a:alpha val="90000"/>
-            <a:hueOff val="0"/>
-            <a:satOff val="0"/>
-            <a:lumOff val="0"/>
-            <a:alphaOff val="0"/>
-          </a:schemeClr>
-        </a:solidFill>
-        <a:ln w="12700" cap="flat" cmpd="sng" algn="ctr">
-          <a:solidFill>
-            <a:schemeClr val="accent1">
-              <a:hueOff val="0"/>
-              <a:satOff val="0"/>
-              <a:lumOff val="0"/>
-              <a:alphaOff val="0"/>
-            </a:schemeClr>
-          </a:solidFill>
-          <a:prstDash val="solid"/>
-          <a:miter lim="800000"/>
-        </a:ln>
-        <a:effectLst/>
-      </dsp:spPr>
-      <dsp:style>
-        <a:lnRef idx="2">
-          <a:scrgbClr r="0" g="0" b="0"/>
-        </a:lnRef>
-        <a:fillRef idx="1">
-          <a:scrgbClr r="0" g="0" b="0"/>
-        </a:fillRef>
-        <a:effectRef idx="0">
-          <a:scrgbClr r="0" g="0" b="0"/>
-        </a:effectRef>
-        <a:fontRef idx="minor"/>
-      </dsp:style>
-      <dsp:txBody>
-        <a:bodyPr spcFirstLastPara="0" vert="horz" wrap="square" lIns="405384" tIns="36195" rIns="36195" bIns="36195" numCol="1" spcCol="1270" anchor="ctr" anchorCtr="0">
-          <a:noAutofit/>
-        </a:bodyPr>
-        <a:lstStyle/>
-        <a:p>
-          <a:pPr marL="285750" lvl="1" indent="-285750" algn="l" defTabSz="2533650">
-            <a:lnSpc>
-              <a:spcPct val="90000"/>
-            </a:lnSpc>
-            <a:spcBef>
-              <a:spcPct val="0"/>
-            </a:spcBef>
-            <a:spcAft>
-              <a:spcPct val="15000"/>
-            </a:spcAft>
-            <a:buChar char="•"/>
-          </a:pPr>
-          <a:endParaRPr lang="en-US" sz="5700" kern="1200" dirty="0"/>
-        </a:p>
-      </dsp:txBody>
-      <dsp:txXfrm rot="-5400000">
-        <a:off x="1043620" y="48775"/>
-        <a:ext cx="2554412" cy="874464"/>
-      </dsp:txXfrm>
-    </dsp:sp>
-    <dsp:sp modelId="{DC4BE693-26D0-5B4B-91CA-15A22285CF71}">
-      <dsp:nvSpPr>
-        <dsp:cNvPr id="0" name=""/>
-        <dsp:cNvSpPr/>
-      </dsp:nvSpPr>
-      <dsp:spPr>
-        <a:xfrm rot="5400000">
-          <a:off x="-223633" y="1533312"/>
-          <a:ext cx="1490886" cy="1043620"/>
-        </a:xfrm>
-        <a:prstGeom prst="chevron">
-          <a:avLst/>
-        </a:prstGeom>
-        <a:solidFill>
-          <a:schemeClr val="accent1">
-            <a:hueOff val="0"/>
-            <a:satOff val="0"/>
-            <a:lumOff val="0"/>
-            <a:alphaOff val="0"/>
-          </a:schemeClr>
-        </a:solidFill>
-        <a:ln w="12700" cap="flat" cmpd="sng" algn="ctr">
-          <a:solidFill>
-            <a:schemeClr val="accent1">
-              <a:hueOff val="0"/>
-              <a:satOff val="0"/>
-              <a:lumOff val="0"/>
-              <a:alphaOff val="0"/>
-            </a:schemeClr>
-          </a:solidFill>
-          <a:prstDash val="solid"/>
-          <a:miter lim="800000"/>
-        </a:ln>
-        <a:effectLst/>
-      </dsp:spPr>
-      <dsp:style>
-        <a:lnRef idx="2">
-          <a:scrgbClr r="0" g="0" b="0"/>
-        </a:lnRef>
-        <a:fillRef idx="1">
-          <a:scrgbClr r="0" g="0" b="0"/>
-        </a:fillRef>
-        <a:effectRef idx="0">
-          <a:scrgbClr r="0" g="0" b="0"/>
-        </a:effectRef>
-        <a:fontRef idx="minor">
-          <a:schemeClr val="lt1"/>
-        </a:fontRef>
-      </dsp:style>
-      <dsp:txBody>
-        <a:bodyPr spcFirstLastPara="0" vert="horz" wrap="square" lIns="8890" tIns="8890" rIns="8890" bIns="8890" numCol="1" spcCol="1270" anchor="ctr" anchorCtr="0">
-          <a:noAutofit/>
-        </a:bodyPr>
-        <a:lstStyle/>
-        <a:p>
-          <a:pPr marL="0" lvl="0" indent="0" algn="ctr" defTabSz="622300">
-            <a:lnSpc>
-              <a:spcPct val="90000"/>
-            </a:lnSpc>
-            <a:spcBef>
-              <a:spcPct val="0"/>
-            </a:spcBef>
-            <a:spcAft>
-              <a:spcPct val="35000"/>
-            </a:spcAft>
-            <a:buNone/>
-          </a:pPr>
-          <a:r>
-            <a:rPr lang="en-US" sz="1400" kern="1200" dirty="0">
-              <a:latin typeface="Avenir Book" panose="02000503020000020003" pitchFamily="2" charset="0"/>
-            </a:rPr>
-            <a:t>Assembly</a:t>
-          </a:r>
-        </a:p>
-      </dsp:txBody>
-      <dsp:txXfrm rot="-5400000">
-        <a:off x="0" y="1831489"/>
-        <a:ext cx="1043620" cy="447266"/>
-      </dsp:txXfrm>
-    </dsp:sp>
-    <dsp:sp modelId="{05F70A16-A5CA-5445-B409-FC47219F053B}">
-      <dsp:nvSpPr>
-        <dsp:cNvPr id="0" name=""/>
-        <dsp:cNvSpPr/>
-      </dsp:nvSpPr>
-      <dsp:spPr>
-        <a:xfrm rot="5400000">
-          <a:off x="1859941" y="493358"/>
-          <a:ext cx="969076" cy="2601718"/>
-        </a:xfrm>
-        <a:prstGeom prst="round2SameRect">
-          <a:avLst/>
-        </a:prstGeom>
-        <a:solidFill>
-          <a:schemeClr val="lt1">
-            <a:alpha val="90000"/>
-            <a:hueOff val="0"/>
-            <a:satOff val="0"/>
-            <a:lumOff val="0"/>
-            <a:alphaOff val="0"/>
-          </a:schemeClr>
-        </a:solidFill>
-        <a:ln w="12700" cap="flat" cmpd="sng" algn="ctr">
-          <a:solidFill>
-            <a:schemeClr val="accent1">
-              <a:hueOff val="0"/>
-              <a:satOff val="0"/>
-              <a:lumOff val="0"/>
-              <a:alphaOff val="0"/>
-            </a:schemeClr>
-          </a:solidFill>
-          <a:prstDash val="solid"/>
-          <a:miter lim="800000"/>
-        </a:ln>
-        <a:effectLst/>
-      </dsp:spPr>
-      <dsp:style>
-        <a:lnRef idx="2">
-          <a:scrgbClr r="0" g="0" b="0"/>
-        </a:lnRef>
-        <a:fillRef idx="1">
-          <a:scrgbClr r="0" g="0" b="0"/>
-        </a:fillRef>
-        <a:effectRef idx="0">
-          <a:scrgbClr r="0" g="0" b="0"/>
-        </a:effectRef>
-        <a:fontRef idx="minor"/>
-      </dsp:style>
-    </dsp:sp>
     <dsp:sp modelId="{7A2EC0E8-A254-7E4C-A5A9-2943A4792BE9}">
       <dsp:nvSpPr>
         <dsp:cNvPr id="0" name=""/>
@@ -3159,8 +3170,8 @@
       </dsp:nvSpPr>
       <dsp:spPr>
         <a:xfrm rot="5400000">
-          <a:off x="-223633" y="2841629"/>
-          <a:ext cx="1490886" cy="1043620"/>
+          <a:off x="-231851" y="232428"/>
+          <a:ext cx="1545676" cy="1081973"/>
         </a:xfrm>
         <a:prstGeom prst="chevron">
           <a:avLst/>
@@ -3237,8 +3248,8 @@
         </a:p>
       </dsp:txBody>
       <dsp:txXfrm rot="-5400000">
-        <a:off x="0" y="3139806"/>
-        <a:ext cx="1043620" cy="447266"/>
+        <a:off x="1" y="541564"/>
+        <a:ext cx="1081973" cy="463703"/>
       </dsp:txXfrm>
     </dsp:sp>
     <dsp:sp modelId="{5F730E07-D20A-B74D-AC3F-EBAFC1E70EF0}">
@@ -3248,8 +3259,8 @@
       </dsp:nvSpPr>
       <dsp:spPr>
         <a:xfrm rot="5400000">
-          <a:off x="1859941" y="1801675"/>
-          <a:ext cx="969076" cy="2601718"/>
+          <a:off x="1861311" y="-778760"/>
+          <a:ext cx="1004689" cy="2563365"/>
         </a:xfrm>
         <a:prstGeom prst="round2SameRect">
           <a:avLst/>
@@ -3297,8 +3308,8 @@
       </dsp:nvSpPr>
       <dsp:spPr>
         <a:xfrm rot="5400000">
-          <a:off x="-223633" y="4149945"/>
-          <a:ext cx="1490886" cy="1043620"/>
+          <a:off x="-231851" y="1482016"/>
+          <a:ext cx="1545676" cy="1081973"/>
         </a:xfrm>
         <a:prstGeom prst="chevron">
           <a:avLst/>
@@ -3375,8 +3386,8 @@
         </a:p>
       </dsp:txBody>
       <dsp:txXfrm rot="-5400000">
-        <a:off x="0" y="4448122"/>
-        <a:ext cx="1043620" cy="447266"/>
+        <a:off x="1" y="1791152"/>
+        <a:ext cx="1081973" cy="463703"/>
       </dsp:txXfrm>
     </dsp:sp>
     <dsp:sp modelId="{908F1443-8FFD-1048-A979-BC26D9CCBC55}">
@@ -3386,8 +3397,278 @@
       </dsp:nvSpPr>
       <dsp:spPr>
         <a:xfrm rot="5400000">
-          <a:off x="1859941" y="3109991"/>
-          <a:ext cx="969076" cy="2601718"/>
+          <a:off x="1861311" y="470827"/>
+          <a:ext cx="1004689" cy="2563365"/>
+        </a:xfrm>
+        <a:prstGeom prst="round2SameRect">
+          <a:avLst/>
+        </a:prstGeom>
+        <a:solidFill>
+          <a:schemeClr val="lt1">
+            <a:alpha val="90000"/>
+            <a:hueOff val="0"/>
+            <a:satOff val="0"/>
+            <a:lumOff val="0"/>
+            <a:alphaOff val="0"/>
+          </a:schemeClr>
+        </a:solidFill>
+        <a:ln w="12700" cap="flat" cmpd="sng" algn="ctr">
+          <a:solidFill>
+            <a:schemeClr val="accent1">
+              <a:hueOff val="0"/>
+              <a:satOff val="0"/>
+              <a:lumOff val="0"/>
+              <a:alphaOff val="0"/>
+            </a:schemeClr>
+          </a:solidFill>
+          <a:prstDash val="solid"/>
+          <a:miter lim="800000"/>
+        </a:ln>
+        <a:effectLst/>
+      </dsp:spPr>
+      <dsp:style>
+        <a:lnRef idx="2">
+          <a:scrgbClr r="0" g="0" b="0"/>
+        </a:lnRef>
+        <a:fillRef idx="1">
+          <a:scrgbClr r="0" g="0" b="0"/>
+        </a:fillRef>
+        <a:effectRef idx="0">
+          <a:scrgbClr r="0" g="0" b="0"/>
+        </a:effectRef>
+        <a:fontRef idx="minor"/>
+      </dsp:style>
+    </dsp:sp>
+  </dsp:spTree>
+</dsp:drawing>
+</file>
+
+<file path=ppt/diagrams/drawing3.xml><?xml version="1.0" encoding="utf-8"?>
+<dsp:drawing xmlns:dgm="http://schemas.openxmlformats.org/drawingml/2006/diagram" xmlns:dsp="http://schemas.microsoft.com/office/drawing/2008/diagram" xmlns:a="http://schemas.openxmlformats.org/drawingml/2006/main">
+  <dsp:spTree>
+    <dsp:nvGrpSpPr>
+      <dsp:cNvPr id="0" name=""/>
+      <dsp:cNvGrpSpPr/>
+    </dsp:nvGrpSpPr>
+    <dsp:grpSpPr/>
+    <dsp:sp modelId="{7A2EC0E8-A254-7E4C-A5A9-2943A4792BE9}">
+      <dsp:nvSpPr>
+        <dsp:cNvPr id="0" name=""/>
+        <dsp:cNvSpPr/>
+      </dsp:nvSpPr>
+      <dsp:spPr>
+        <a:xfrm rot="5400000">
+          <a:off x="-231851" y="232428"/>
+          <a:ext cx="1545676" cy="1081973"/>
+        </a:xfrm>
+        <a:prstGeom prst="chevron">
+          <a:avLst/>
+        </a:prstGeom>
+        <a:solidFill>
+          <a:schemeClr val="accent1">
+            <a:hueOff val="0"/>
+            <a:satOff val="0"/>
+            <a:lumOff val="0"/>
+            <a:alphaOff val="0"/>
+          </a:schemeClr>
+        </a:solidFill>
+        <a:ln w="12700" cap="flat" cmpd="sng" algn="ctr">
+          <a:solidFill>
+            <a:schemeClr val="accent1">
+              <a:hueOff val="0"/>
+              <a:satOff val="0"/>
+              <a:lumOff val="0"/>
+              <a:alphaOff val="0"/>
+            </a:schemeClr>
+          </a:solidFill>
+          <a:prstDash val="solid"/>
+          <a:miter lim="800000"/>
+        </a:ln>
+        <a:effectLst/>
+      </dsp:spPr>
+      <dsp:style>
+        <a:lnRef idx="2">
+          <a:scrgbClr r="0" g="0" b="0"/>
+        </a:lnRef>
+        <a:fillRef idx="1">
+          <a:scrgbClr r="0" g="0" b="0"/>
+        </a:fillRef>
+        <a:effectRef idx="0">
+          <a:scrgbClr r="0" g="0" b="0"/>
+        </a:effectRef>
+        <a:fontRef idx="minor">
+          <a:schemeClr val="lt1"/>
+        </a:fontRef>
+      </dsp:style>
+      <dsp:txBody>
+        <a:bodyPr spcFirstLastPara="0" vert="horz" wrap="square" lIns="8890" tIns="8890" rIns="8890" bIns="8890" numCol="1" spcCol="1270" anchor="ctr" anchorCtr="0">
+          <a:noAutofit/>
+        </a:bodyPr>
+        <a:lstStyle/>
+        <a:p>
+          <a:pPr marL="0" lvl="0" indent="0" algn="ctr" defTabSz="608965">
+            <a:lnSpc>
+              <a:spcPct val="90000"/>
+            </a:lnSpc>
+            <a:spcBef>
+              <a:spcPct val="0"/>
+            </a:spcBef>
+            <a:spcAft>
+              <a:spcPct val="35000"/>
+            </a:spcAft>
+            <a:buNone/>
+          </a:pPr>
+          <a:r>
+            <a:rPr lang="en-US" sz="1370" kern="1200" dirty="0">
+              <a:latin typeface="Avenir Book" panose="02000503020000020003" pitchFamily="2" charset="0"/>
+            </a:rPr>
+            <a:t>Programming Language</a:t>
+          </a:r>
+        </a:p>
+      </dsp:txBody>
+      <dsp:txXfrm rot="-5400000">
+        <a:off x="1" y="541564"/>
+        <a:ext cx="1081973" cy="463703"/>
+      </dsp:txXfrm>
+    </dsp:sp>
+    <dsp:sp modelId="{5F730E07-D20A-B74D-AC3F-EBAFC1E70EF0}">
+      <dsp:nvSpPr>
+        <dsp:cNvPr id="0" name=""/>
+        <dsp:cNvSpPr/>
+      </dsp:nvSpPr>
+      <dsp:spPr>
+        <a:xfrm rot="5400000">
+          <a:off x="1861311" y="-778760"/>
+          <a:ext cx="1004689" cy="2563365"/>
+        </a:xfrm>
+        <a:prstGeom prst="round2SameRect">
+          <a:avLst/>
+        </a:prstGeom>
+        <a:solidFill>
+          <a:schemeClr val="lt1">
+            <a:alpha val="90000"/>
+            <a:hueOff val="0"/>
+            <a:satOff val="0"/>
+            <a:lumOff val="0"/>
+            <a:alphaOff val="0"/>
+          </a:schemeClr>
+        </a:solidFill>
+        <a:ln w="12700" cap="flat" cmpd="sng" algn="ctr">
+          <a:solidFill>
+            <a:schemeClr val="accent1">
+              <a:hueOff val="0"/>
+              <a:satOff val="0"/>
+              <a:lumOff val="0"/>
+              <a:alphaOff val="0"/>
+            </a:schemeClr>
+          </a:solidFill>
+          <a:prstDash val="solid"/>
+          <a:miter lim="800000"/>
+        </a:ln>
+        <a:effectLst/>
+      </dsp:spPr>
+      <dsp:style>
+        <a:lnRef idx="2">
+          <a:scrgbClr r="0" g="0" b="0"/>
+        </a:lnRef>
+        <a:fillRef idx="1">
+          <a:scrgbClr r="0" g="0" b="0"/>
+        </a:fillRef>
+        <a:effectRef idx="0">
+          <a:scrgbClr r="0" g="0" b="0"/>
+        </a:effectRef>
+        <a:fontRef idx="minor"/>
+      </dsp:style>
+    </dsp:sp>
+    <dsp:sp modelId="{F670D4C5-F516-5C4C-A5BB-937ED38A7F71}">
+      <dsp:nvSpPr>
+        <dsp:cNvPr id="0" name=""/>
+        <dsp:cNvSpPr/>
+      </dsp:nvSpPr>
+      <dsp:spPr>
+        <a:xfrm rot="5400000">
+          <a:off x="-231851" y="1482016"/>
+          <a:ext cx="1545676" cy="1081973"/>
+        </a:xfrm>
+        <a:prstGeom prst="chevron">
+          <a:avLst/>
+        </a:prstGeom>
+        <a:solidFill>
+          <a:schemeClr val="accent1">
+            <a:hueOff val="0"/>
+            <a:satOff val="0"/>
+            <a:lumOff val="0"/>
+            <a:alphaOff val="0"/>
+          </a:schemeClr>
+        </a:solidFill>
+        <a:ln w="12700" cap="flat" cmpd="sng" algn="ctr">
+          <a:solidFill>
+            <a:schemeClr val="accent1">
+              <a:hueOff val="0"/>
+              <a:satOff val="0"/>
+              <a:lumOff val="0"/>
+              <a:alphaOff val="0"/>
+            </a:schemeClr>
+          </a:solidFill>
+          <a:prstDash val="solid"/>
+          <a:miter lim="800000"/>
+        </a:ln>
+        <a:effectLst/>
+      </dsp:spPr>
+      <dsp:style>
+        <a:lnRef idx="2">
+          <a:scrgbClr r="0" g="0" b="0"/>
+        </a:lnRef>
+        <a:fillRef idx="1">
+          <a:scrgbClr r="0" g="0" b="0"/>
+        </a:fillRef>
+        <a:effectRef idx="0">
+          <a:scrgbClr r="0" g="0" b="0"/>
+        </a:effectRef>
+        <a:fontRef idx="minor">
+          <a:schemeClr val="lt1"/>
+        </a:fontRef>
+      </dsp:style>
+      <dsp:txBody>
+        <a:bodyPr spcFirstLastPara="0" vert="horz" wrap="square" lIns="8890" tIns="8890" rIns="8890" bIns="8890" numCol="1" spcCol="1270" anchor="ctr" anchorCtr="0">
+          <a:noAutofit/>
+        </a:bodyPr>
+        <a:lstStyle/>
+        <a:p>
+          <a:pPr marL="0" lvl="0" indent="0" algn="ctr" defTabSz="622300">
+            <a:lnSpc>
+              <a:spcPct val="90000"/>
+            </a:lnSpc>
+            <a:spcBef>
+              <a:spcPct val="0"/>
+            </a:spcBef>
+            <a:spcAft>
+              <a:spcPct val="35000"/>
+            </a:spcAft>
+            <a:buNone/>
+          </a:pPr>
+          <a:r>
+            <a:rPr lang="en-US" sz="1400" kern="1200" dirty="0">
+              <a:latin typeface="Avenir Book" panose="02000503020000020003" pitchFamily="2" charset="0"/>
+            </a:rPr>
+            <a:t>Assembly</a:t>
+          </a:r>
+        </a:p>
+      </dsp:txBody>
+      <dsp:txXfrm rot="-5400000">
+        <a:off x="1" y="1791152"/>
+        <a:ext cx="1081973" cy="463703"/>
+      </dsp:txXfrm>
+    </dsp:sp>
+    <dsp:sp modelId="{908F1443-8FFD-1048-A979-BC26D9CCBC55}">
+      <dsp:nvSpPr>
+        <dsp:cNvPr id="0" name=""/>
+        <dsp:cNvSpPr/>
+      </dsp:nvSpPr>
+      <dsp:spPr>
+        <a:xfrm rot="5400000">
+          <a:off x="1861311" y="470827"/>
+          <a:ext cx="1004689" cy="2563365"/>
         </a:xfrm>
         <a:prstGeom prst="round2SameRect">
           <a:avLst/>
@@ -3944,6 +4225,262 @@
 </dgm:layoutDef>
 </file>
 
+<file path=ppt/diagrams/layout3.xml><?xml version="1.0" encoding="utf-8"?>
+<dgm:layoutDef xmlns:dgm="http://schemas.openxmlformats.org/drawingml/2006/diagram" xmlns:a="http://schemas.openxmlformats.org/drawingml/2006/main" uniqueId="urn:microsoft.com/office/officeart/2005/8/layout/chevron2">
+  <dgm:title val=""/>
+  <dgm:desc val=""/>
+  <dgm:catLst>
+    <dgm:cat type="process" pri="12000"/>
+    <dgm:cat type="list" pri="16000"/>
+    <dgm:cat type="convert" pri="11000"/>
+  </dgm:catLst>
+  <dgm:sampData>
+    <dgm:dataModel>
+      <dgm:ptLst>
+        <dgm:pt modelId="0" type="doc"/>
+        <dgm:pt modelId="1">
+          <dgm:prSet phldr="1"/>
+        </dgm:pt>
+        <dgm:pt modelId="11">
+          <dgm:prSet phldr="1"/>
+        </dgm:pt>
+        <dgm:pt modelId="12">
+          <dgm:prSet phldr="1"/>
+        </dgm:pt>
+        <dgm:pt modelId="2">
+          <dgm:prSet phldr="1"/>
+        </dgm:pt>
+        <dgm:pt modelId="21">
+          <dgm:prSet phldr="1"/>
+        </dgm:pt>
+        <dgm:pt modelId="22">
+          <dgm:prSet phldr="1"/>
+        </dgm:pt>
+        <dgm:pt modelId="3">
+          <dgm:prSet phldr="1"/>
+        </dgm:pt>
+        <dgm:pt modelId="31">
+          <dgm:prSet phldr="1"/>
+        </dgm:pt>
+        <dgm:pt modelId="32">
+          <dgm:prSet phldr="1"/>
+        </dgm:pt>
+      </dgm:ptLst>
+      <dgm:cxnLst>
+        <dgm:cxn modelId="4" srcId="0" destId="1" srcOrd="0" destOrd="0"/>
+        <dgm:cxn modelId="5" srcId="0" destId="2" srcOrd="1" destOrd="0"/>
+        <dgm:cxn modelId="6" srcId="0" destId="3" srcOrd="2" destOrd="0"/>
+        <dgm:cxn modelId="13" srcId="1" destId="11" srcOrd="0" destOrd="0"/>
+        <dgm:cxn modelId="14" srcId="1" destId="12" srcOrd="1" destOrd="0"/>
+        <dgm:cxn modelId="23" srcId="2" destId="21" srcOrd="0" destOrd="0"/>
+        <dgm:cxn modelId="24" srcId="2" destId="22" srcOrd="1" destOrd="0"/>
+        <dgm:cxn modelId="33" srcId="3" destId="31" srcOrd="0" destOrd="0"/>
+        <dgm:cxn modelId="34" srcId="3" destId="32" srcOrd="1" destOrd="0"/>
+      </dgm:cxnLst>
+      <dgm:bg/>
+      <dgm:whole/>
+    </dgm:dataModel>
+  </dgm:sampData>
+  <dgm:styleData>
+    <dgm:dataModel>
+      <dgm:ptLst>
+        <dgm:pt modelId="0" type="doc"/>
+        <dgm:pt modelId="1"/>
+      </dgm:ptLst>
+      <dgm:cxnLst>
+        <dgm:cxn modelId="4" srcId="0" destId="1" srcOrd="0" destOrd="0"/>
+      </dgm:cxnLst>
+      <dgm:bg/>
+      <dgm:whole/>
+    </dgm:dataModel>
+  </dgm:styleData>
+  <dgm:clrData>
+    <dgm:dataModel>
+      <dgm:ptLst>
+        <dgm:pt modelId="0" type="doc"/>
+        <dgm:pt modelId="1"/>
+        <dgm:pt modelId="11"/>
+        <dgm:pt modelId="2"/>
+        <dgm:pt modelId="21"/>
+        <dgm:pt modelId="3"/>
+        <dgm:pt modelId="31"/>
+        <dgm:pt modelId="4"/>
+        <dgm:pt modelId="41"/>
+      </dgm:ptLst>
+      <dgm:cxnLst>
+        <dgm:cxn modelId="5" srcId="0" destId="1" srcOrd="0" destOrd="0"/>
+        <dgm:cxn modelId="6" srcId="0" destId="2" srcOrd="1" destOrd="0"/>
+        <dgm:cxn modelId="7" srcId="0" destId="3" srcOrd="2" destOrd="0"/>
+        <dgm:cxn modelId="8" srcId="0" destId="4" srcOrd="3" destOrd="0"/>
+        <dgm:cxn modelId="13" srcId="1" destId="11" srcOrd="0" destOrd="0"/>
+        <dgm:cxn modelId="23" srcId="2" destId="21" srcOrd="0" destOrd="0"/>
+        <dgm:cxn modelId="33" srcId="3" destId="31" srcOrd="0" destOrd="0"/>
+        <dgm:cxn modelId="43" srcId="4" destId="41" srcOrd="0" destOrd="0"/>
+      </dgm:cxnLst>
+      <dgm:bg/>
+      <dgm:whole/>
+    </dgm:dataModel>
+  </dgm:clrData>
+  <dgm:layoutNode name="linearFlow">
+    <dgm:varLst>
+      <dgm:dir/>
+      <dgm:animLvl val="lvl"/>
+      <dgm:resizeHandles val="exact"/>
+    </dgm:varLst>
+    <dgm:alg type="lin">
+      <dgm:param type="linDir" val="fromT"/>
+      <dgm:param type="nodeHorzAlign" val="l"/>
+    </dgm:alg>
+    <dgm:shape xmlns:r="http://schemas.openxmlformats.org/officeDocument/2006/relationships" r:blip="">
+      <dgm:adjLst/>
+    </dgm:shape>
+    <dgm:presOf/>
+    <dgm:constrLst>
+      <dgm:constr type="h" for="ch" forName="composite" refType="h"/>
+      <dgm:constr type="w" for="ch" forName="composite" refType="w"/>
+      <dgm:constr type="h" for="des" forName="parentText" op="equ"/>
+      <dgm:constr type="h" for="ch" forName="sp" val="-14.88"/>
+      <dgm:constr type="h" for="ch" forName="sp" refType="w" refFor="des" refForName="parentText" op="gte" fact="-0.3"/>
+      <dgm:constr type="primFontSz" for="des" forName="parentText" op="equ" val="65"/>
+      <dgm:constr type="primFontSz" for="des" forName="descendantText" op="equ" val="65"/>
+    </dgm:constrLst>
+    <dgm:ruleLst/>
+    <dgm:forEach name="Name0" axis="ch" ptType="node">
+      <dgm:layoutNode name="composite">
+        <dgm:alg type="composite"/>
+        <dgm:shape xmlns:r="http://schemas.openxmlformats.org/officeDocument/2006/relationships" r:blip="">
+          <dgm:adjLst/>
+        </dgm:shape>
+        <dgm:presOf/>
+        <dgm:choose name="Name1">
+          <dgm:if name="Name2" func="var" arg="dir" op="equ" val="norm">
+            <dgm:constrLst>
+              <dgm:constr type="t" for="ch" forName="parentText"/>
+              <dgm:constr type="l" for="ch" forName="parentText"/>
+              <dgm:constr type="w" for="ch" forName="parentText" refType="w" fact="0.4"/>
+              <dgm:constr type="h" for="ch" forName="parentText" refType="h"/>
+              <dgm:constr type="w" for="ch" forName="parentText" refType="w" op="lte" fact="0.5"/>
+              <dgm:constr type="w" for="ch" forName="parentText" refType="h" refFor="ch" refForName="parentText" op="lte" fact="0.7"/>
+              <dgm:constr type="h" for="ch" forName="parentText" refType="w" refFor="ch" refForName="parentText" op="lte" fact="3"/>
+              <dgm:constr type="l" for="ch" forName="descendantText" refType="w" refFor="ch" refForName="parentText"/>
+              <dgm:constr type="w" for="ch" forName="descendantText" refType="w"/>
+              <dgm:constr type="wOff" for="ch" forName="descendantText" refType="w" refFor="ch" refForName="parentText" fact="-1"/>
+              <dgm:constr type="t" for="ch" forName="descendantText"/>
+              <dgm:constr type="b" for="ch" forName="descendantText" refType="h" refFor="ch" refForName="parentText"/>
+              <dgm:constr type="bOff" for="ch" forName="descendantText" refType="w" refFor="ch" refForName="parentText" fact="-0.5"/>
+            </dgm:constrLst>
+          </dgm:if>
+          <dgm:else name="Name3">
+            <dgm:constrLst>
+              <dgm:constr type="t" for="ch" forName="parentText"/>
+              <dgm:constr type="r" for="ch" forName="parentText" refType="w"/>
+              <dgm:constr type="w" for="ch" forName="parentText" refType="w" fact="0.4"/>
+              <dgm:constr type="h" for="ch" forName="parentText" refType="h"/>
+              <dgm:constr type="w" for="ch" forName="parentText" refType="w" op="lte" fact="0.5"/>
+              <dgm:constr type="w" for="ch" forName="parentText" refType="h" refFor="ch" refForName="parentText" op="lte" fact="0.7"/>
+              <dgm:constr type="h" for="ch" forName="parentText" refType="w" refFor="ch" refForName="parentText" op="lte" fact="3"/>
+              <dgm:constr type="l" for="ch" forName="descendantText"/>
+              <dgm:constr type="w" for="ch" forName="descendantText" refType="w"/>
+              <dgm:constr type="wOff" for="ch" forName="descendantText" refType="w" refFor="ch" refForName="parentText" fact="-1"/>
+              <dgm:constr type="t" for="ch" forName="descendantText"/>
+              <dgm:constr type="b" for="ch" forName="descendantText" refType="h" refFor="ch" refForName="parentText"/>
+              <dgm:constr type="bOff" for="ch" forName="descendantText" refType="w" refFor="ch" refForName="parentText" fact="-0.5"/>
+            </dgm:constrLst>
+          </dgm:else>
+        </dgm:choose>
+        <dgm:ruleLst/>
+        <dgm:layoutNode name="parentText" styleLbl="alignNode1">
+          <dgm:varLst>
+            <dgm:chMax val="1"/>
+            <dgm:bulletEnabled val="1"/>
+          </dgm:varLst>
+          <dgm:alg type="tx"/>
+          <dgm:shape xmlns:r="http://schemas.openxmlformats.org/officeDocument/2006/relationships" rot="90" type="chevron" r:blip="">
+            <dgm:adjLst/>
+          </dgm:shape>
+          <dgm:presOf axis="self" ptType="node"/>
+          <dgm:constrLst>
+            <dgm:constr type="lMarg" refType="primFontSz" fact="0.05"/>
+            <dgm:constr type="rMarg" refType="primFontSz" fact="0.05"/>
+            <dgm:constr type="tMarg" refType="primFontSz" fact="0.05"/>
+            <dgm:constr type="bMarg" refType="primFontSz" fact="0.05"/>
+          </dgm:constrLst>
+          <dgm:ruleLst>
+            <dgm:rule type="h" val="100" fact="NaN" max="NaN"/>
+            <dgm:rule type="primFontSz" val="24" fact="NaN" max="NaN"/>
+            <dgm:rule type="h" val="110" fact="NaN" max="NaN"/>
+            <dgm:rule type="primFontSz" val="18" fact="NaN" max="NaN"/>
+            <dgm:rule type="h" val="INF" fact="NaN" max="NaN"/>
+            <dgm:rule type="primFontSz" val="5" fact="NaN" max="NaN"/>
+          </dgm:ruleLst>
+        </dgm:layoutNode>
+        <dgm:layoutNode name="descendantText" styleLbl="alignAcc1">
+          <dgm:varLst>
+            <dgm:bulletEnabled val="1"/>
+          </dgm:varLst>
+          <dgm:choose name="Name4">
+            <dgm:if name="Name5" func="var" arg="dir" op="equ" val="norm">
+              <dgm:alg type="tx">
+                <dgm:param type="stBulletLvl" val="1"/>
+                <dgm:param type="txAnchorVertCh" val="mid"/>
+              </dgm:alg>
+              <dgm:shape xmlns:r="http://schemas.openxmlformats.org/officeDocument/2006/relationships" rot="90" type="round2SameRect" r:blip="">
+                <dgm:adjLst/>
+              </dgm:shape>
+            </dgm:if>
+            <dgm:else name="Name6">
+              <dgm:alg type="tx">
+                <dgm:param type="stBulletLvl" val="1"/>
+                <dgm:param type="txAnchorVertCh" val="mid"/>
+              </dgm:alg>
+              <dgm:shape xmlns:r="http://schemas.openxmlformats.org/officeDocument/2006/relationships" rot="-90" type="round2SameRect" r:blip="">
+                <dgm:adjLst/>
+              </dgm:shape>
+            </dgm:else>
+          </dgm:choose>
+          <dgm:presOf axis="des" ptType="node"/>
+          <dgm:choose name="Name7">
+            <dgm:if name="Name8" func="var" arg="dir" op="equ" val="norm">
+              <dgm:constrLst>
+                <dgm:constr type="secFontSz" refType="primFontSz"/>
+                <dgm:constr type="tMarg" refType="primFontSz" fact="0.05"/>
+                <dgm:constr type="bMarg" refType="primFontSz" fact="0.05"/>
+                <dgm:constr type="rMarg" refType="primFontSz" fact="0.05"/>
+              </dgm:constrLst>
+            </dgm:if>
+            <dgm:else name="Name9">
+              <dgm:constrLst>
+                <dgm:constr type="secFontSz" refType="primFontSz"/>
+                <dgm:constr type="tMarg" refType="primFontSz" fact="0.05"/>
+                <dgm:constr type="bMarg" refType="primFontSz" fact="0.05"/>
+                <dgm:constr type="lMarg" refType="primFontSz" fact="0.05"/>
+              </dgm:constrLst>
+            </dgm:else>
+          </dgm:choose>
+          <dgm:ruleLst>
+            <dgm:rule type="primFontSz" val="5" fact="NaN" max="NaN"/>
+          </dgm:ruleLst>
+        </dgm:layoutNode>
+      </dgm:layoutNode>
+      <dgm:forEach name="Name10" axis="followSib" ptType="sibTrans" cnt="1">
+        <dgm:layoutNode name="sp">
+          <dgm:alg type="sp"/>
+          <dgm:shape xmlns:r="http://schemas.openxmlformats.org/officeDocument/2006/relationships" r:blip="">
+            <dgm:adjLst/>
+          </dgm:shape>
+          <dgm:presOf axis="self"/>
+          <dgm:constrLst>
+            <dgm:constr type="w" val="1"/>
+            <dgm:constr type="h" val="37.5"/>
+          </dgm:constrLst>
+          <dgm:ruleLst/>
+        </dgm:layoutNode>
+      </dgm:forEach>
+    </dgm:forEach>
+  </dgm:layoutNode>
+</dgm:layoutDef>
+</file>
+
 <file path=ppt/diagrams/quickStyle1.xml><?xml version="1.0" encoding="utf-8"?>
 <dgm:styleDef xmlns:dgm="http://schemas.openxmlformats.org/drawingml/2006/diagram" xmlns:a="http://schemas.openxmlformats.org/drawingml/2006/main" uniqueId="urn:microsoft.com/office/officeart/2005/8/quickstyle/simple1">
   <dgm:title val=""/>
@@ -4979,6 +5516,1040 @@
 </file>
 
 <file path=ppt/diagrams/quickStyle2.xml><?xml version="1.0" encoding="utf-8"?>
+<dgm:styleDef xmlns:dgm="http://schemas.openxmlformats.org/drawingml/2006/diagram" xmlns:a="http://schemas.openxmlformats.org/drawingml/2006/main" uniqueId="urn:microsoft.com/office/officeart/2005/8/quickstyle/simple1">
+  <dgm:title val=""/>
+  <dgm:desc val=""/>
+  <dgm:catLst>
+    <dgm:cat type="simple" pri="10100"/>
+  </dgm:catLst>
+  <dgm:scene3d>
+    <a:camera prst="orthographicFront"/>
+    <a:lightRig rig="threePt" dir="t"/>
+  </dgm:scene3d>
+  <dgm:styleLbl name="node0">
+    <dgm:scene3d>
+      <a:camera prst="orthographicFront"/>
+      <a:lightRig rig="threePt" dir="t"/>
+    </dgm:scene3d>
+    <dgm:sp3d/>
+    <dgm:txPr/>
+    <dgm:style>
+      <a:lnRef idx="2">
+        <a:scrgbClr r="0" g="0" b="0"/>
+      </a:lnRef>
+      <a:fillRef idx="1">
+        <a:scrgbClr r="0" g="0" b="0"/>
+      </a:fillRef>
+      <a:effectRef idx="0">
+        <a:scrgbClr r="0" g="0" b="0"/>
+      </a:effectRef>
+      <a:fontRef idx="minor">
+        <a:schemeClr val="lt1"/>
+      </a:fontRef>
+    </dgm:style>
+  </dgm:styleLbl>
+  <dgm:styleLbl name="lnNode1">
+    <dgm:scene3d>
+      <a:camera prst="orthographicFront"/>
+      <a:lightRig rig="threePt" dir="t"/>
+    </dgm:scene3d>
+    <dgm:sp3d/>
+    <dgm:txPr/>
+    <dgm:style>
+      <a:lnRef idx="2">
+        <a:scrgbClr r="0" g="0" b="0"/>
+      </a:lnRef>
+      <a:fillRef idx="1">
+        <a:scrgbClr r="0" g="0" b="0"/>
+      </a:fillRef>
+      <a:effectRef idx="0">
+        <a:scrgbClr r="0" g="0" b="0"/>
+      </a:effectRef>
+      <a:fontRef idx="minor">
+        <a:schemeClr val="lt1"/>
+      </a:fontRef>
+    </dgm:style>
+  </dgm:styleLbl>
+  <dgm:styleLbl name="vennNode1">
+    <dgm:scene3d>
+      <a:camera prst="orthographicFront"/>
+      <a:lightRig rig="threePt" dir="t"/>
+    </dgm:scene3d>
+    <dgm:sp3d/>
+    <dgm:txPr/>
+    <dgm:style>
+      <a:lnRef idx="2">
+        <a:scrgbClr r="0" g="0" b="0"/>
+      </a:lnRef>
+      <a:fillRef idx="1">
+        <a:scrgbClr r="0" g="0" b="0"/>
+      </a:fillRef>
+      <a:effectRef idx="0">
+        <a:scrgbClr r="0" g="0" b="0"/>
+      </a:effectRef>
+      <a:fontRef idx="minor">
+        <a:schemeClr val="tx1"/>
+      </a:fontRef>
+    </dgm:style>
+  </dgm:styleLbl>
+  <dgm:styleLbl name="alignNode1">
+    <dgm:scene3d>
+      <a:camera prst="orthographicFront"/>
+      <a:lightRig rig="threePt" dir="t"/>
+    </dgm:scene3d>
+    <dgm:sp3d/>
+    <dgm:txPr/>
+    <dgm:style>
+      <a:lnRef idx="2">
+        <a:scrgbClr r="0" g="0" b="0"/>
+      </a:lnRef>
+      <a:fillRef idx="1">
+        <a:scrgbClr r="0" g="0" b="0"/>
+      </a:fillRef>
+      <a:effectRef idx="0">
+        <a:scrgbClr r="0" g="0" b="0"/>
+      </a:effectRef>
+      <a:fontRef idx="minor">
+        <a:schemeClr val="lt1"/>
+      </a:fontRef>
+    </dgm:style>
+  </dgm:styleLbl>
+  <dgm:styleLbl name="node1">
+    <dgm:scene3d>
+      <a:camera prst="orthographicFront"/>
+      <a:lightRig rig="threePt" dir="t"/>
+    </dgm:scene3d>
+    <dgm:sp3d/>
+    <dgm:txPr/>
+    <dgm:style>
+      <a:lnRef idx="2">
+        <a:scrgbClr r="0" g="0" b="0"/>
+      </a:lnRef>
+      <a:fillRef idx="1">
+        <a:scrgbClr r="0" g="0" b="0"/>
+      </a:fillRef>
+      <a:effectRef idx="0">
+        <a:scrgbClr r="0" g="0" b="0"/>
+      </a:effectRef>
+      <a:fontRef idx="minor">
+        <a:schemeClr val="lt1"/>
+      </a:fontRef>
+    </dgm:style>
+  </dgm:styleLbl>
+  <dgm:styleLbl name="node2">
+    <dgm:scene3d>
+      <a:camera prst="orthographicFront"/>
+      <a:lightRig rig="threePt" dir="t"/>
+    </dgm:scene3d>
+    <dgm:sp3d/>
+    <dgm:txPr/>
+    <dgm:style>
+      <a:lnRef idx="2">
+        <a:scrgbClr r="0" g="0" b="0"/>
+      </a:lnRef>
+      <a:fillRef idx="1">
+        <a:scrgbClr r="0" g="0" b="0"/>
+      </a:fillRef>
+      <a:effectRef idx="0">
+        <a:scrgbClr r="0" g="0" b="0"/>
+      </a:effectRef>
+      <a:fontRef idx="minor">
+        <a:schemeClr val="lt1"/>
+      </a:fontRef>
+    </dgm:style>
+  </dgm:styleLbl>
+  <dgm:styleLbl name="node3">
+    <dgm:scene3d>
+      <a:camera prst="orthographicFront"/>
+      <a:lightRig rig="threePt" dir="t"/>
+    </dgm:scene3d>
+    <dgm:sp3d/>
+    <dgm:txPr/>
+    <dgm:style>
+      <a:lnRef idx="2">
+        <a:scrgbClr r="0" g="0" b="0"/>
+      </a:lnRef>
+      <a:fillRef idx="1">
+        <a:scrgbClr r="0" g="0" b="0"/>
+      </a:fillRef>
+      <a:effectRef idx="0">
+        <a:scrgbClr r="0" g="0" b="0"/>
+      </a:effectRef>
+      <a:fontRef idx="minor">
+        <a:schemeClr val="lt1"/>
+      </a:fontRef>
+    </dgm:style>
+  </dgm:styleLbl>
+  <dgm:styleLbl name="node4">
+    <dgm:scene3d>
+      <a:camera prst="orthographicFront"/>
+      <a:lightRig rig="threePt" dir="t"/>
+    </dgm:scene3d>
+    <dgm:sp3d/>
+    <dgm:txPr/>
+    <dgm:style>
+      <a:lnRef idx="2">
+        <a:scrgbClr r="0" g="0" b="0"/>
+      </a:lnRef>
+      <a:fillRef idx="1">
+        <a:scrgbClr r="0" g="0" b="0"/>
+      </a:fillRef>
+      <a:effectRef idx="0">
+        <a:scrgbClr r="0" g="0" b="0"/>
+      </a:effectRef>
+      <a:fontRef idx="minor">
+        <a:schemeClr val="lt1"/>
+      </a:fontRef>
+    </dgm:style>
+  </dgm:styleLbl>
+  <dgm:styleLbl name="fgImgPlace1">
+    <dgm:scene3d>
+      <a:camera prst="orthographicFront"/>
+      <a:lightRig rig="threePt" dir="t"/>
+    </dgm:scene3d>
+    <dgm:sp3d/>
+    <dgm:txPr/>
+    <dgm:style>
+      <a:lnRef idx="2">
+        <a:scrgbClr r="0" g="0" b="0"/>
+      </a:lnRef>
+      <a:fillRef idx="1">
+        <a:scrgbClr r="0" g="0" b="0"/>
+      </a:fillRef>
+      <a:effectRef idx="0">
+        <a:scrgbClr r="0" g="0" b="0"/>
+      </a:effectRef>
+      <a:fontRef idx="minor"/>
+    </dgm:style>
+  </dgm:styleLbl>
+  <dgm:styleLbl name="alignImgPlace1">
+    <dgm:scene3d>
+      <a:camera prst="orthographicFront"/>
+      <a:lightRig rig="threePt" dir="t"/>
+    </dgm:scene3d>
+    <dgm:sp3d/>
+    <dgm:txPr/>
+    <dgm:style>
+      <a:lnRef idx="2">
+        <a:scrgbClr r="0" g="0" b="0"/>
+      </a:lnRef>
+      <a:fillRef idx="1">
+        <a:scrgbClr r="0" g="0" b="0"/>
+      </a:fillRef>
+      <a:effectRef idx="0">
+        <a:scrgbClr r="0" g="0" b="0"/>
+      </a:effectRef>
+      <a:fontRef idx="minor"/>
+    </dgm:style>
+  </dgm:styleLbl>
+  <dgm:styleLbl name="bgImgPlace1">
+    <dgm:scene3d>
+      <a:camera prst="orthographicFront"/>
+      <a:lightRig rig="threePt" dir="t"/>
+    </dgm:scene3d>
+    <dgm:sp3d/>
+    <dgm:txPr/>
+    <dgm:style>
+      <a:lnRef idx="2">
+        <a:scrgbClr r="0" g="0" b="0"/>
+      </a:lnRef>
+      <a:fillRef idx="1">
+        <a:scrgbClr r="0" g="0" b="0"/>
+      </a:fillRef>
+      <a:effectRef idx="0">
+        <a:scrgbClr r="0" g="0" b="0"/>
+      </a:effectRef>
+      <a:fontRef idx="minor"/>
+    </dgm:style>
+  </dgm:styleLbl>
+  <dgm:styleLbl name="sibTrans2D1">
+    <dgm:scene3d>
+      <a:camera prst="orthographicFront"/>
+      <a:lightRig rig="threePt" dir="t"/>
+    </dgm:scene3d>
+    <dgm:sp3d/>
+    <dgm:txPr/>
+    <dgm:style>
+      <a:lnRef idx="0">
+        <a:scrgbClr r="0" g="0" b="0"/>
+      </a:lnRef>
+      <a:fillRef idx="1">
+        <a:scrgbClr r="0" g="0" b="0"/>
+      </a:fillRef>
+      <a:effectRef idx="0">
+        <a:scrgbClr r="0" g="0" b="0"/>
+      </a:effectRef>
+      <a:fontRef idx="minor">
+        <a:schemeClr val="lt1"/>
+      </a:fontRef>
+    </dgm:style>
+  </dgm:styleLbl>
+  <dgm:styleLbl name="fgSibTrans2D1">
+    <dgm:scene3d>
+      <a:camera prst="orthographicFront"/>
+      <a:lightRig rig="threePt" dir="t"/>
+    </dgm:scene3d>
+    <dgm:sp3d/>
+    <dgm:txPr/>
+    <dgm:style>
+      <a:lnRef idx="0">
+        <a:scrgbClr r="0" g="0" b="0"/>
+      </a:lnRef>
+      <a:fillRef idx="1">
+        <a:scrgbClr r="0" g="0" b="0"/>
+      </a:fillRef>
+      <a:effectRef idx="0">
+        <a:scrgbClr r="0" g="0" b="0"/>
+      </a:effectRef>
+      <a:fontRef idx="minor">
+        <a:schemeClr val="lt1"/>
+      </a:fontRef>
+    </dgm:style>
+  </dgm:styleLbl>
+  <dgm:styleLbl name="bgSibTrans2D1">
+    <dgm:scene3d>
+      <a:camera prst="orthographicFront"/>
+      <a:lightRig rig="threePt" dir="t"/>
+    </dgm:scene3d>
+    <dgm:sp3d/>
+    <dgm:txPr/>
+    <dgm:style>
+      <a:lnRef idx="0">
+        <a:scrgbClr r="0" g="0" b="0"/>
+      </a:lnRef>
+      <a:fillRef idx="1">
+        <a:scrgbClr r="0" g="0" b="0"/>
+      </a:fillRef>
+      <a:effectRef idx="0">
+        <a:scrgbClr r="0" g="0" b="0"/>
+      </a:effectRef>
+      <a:fontRef idx="minor">
+        <a:schemeClr val="lt1"/>
+      </a:fontRef>
+    </dgm:style>
+  </dgm:styleLbl>
+  <dgm:styleLbl name="sibTrans1D1">
+    <dgm:scene3d>
+      <a:camera prst="orthographicFront"/>
+      <a:lightRig rig="threePt" dir="t"/>
+    </dgm:scene3d>
+    <dgm:sp3d/>
+    <dgm:txPr/>
+    <dgm:style>
+      <a:lnRef idx="1">
+        <a:scrgbClr r="0" g="0" b="0"/>
+      </a:lnRef>
+      <a:fillRef idx="0">
+        <a:scrgbClr r="0" g="0" b="0"/>
+      </a:fillRef>
+      <a:effectRef idx="0">
+        <a:scrgbClr r="0" g="0" b="0"/>
+      </a:effectRef>
+      <a:fontRef idx="minor"/>
+    </dgm:style>
+  </dgm:styleLbl>
+  <dgm:styleLbl name="callout">
+    <dgm:scene3d>
+      <a:camera prst="orthographicFront"/>
+      <a:lightRig rig="threePt" dir="t"/>
+    </dgm:scene3d>
+    <dgm:sp3d/>
+    <dgm:txPr/>
+    <dgm:style>
+      <a:lnRef idx="2">
+        <a:scrgbClr r="0" g="0" b="0"/>
+      </a:lnRef>
+      <a:fillRef idx="1">
+        <a:scrgbClr r="0" g="0" b="0"/>
+      </a:fillRef>
+      <a:effectRef idx="0">
+        <a:scrgbClr r="0" g="0" b="0"/>
+      </a:effectRef>
+      <a:fontRef idx="minor"/>
+    </dgm:style>
+  </dgm:styleLbl>
+  <dgm:styleLbl name="asst0">
+    <dgm:scene3d>
+      <a:camera prst="orthographicFront"/>
+      <a:lightRig rig="threePt" dir="t"/>
+    </dgm:scene3d>
+    <dgm:sp3d/>
+    <dgm:txPr/>
+    <dgm:style>
+      <a:lnRef idx="2">
+        <a:scrgbClr r="0" g="0" b="0"/>
+      </a:lnRef>
+      <a:fillRef idx="1">
+        <a:scrgbClr r="0" g="0" b="0"/>
+      </a:fillRef>
+      <a:effectRef idx="0">
+        <a:scrgbClr r="0" g="0" b="0"/>
+      </a:effectRef>
+      <a:fontRef idx="minor">
+        <a:schemeClr val="lt1"/>
+      </a:fontRef>
+    </dgm:style>
+  </dgm:styleLbl>
+  <dgm:styleLbl name="asst1">
+    <dgm:scene3d>
+      <a:camera prst="orthographicFront"/>
+      <a:lightRig rig="threePt" dir="t"/>
+    </dgm:scene3d>
+    <dgm:sp3d/>
+    <dgm:txPr/>
+    <dgm:style>
+      <a:lnRef idx="2">
+        <a:scrgbClr r="0" g="0" b="0"/>
+      </a:lnRef>
+      <a:fillRef idx="1">
+        <a:scrgbClr r="0" g="0" b="0"/>
+      </a:fillRef>
+      <a:effectRef idx="0">
+        <a:scrgbClr r="0" g="0" b="0"/>
+      </a:effectRef>
+      <a:fontRef idx="minor">
+        <a:schemeClr val="lt1"/>
+      </a:fontRef>
+    </dgm:style>
+  </dgm:styleLbl>
+  <dgm:styleLbl name="asst2">
+    <dgm:scene3d>
+      <a:camera prst="orthographicFront"/>
+      <a:lightRig rig="threePt" dir="t"/>
+    </dgm:scene3d>
+    <dgm:sp3d/>
+    <dgm:txPr/>
+    <dgm:style>
+      <a:lnRef idx="2">
+        <a:scrgbClr r="0" g="0" b="0"/>
+      </a:lnRef>
+      <a:fillRef idx="1">
+        <a:scrgbClr r="0" g="0" b="0"/>
+      </a:fillRef>
+      <a:effectRef idx="0">
+        <a:scrgbClr r="0" g="0" b="0"/>
+      </a:effectRef>
+      <a:fontRef idx="minor">
+        <a:schemeClr val="lt1"/>
+      </a:fontRef>
+    </dgm:style>
+  </dgm:styleLbl>
+  <dgm:styleLbl name="asst3">
+    <dgm:scene3d>
+      <a:camera prst="orthographicFront"/>
+      <a:lightRig rig="threePt" dir="t"/>
+    </dgm:scene3d>
+    <dgm:sp3d/>
+    <dgm:txPr/>
+    <dgm:style>
+      <a:lnRef idx="2">
+        <a:scrgbClr r="0" g="0" b="0"/>
+      </a:lnRef>
+      <a:fillRef idx="1">
+        <a:scrgbClr r="0" g="0" b="0"/>
+      </a:fillRef>
+      <a:effectRef idx="0">
+        <a:scrgbClr r="0" g="0" b="0"/>
+      </a:effectRef>
+      <a:fontRef idx="minor">
+        <a:schemeClr val="lt1"/>
+      </a:fontRef>
+    </dgm:style>
+  </dgm:styleLbl>
+  <dgm:styleLbl name="asst4">
+    <dgm:scene3d>
+      <a:camera prst="orthographicFront"/>
+      <a:lightRig rig="threePt" dir="t"/>
+    </dgm:scene3d>
+    <dgm:sp3d/>
+    <dgm:txPr/>
+    <dgm:style>
+      <a:lnRef idx="2">
+        <a:scrgbClr r="0" g="0" b="0"/>
+      </a:lnRef>
+      <a:fillRef idx="1">
+        <a:scrgbClr r="0" g="0" b="0"/>
+      </a:fillRef>
+      <a:effectRef idx="0">
+        <a:scrgbClr r="0" g="0" b="0"/>
+      </a:effectRef>
+      <a:fontRef idx="minor">
+        <a:schemeClr val="lt1"/>
+      </a:fontRef>
+    </dgm:style>
+  </dgm:styleLbl>
+  <dgm:styleLbl name="parChTrans2D1">
+    <dgm:scene3d>
+      <a:camera prst="orthographicFront"/>
+      <a:lightRig rig="threePt" dir="t"/>
+    </dgm:scene3d>
+    <dgm:sp3d/>
+    <dgm:txPr/>
+    <dgm:style>
+      <a:lnRef idx="2">
+        <a:scrgbClr r="0" g="0" b="0"/>
+      </a:lnRef>
+      <a:fillRef idx="1">
+        <a:scrgbClr r="0" g="0" b="0"/>
+      </a:fillRef>
+      <a:effectRef idx="0">
+        <a:scrgbClr r="0" g="0" b="0"/>
+      </a:effectRef>
+      <a:fontRef idx="minor">
+        <a:schemeClr val="lt1"/>
+      </a:fontRef>
+    </dgm:style>
+  </dgm:styleLbl>
+  <dgm:styleLbl name="parChTrans2D2">
+    <dgm:scene3d>
+      <a:camera prst="orthographicFront"/>
+      <a:lightRig rig="threePt" dir="t"/>
+    </dgm:scene3d>
+    <dgm:sp3d/>
+    <dgm:txPr/>
+    <dgm:style>
+      <a:lnRef idx="2">
+        <a:scrgbClr r="0" g="0" b="0"/>
+      </a:lnRef>
+      <a:fillRef idx="1">
+        <a:scrgbClr r="0" g="0" b="0"/>
+      </a:fillRef>
+      <a:effectRef idx="0">
+        <a:scrgbClr r="0" g="0" b="0"/>
+      </a:effectRef>
+      <a:fontRef idx="minor">
+        <a:schemeClr val="lt1"/>
+      </a:fontRef>
+    </dgm:style>
+  </dgm:styleLbl>
+  <dgm:styleLbl name="parChTrans2D3">
+    <dgm:scene3d>
+      <a:camera prst="orthographicFront"/>
+      <a:lightRig rig="threePt" dir="t"/>
+    </dgm:scene3d>
+    <dgm:sp3d/>
+    <dgm:txPr/>
+    <dgm:style>
+      <a:lnRef idx="2">
+        <a:scrgbClr r="0" g="0" b="0"/>
+      </a:lnRef>
+      <a:fillRef idx="1">
+        <a:scrgbClr r="0" g="0" b="0"/>
+      </a:fillRef>
+      <a:effectRef idx="0">
+        <a:scrgbClr r="0" g="0" b="0"/>
+      </a:effectRef>
+      <a:fontRef idx="minor">
+        <a:schemeClr val="lt1"/>
+      </a:fontRef>
+    </dgm:style>
+  </dgm:styleLbl>
+  <dgm:styleLbl name="parChTrans2D4">
+    <dgm:scene3d>
+      <a:camera prst="orthographicFront"/>
+      <a:lightRig rig="threePt" dir="t"/>
+    </dgm:scene3d>
+    <dgm:sp3d/>
+    <dgm:txPr/>
+    <dgm:style>
+      <a:lnRef idx="2">
+        <a:scrgbClr r="0" g="0" b="0"/>
+      </a:lnRef>
+      <a:fillRef idx="1">
+        <a:scrgbClr r="0" g="0" b="0"/>
+      </a:fillRef>
+      <a:effectRef idx="0">
+        <a:scrgbClr r="0" g="0" b="0"/>
+      </a:effectRef>
+      <a:fontRef idx="minor">
+        <a:schemeClr val="lt1"/>
+      </a:fontRef>
+    </dgm:style>
+  </dgm:styleLbl>
+  <dgm:styleLbl name="parChTrans1D1">
+    <dgm:scene3d>
+      <a:camera prst="orthographicFront"/>
+      <a:lightRig rig="threePt" dir="t"/>
+    </dgm:scene3d>
+    <dgm:sp3d/>
+    <dgm:txPr/>
+    <dgm:style>
+      <a:lnRef idx="2">
+        <a:scrgbClr r="0" g="0" b="0"/>
+      </a:lnRef>
+      <a:fillRef idx="0">
+        <a:scrgbClr r="0" g="0" b="0"/>
+      </a:fillRef>
+      <a:effectRef idx="0">
+        <a:scrgbClr r="0" g="0" b="0"/>
+      </a:effectRef>
+      <a:fontRef idx="minor"/>
+    </dgm:style>
+  </dgm:styleLbl>
+  <dgm:styleLbl name="parChTrans1D2">
+    <dgm:scene3d>
+      <a:camera prst="orthographicFront"/>
+      <a:lightRig rig="threePt" dir="t"/>
+    </dgm:scene3d>
+    <dgm:sp3d/>
+    <dgm:txPr/>
+    <dgm:style>
+      <a:lnRef idx="2">
+        <a:scrgbClr r="0" g="0" b="0"/>
+      </a:lnRef>
+      <a:fillRef idx="0">
+        <a:scrgbClr r="0" g="0" b="0"/>
+      </a:fillRef>
+      <a:effectRef idx="0">
+        <a:scrgbClr r="0" g="0" b="0"/>
+      </a:effectRef>
+      <a:fontRef idx="minor"/>
+    </dgm:style>
+  </dgm:styleLbl>
+  <dgm:styleLbl name="parChTrans1D3">
+    <dgm:scene3d>
+      <a:camera prst="orthographicFront"/>
+      <a:lightRig rig="threePt" dir="t"/>
+    </dgm:scene3d>
+    <dgm:sp3d/>
+    <dgm:txPr/>
+    <dgm:style>
+      <a:lnRef idx="2">
+        <a:scrgbClr r="0" g="0" b="0"/>
+      </a:lnRef>
+      <a:fillRef idx="0">
+        <a:scrgbClr r="0" g="0" b="0"/>
+      </a:fillRef>
+      <a:effectRef idx="0">
+        <a:scrgbClr r="0" g="0" b="0"/>
+      </a:effectRef>
+      <a:fontRef idx="minor"/>
+    </dgm:style>
+  </dgm:styleLbl>
+  <dgm:styleLbl name="parChTrans1D4">
+    <dgm:scene3d>
+      <a:camera prst="orthographicFront"/>
+      <a:lightRig rig="threePt" dir="t"/>
+    </dgm:scene3d>
+    <dgm:sp3d/>
+    <dgm:txPr/>
+    <dgm:style>
+      <a:lnRef idx="2">
+        <a:scrgbClr r="0" g="0" b="0"/>
+      </a:lnRef>
+      <a:fillRef idx="0">
+        <a:scrgbClr r="0" g="0" b="0"/>
+      </a:fillRef>
+      <a:effectRef idx="0">
+        <a:scrgbClr r="0" g="0" b="0"/>
+      </a:effectRef>
+      <a:fontRef idx="minor"/>
+    </dgm:style>
+  </dgm:styleLbl>
+  <dgm:styleLbl name="fgAcc1">
+    <dgm:scene3d>
+      <a:camera prst="orthographicFront"/>
+      <a:lightRig rig="threePt" dir="t"/>
+    </dgm:scene3d>
+    <dgm:sp3d/>
+    <dgm:txPr/>
+    <dgm:style>
+      <a:lnRef idx="2">
+        <a:scrgbClr r="0" g="0" b="0"/>
+      </a:lnRef>
+      <a:fillRef idx="1">
+        <a:scrgbClr r="0" g="0" b="0"/>
+      </a:fillRef>
+      <a:effectRef idx="0">
+        <a:scrgbClr r="0" g="0" b="0"/>
+      </a:effectRef>
+      <a:fontRef idx="minor"/>
+    </dgm:style>
+  </dgm:styleLbl>
+  <dgm:styleLbl name="conFgAcc1">
+    <dgm:scene3d>
+      <a:camera prst="orthographicFront"/>
+      <a:lightRig rig="threePt" dir="t"/>
+    </dgm:scene3d>
+    <dgm:sp3d/>
+    <dgm:txPr/>
+    <dgm:style>
+      <a:lnRef idx="2">
+        <a:scrgbClr r="0" g="0" b="0"/>
+      </a:lnRef>
+      <a:fillRef idx="1">
+        <a:scrgbClr r="0" g="0" b="0"/>
+      </a:fillRef>
+      <a:effectRef idx="0">
+        <a:scrgbClr r="0" g="0" b="0"/>
+      </a:effectRef>
+      <a:fontRef idx="minor"/>
+    </dgm:style>
+  </dgm:styleLbl>
+  <dgm:styleLbl name="alignAcc1">
+    <dgm:scene3d>
+      <a:camera prst="orthographicFront"/>
+      <a:lightRig rig="threePt" dir="t"/>
+    </dgm:scene3d>
+    <dgm:sp3d/>
+    <dgm:txPr/>
+    <dgm:style>
+      <a:lnRef idx="2">
+        <a:scrgbClr r="0" g="0" b="0"/>
+      </a:lnRef>
+      <a:fillRef idx="1">
+        <a:scrgbClr r="0" g="0" b="0"/>
+      </a:fillRef>
+      <a:effectRef idx="0">
+        <a:scrgbClr r="0" g="0" b="0"/>
+      </a:effectRef>
+      <a:fontRef idx="minor"/>
+    </dgm:style>
+  </dgm:styleLbl>
+  <dgm:styleLbl name="trAlignAcc1">
+    <dgm:scene3d>
+      <a:camera prst="orthographicFront"/>
+      <a:lightRig rig="threePt" dir="t"/>
+    </dgm:scene3d>
+    <dgm:sp3d/>
+    <dgm:txPr/>
+    <dgm:style>
+      <a:lnRef idx="1">
+        <a:scrgbClr r="0" g="0" b="0"/>
+      </a:lnRef>
+      <a:fillRef idx="1">
+        <a:scrgbClr r="0" g="0" b="0"/>
+      </a:fillRef>
+      <a:effectRef idx="0">
+        <a:scrgbClr r="0" g="0" b="0"/>
+      </a:effectRef>
+      <a:fontRef idx="minor"/>
+    </dgm:style>
+  </dgm:styleLbl>
+  <dgm:styleLbl name="bgAcc1">
+    <dgm:scene3d>
+      <a:camera prst="orthographicFront"/>
+      <a:lightRig rig="threePt" dir="t"/>
+    </dgm:scene3d>
+    <dgm:sp3d/>
+    <dgm:txPr/>
+    <dgm:style>
+      <a:lnRef idx="2">
+        <a:scrgbClr r="0" g="0" b="0"/>
+      </a:lnRef>
+      <a:fillRef idx="1">
+        <a:scrgbClr r="0" g="0" b="0"/>
+      </a:fillRef>
+      <a:effectRef idx="0">
+        <a:scrgbClr r="0" g="0" b="0"/>
+      </a:effectRef>
+      <a:fontRef idx="minor"/>
+    </dgm:style>
+  </dgm:styleLbl>
+  <dgm:styleLbl name="solidFgAcc1">
+    <dgm:scene3d>
+      <a:camera prst="orthographicFront"/>
+      <a:lightRig rig="threePt" dir="t"/>
+    </dgm:scene3d>
+    <dgm:sp3d/>
+    <dgm:txPr/>
+    <dgm:style>
+      <a:lnRef idx="2">
+        <a:scrgbClr r="0" g="0" b="0"/>
+      </a:lnRef>
+      <a:fillRef idx="1">
+        <a:scrgbClr r="0" g="0" b="0"/>
+      </a:fillRef>
+      <a:effectRef idx="0">
+        <a:scrgbClr r="0" g="0" b="0"/>
+      </a:effectRef>
+      <a:fontRef idx="minor"/>
+    </dgm:style>
+  </dgm:styleLbl>
+  <dgm:styleLbl name="solidAlignAcc1">
+    <dgm:scene3d>
+      <a:camera prst="orthographicFront"/>
+      <a:lightRig rig="threePt" dir="t"/>
+    </dgm:scene3d>
+    <dgm:sp3d/>
+    <dgm:txPr/>
+    <dgm:style>
+      <a:lnRef idx="2">
+        <a:scrgbClr r="0" g="0" b="0"/>
+      </a:lnRef>
+      <a:fillRef idx="1">
+        <a:scrgbClr r="0" g="0" b="0"/>
+      </a:fillRef>
+      <a:effectRef idx="0">
+        <a:scrgbClr r="0" g="0" b="0"/>
+      </a:effectRef>
+      <a:fontRef idx="minor"/>
+    </dgm:style>
+  </dgm:styleLbl>
+  <dgm:styleLbl name="solidBgAcc1">
+    <dgm:scene3d>
+      <a:camera prst="orthographicFront"/>
+      <a:lightRig rig="threePt" dir="t"/>
+    </dgm:scene3d>
+    <dgm:sp3d/>
+    <dgm:txPr/>
+    <dgm:style>
+      <a:lnRef idx="2">
+        <a:scrgbClr r="0" g="0" b="0"/>
+      </a:lnRef>
+      <a:fillRef idx="1">
+        <a:scrgbClr r="0" g="0" b="0"/>
+      </a:fillRef>
+      <a:effectRef idx="0">
+        <a:scrgbClr r="0" g="0" b="0"/>
+      </a:effectRef>
+      <a:fontRef idx="minor"/>
+    </dgm:style>
+  </dgm:styleLbl>
+  <dgm:styleLbl name="fgAccFollowNode1">
+    <dgm:scene3d>
+      <a:camera prst="orthographicFront"/>
+      <a:lightRig rig="threePt" dir="t"/>
+    </dgm:scene3d>
+    <dgm:sp3d/>
+    <dgm:txPr/>
+    <dgm:style>
+      <a:lnRef idx="2">
+        <a:scrgbClr r="0" g="0" b="0"/>
+      </a:lnRef>
+      <a:fillRef idx="1">
+        <a:scrgbClr r="0" g="0" b="0"/>
+      </a:fillRef>
+      <a:effectRef idx="0">
+        <a:scrgbClr r="0" g="0" b="0"/>
+      </a:effectRef>
+      <a:fontRef idx="minor"/>
+    </dgm:style>
+  </dgm:styleLbl>
+  <dgm:styleLbl name="alignAccFollowNode1">
+    <dgm:scene3d>
+      <a:camera prst="orthographicFront"/>
+      <a:lightRig rig="threePt" dir="t"/>
+    </dgm:scene3d>
+    <dgm:sp3d/>
+    <dgm:txPr/>
+    <dgm:style>
+      <a:lnRef idx="2">
+        <a:scrgbClr r="0" g="0" b="0"/>
+      </a:lnRef>
+      <a:fillRef idx="1">
+        <a:scrgbClr r="0" g="0" b="0"/>
+      </a:fillRef>
+      <a:effectRef idx="0">
+        <a:scrgbClr r="0" g="0" b="0"/>
+      </a:effectRef>
+      <a:fontRef idx="minor"/>
+    </dgm:style>
+  </dgm:styleLbl>
+  <dgm:styleLbl name="bgAccFollowNode1">
+    <dgm:scene3d>
+      <a:camera prst="orthographicFront"/>
+      <a:lightRig rig="threePt" dir="t"/>
+    </dgm:scene3d>
+    <dgm:sp3d/>
+    <dgm:txPr/>
+    <dgm:style>
+      <a:lnRef idx="2">
+        <a:scrgbClr r="0" g="0" b="0"/>
+      </a:lnRef>
+      <a:fillRef idx="1">
+        <a:scrgbClr r="0" g="0" b="0"/>
+      </a:fillRef>
+      <a:effectRef idx="0">
+        <a:scrgbClr r="0" g="0" b="0"/>
+      </a:effectRef>
+      <a:fontRef idx="minor"/>
+    </dgm:style>
+  </dgm:styleLbl>
+  <dgm:styleLbl name="fgAcc0">
+    <dgm:scene3d>
+      <a:camera prst="orthographicFront"/>
+      <a:lightRig rig="threePt" dir="t"/>
+    </dgm:scene3d>
+    <dgm:sp3d/>
+    <dgm:txPr/>
+    <dgm:style>
+      <a:lnRef idx="2">
+        <a:scrgbClr r="0" g="0" b="0"/>
+      </a:lnRef>
+      <a:fillRef idx="1">
+        <a:scrgbClr r="0" g="0" b="0"/>
+      </a:fillRef>
+      <a:effectRef idx="0">
+        <a:scrgbClr r="0" g="0" b="0"/>
+      </a:effectRef>
+      <a:fontRef idx="minor"/>
+    </dgm:style>
+  </dgm:styleLbl>
+  <dgm:styleLbl name="fgAcc2">
+    <dgm:scene3d>
+      <a:camera prst="orthographicFront"/>
+      <a:lightRig rig="threePt" dir="t"/>
+    </dgm:scene3d>
+    <dgm:sp3d/>
+    <dgm:txPr/>
+    <dgm:style>
+      <a:lnRef idx="2">
+        <a:scrgbClr r="0" g="0" b="0"/>
+      </a:lnRef>
+      <a:fillRef idx="1">
+        <a:scrgbClr r="0" g="0" b="0"/>
+      </a:fillRef>
+      <a:effectRef idx="0">
+        <a:scrgbClr r="0" g="0" b="0"/>
+      </a:effectRef>
+      <a:fontRef idx="minor"/>
+    </dgm:style>
+  </dgm:styleLbl>
+  <dgm:styleLbl name="fgAcc3">
+    <dgm:scene3d>
+      <a:camera prst="orthographicFront"/>
+      <a:lightRig rig="threePt" dir="t"/>
+    </dgm:scene3d>
+    <dgm:sp3d/>
+    <dgm:txPr/>
+    <dgm:style>
+      <a:lnRef idx="2">
+        <a:scrgbClr r="0" g="0" b="0"/>
+      </a:lnRef>
+      <a:fillRef idx="1">
+        <a:scrgbClr r="0" g="0" b="0"/>
+      </a:fillRef>
+      <a:effectRef idx="0">
+        <a:scrgbClr r="0" g="0" b="0"/>
+      </a:effectRef>
+      <a:fontRef idx="minor"/>
+    </dgm:style>
+  </dgm:styleLbl>
+  <dgm:styleLbl name="fgAcc4">
+    <dgm:scene3d>
+      <a:camera prst="orthographicFront"/>
+      <a:lightRig rig="threePt" dir="t"/>
+    </dgm:scene3d>
+    <dgm:sp3d/>
+    <dgm:txPr/>
+    <dgm:style>
+      <a:lnRef idx="2">
+        <a:scrgbClr r="0" g="0" b="0"/>
+      </a:lnRef>
+      <a:fillRef idx="1">
+        <a:scrgbClr r="0" g="0" b="0"/>
+      </a:fillRef>
+      <a:effectRef idx="0">
+        <a:scrgbClr r="0" g="0" b="0"/>
+      </a:effectRef>
+      <a:fontRef idx="minor"/>
+    </dgm:style>
+  </dgm:styleLbl>
+  <dgm:styleLbl name="bgShp">
+    <dgm:scene3d>
+      <a:camera prst="orthographicFront"/>
+      <a:lightRig rig="threePt" dir="t"/>
+    </dgm:scene3d>
+    <dgm:sp3d/>
+    <dgm:txPr/>
+    <dgm:style>
+      <a:lnRef idx="0">
+        <a:scrgbClr r="0" g="0" b="0"/>
+      </a:lnRef>
+      <a:fillRef idx="1">
+        <a:scrgbClr r="0" g="0" b="0"/>
+      </a:fillRef>
+      <a:effectRef idx="0">
+        <a:scrgbClr r="0" g="0" b="0"/>
+      </a:effectRef>
+      <a:fontRef idx="minor"/>
+    </dgm:style>
+  </dgm:styleLbl>
+  <dgm:styleLbl name="dkBgShp">
+    <dgm:scene3d>
+      <a:camera prst="orthographicFront"/>
+      <a:lightRig rig="threePt" dir="t"/>
+    </dgm:scene3d>
+    <dgm:sp3d/>
+    <dgm:txPr/>
+    <dgm:style>
+      <a:lnRef idx="0">
+        <a:scrgbClr r="0" g="0" b="0"/>
+      </a:lnRef>
+      <a:fillRef idx="1">
+        <a:scrgbClr r="0" g="0" b="0"/>
+      </a:fillRef>
+      <a:effectRef idx="0">
+        <a:scrgbClr r="0" g="0" b="0"/>
+      </a:effectRef>
+      <a:fontRef idx="minor"/>
+    </dgm:style>
+  </dgm:styleLbl>
+  <dgm:styleLbl name="trBgShp">
+    <dgm:scene3d>
+      <a:camera prst="orthographicFront"/>
+      <a:lightRig rig="threePt" dir="t"/>
+    </dgm:scene3d>
+    <dgm:sp3d/>
+    <dgm:txPr/>
+    <dgm:style>
+      <a:lnRef idx="0">
+        <a:scrgbClr r="0" g="0" b="0"/>
+      </a:lnRef>
+      <a:fillRef idx="1">
+        <a:scrgbClr r="0" g="0" b="0"/>
+      </a:fillRef>
+      <a:effectRef idx="0">
+        <a:scrgbClr r="0" g="0" b="0"/>
+      </a:effectRef>
+      <a:fontRef idx="minor"/>
+    </dgm:style>
+  </dgm:styleLbl>
+  <dgm:styleLbl name="fgShp">
+    <dgm:scene3d>
+      <a:camera prst="orthographicFront"/>
+      <a:lightRig rig="threePt" dir="t"/>
+    </dgm:scene3d>
+    <dgm:sp3d/>
+    <dgm:txPr/>
+    <dgm:style>
+      <a:lnRef idx="2">
+        <a:scrgbClr r="0" g="0" b="0"/>
+      </a:lnRef>
+      <a:fillRef idx="1">
+        <a:scrgbClr r="0" g="0" b="0"/>
+      </a:fillRef>
+      <a:effectRef idx="0">
+        <a:scrgbClr r="0" g="0" b="0"/>
+      </a:effectRef>
+      <a:fontRef idx="minor"/>
+    </dgm:style>
+  </dgm:styleLbl>
+  <dgm:styleLbl name="revTx">
+    <dgm:scene3d>
+      <a:camera prst="orthographicFront"/>
+      <a:lightRig rig="threePt" dir="t"/>
+    </dgm:scene3d>
+    <dgm:sp3d/>
+    <dgm:txPr/>
+    <dgm:style>
+      <a:lnRef idx="0">
+        <a:scrgbClr r="0" g="0" b="0"/>
+      </a:lnRef>
+      <a:fillRef idx="0">
+        <a:scrgbClr r="0" g="0" b="0"/>
+      </a:fillRef>
+      <a:effectRef idx="0">
+        <a:scrgbClr r="0" g="0" b="0"/>
+      </a:effectRef>
+      <a:fontRef idx="minor"/>
+    </dgm:style>
+  </dgm:styleLbl>
+</dgm:styleDef>
+</file>
+
+<file path=ppt/diagrams/quickStyle3.xml><?xml version="1.0" encoding="utf-8"?>
 <dgm:styleDef xmlns:dgm="http://schemas.openxmlformats.org/drawingml/2006/diagram" xmlns:a="http://schemas.openxmlformats.org/drawingml/2006/main" uniqueId="urn:microsoft.com/office/officeart/2005/8/quickstyle/simple1">
   <dgm:title val=""/>
   <dgm:desc val=""/>
@@ -6159,7 +7730,7 @@
           <a:p>
             <a:fld id="{891B34C9-FDA8-EC4A-9BCE-322649B6A89E}" type="datetimeFigureOut">
               <a:rPr lang="en-US" smtClean="0"/>
-              <a:t>11/13/19</a:t>
+              <a:t>11/14/19</a:t>
             </a:fld>
             <a:endParaRPr lang="en-US"/>
           </a:p>
@@ -6357,7 +7928,7 @@
           <a:p>
             <a:fld id="{891B34C9-FDA8-EC4A-9BCE-322649B6A89E}" type="datetimeFigureOut">
               <a:rPr lang="en-US" smtClean="0"/>
-              <a:t>11/13/19</a:t>
+              <a:t>11/14/19</a:t>
             </a:fld>
             <a:endParaRPr lang="en-US"/>
           </a:p>
@@ -6565,7 +8136,7 @@
           <a:p>
             <a:fld id="{891B34C9-FDA8-EC4A-9BCE-322649B6A89E}" type="datetimeFigureOut">
               <a:rPr lang="en-US" smtClean="0"/>
-              <a:t>11/13/19</a:t>
+              <a:t>11/14/19</a:t>
             </a:fld>
             <a:endParaRPr lang="en-US"/>
           </a:p>
@@ -6763,7 +8334,7 @@
           <a:p>
             <a:fld id="{891B34C9-FDA8-EC4A-9BCE-322649B6A89E}" type="datetimeFigureOut">
               <a:rPr lang="en-US" smtClean="0"/>
-              <a:t>11/13/19</a:t>
+              <a:t>11/14/19</a:t>
             </a:fld>
             <a:endParaRPr lang="en-US"/>
           </a:p>
@@ -7038,7 +8609,7 @@
           <a:p>
             <a:fld id="{891B34C9-FDA8-EC4A-9BCE-322649B6A89E}" type="datetimeFigureOut">
               <a:rPr lang="en-US" smtClean="0"/>
-              <a:t>11/13/19</a:t>
+              <a:t>11/14/19</a:t>
             </a:fld>
             <a:endParaRPr lang="en-US"/>
           </a:p>
@@ -7303,7 +8874,7 @@
           <a:p>
             <a:fld id="{891B34C9-FDA8-EC4A-9BCE-322649B6A89E}" type="datetimeFigureOut">
               <a:rPr lang="en-US" smtClean="0"/>
-              <a:t>11/13/19</a:t>
+              <a:t>11/14/19</a:t>
             </a:fld>
             <a:endParaRPr lang="en-US"/>
           </a:p>
@@ -7715,7 +9286,7 @@
           <a:p>
             <a:fld id="{891B34C9-FDA8-EC4A-9BCE-322649B6A89E}" type="datetimeFigureOut">
               <a:rPr lang="en-US" smtClean="0"/>
-              <a:t>11/13/19</a:t>
+              <a:t>11/14/19</a:t>
             </a:fld>
             <a:endParaRPr lang="en-US"/>
           </a:p>
@@ -7856,7 +9427,7 @@
           <a:p>
             <a:fld id="{891B34C9-FDA8-EC4A-9BCE-322649B6A89E}" type="datetimeFigureOut">
               <a:rPr lang="en-US" smtClean="0"/>
-              <a:t>11/13/19</a:t>
+              <a:t>11/14/19</a:t>
             </a:fld>
             <a:endParaRPr lang="en-US"/>
           </a:p>
@@ -7969,7 +9540,7 @@
           <a:p>
             <a:fld id="{891B34C9-FDA8-EC4A-9BCE-322649B6A89E}" type="datetimeFigureOut">
               <a:rPr lang="en-US" smtClean="0"/>
-              <a:t>11/13/19</a:t>
+              <a:t>11/14/19</a:t>
             </a:fld>
             <a:endParaRPr lang="en-US"/>
           </a:p>
@@ -8280,7 +9851,7 @@
           <a:p>
             <a:fld id="{891B34C9-FDA8-EC4A-9BCE-322649B6A89E}" type="datetimeFigureOut">
               <a:rPr lang="en-US" smtClean="0"/>
-              <a:t>11/13/19</a:t>
+              <a:t>11/14/19</a:t>
             </a:fld>
             <a:endParaRPr lang="en-US"/>
           </a:p>
@@ -8568,7 +10139,7 @@
           <a:p>
             <a:fld id="{891B34C9-FDA8-EC4A-9BCE-322649B6A89E}" type="datetimeFigureOut">
               <a:rPr lang="en-US" smtClean="0"/>
-              <a:t>11/13/19</a:t>
+              <a:t>11/14/19</a:t>
             </a:fld>
             <a:endParaRPr lang="en-US"/>
           </a:p>
@@ -8809,7 +10380,7 @@
           <a:p>
             <a:fld id="{891B34C9-FDA8-EC4A-9BCE-322649B6A89E}" type="datetimeFigureOut">
               <a:rPr lang="en-US" smtClean="0"/>
-              <a:t>11/13/19</a:t>
+              <a:t>11/14/19</a:t>
             </a:fld>
             <a:endParaRPr lang="en-US"/>
           </a:p>
@@ -9239,14 +10810,14 @@
           <p:nvPr>
             <p:extLst>
               <p:ext uri="{D42A27DB-BD31-4B8C-83A1-F6EECF244321}">
-                <p14:modId xmlns:p14="http://schemas.microsoft.com/office/powerpoint/2010/main" val="1863526314"/>
+                <p14:modId xmlns:p14="http://schemas.microsoft.com/office/powerpoint/2010/main" val="2631680159"/>
               </p:ext>
             </p:extLst>
           </p:nvPr>
         </p:nvGraphicFramePr>
         <p:xfrm>
-          <a:off x="2032000" y="719666"/>
-          <a:ext cx="3645339" cy="5418667"/>
+          <a:off x="2032000" y="3341914"/>
+          <a:ext cx="3645339" cy="2796419"/>
         </p:xfrm>
         <a:graphic>
           <a:graphicData uri="http://schemas.openxmlformats.org/drawingml/2006/diagram">
@@ -9254,66 +10825,6 @@
           </a:graphicData>
         </a:graphic>
       </p:graphicFrame>
-      <p:pic>
-        <p:nvPicPr>
-          <p:cNvPr id="6" name="Picture 5">
-            <a:extLst>
-              <a:ext uri="{FF2B5EF4-FFF2-40B4-BE49-F238E27FC236}">
-                <a16:creationId xmlns:a16="http://schemas.microsoft.com/office/drawing/2014/main" id="{E9ABDB23-99D4-B44D-AB59-1F9C470A0701}"/>
-              </a:ext>
-            </a:extLst>
-          </p:cNvPr>
-          <p:cNvPicPr>
-            <a:picLocks noChangeAspect="1"/>
-          </p:cNvPicPr>
-          <p:nvPr/>
-        </p:nvPicPr>
-        <p:blipFill>
-          <a:blip r:embed="rId7"/>
-          <a:stretch>
-            <a:fillRect/>
-          </a:stretch>
-        </p:blipFill>
-        <p:spPr>
-          <a:xfrm>
-            <a:off x="3156797" y="890321"/>
-            <a:ext cx="2377440" cy="592116"/>
-          </a:xfrm>
-          <a:prstGeom prst="rect">
-            <a:avLst/>
-          </a:prstGeom>
-        </p:spPr>
-      </p:pic>
-      <p:pic>
-        <p:nvPicPr>
-          <p:cNvPr id="8" name="Picture 7">
-            <a:extLst>
-              <a:ext uri="{FF2B5EF4-FFF2-40B4-BE49-F238E27FC236}">
-                <a16:creationId xmlns:a16="http://schemas.microsoft.com/office/drawing/2014/main" id="{1C7A1E4F-CA28-9B4D-9EB6-776CD1BBA8E1}"/>
-              </a:ext>
-            </a:extLst>
-          </p:cNvPr>
-          <p:cNvPicPr>
-            <a:picLocks noChangeAspect="1"/>
-          </p:cNvPicPr>
-          <p:nvPr/>
-        </p:nvPicPr>
-        <p:blipFill>
-          <a:blip r:embed="rId8"/>
-          <a:stretch>
-            <a:fillRect/>
-          </a:stretch>
-        </p:blipFill>
-        <p:spPr>
-          <a:xfrm>
-            <a:off x="3156796" y="2198909"/>
-            <a:ext cx="2388415" cy="695556"/>
-          </a:xfrm>
-          <a:prstGeom prst="rect">
-            <a:avLst/>
-          </a:prstGeom>
-        </p:spPr>
-      </p:pic>
       <p:pic>
         <p:nvPicPr>
           <p:cNvPr id="9" name="Picture 8">
@@ -9329,7 +10840,7 @@
           <p:nvPr/>
         </p:nvPicPr>
         <p:blipFill>
-          <a:blip r:embed="rId9"/>
+          <a:blip r:embed="rId7"/>
           <a:stretch>
             <a:fillRect/>
           </a:stretch>
@@ -9379,7 +10890,7 @@
             <p:nvPr/>
           </p:nvPicPr>
           <p:blipFill rotWithShape="1">
-            <a:blip r:embed="rId10"/>
+            <a:blip r:embed="rId8"/>
             <a:srcRect r="18686" b="56264"/>
             <a:stretch/>
           </p:blipFill>
@@ -9408,7 +10919,7 @@
             <p:nvPr/>
           </p:nvPicPr>
           <p:blipFill rotWithShape="1">
-            <a:blip r:embed="rId10"/>
+            <a:blip r:embed="rId8"/>
             <a:srcRect t="88253" r="18686"/>
             <a:stretch/>
           </p:blipFill>
@@ -9437,7 +10948,7 @@
         </p:nvSpPr>
         <p:spPr>
           <a:xfrm>
-            <a:off x="2078612" y="188630"/>
+            <a:off x="2043947" y="6191956"/>
             <a:ext cx="3613233" cy="430887"/>
           </a:xfrm>
           <a:prstGeom prst="rect">
@@ -9474,7 +10985,7 @@
         </p:nvSpPr>
         <p:spPr>
           <a:xfrm>
-            <a:off x="7318799" y="190436"/>
+            <a:off x="7478366" y="6191956"/>
             <a:ext cx="1405898" cy="430887"/>
           </a:xfrm>
           <a:prstGeom prst="rect">
@@ -9510,18 +11021,18 @@
           <p:nvPr>
             <p:extLst>
               <p:ext uri="{D42A27DB-BD31-4B8C-83A1-F6EECF244321}">
-                <p14:modId xmlns:p14="http://schemas.microsoft.com/office/powerpoint/2010/main" val="2361727629"/>
+                <p14:modId xmlns:p14="http://schemas.microsoft.com/office/powerpoint/2010/main" val="1048777748"/>
               </p:ext>
             </p:extLst>
           </p:nvPr>
         </p:nvGraphicFramePr>
         <p:xfrm>
-          <a:off x="6069375" y="719666"/>
-          <a:ext cx="3645339" cy="5418667"/>
+          <a:off x="6069375" y="3341914"/>
+          <a:ext cx="3645339" cy="2796419"/>
         </p:xfrm>
         <a:graphic>
           <a:graphicData uri="http://schemas.openxmlformats.org/drawingml/2006/diagram">
-            <dgm:relIds xmlns:dgm="http://schemas.openxmlformats.org/drawingml/2006/diagram" xmlns:r="http://schemas.openxmlformats.org/officeDocument/2006/relationships" r:dm="rId11" r:lo="rId12" r:qs="rId13" r:cs="rId14"/>
+            <dgm:relIds xmlns:dgm="http://schemas.openxmlformats.org/drawingml/2006/diagram" xmlns:r="http://schemas.openxmlformats.org/officeDocument/2006/relationships" r:dm="rId9" r:lo="rId10" r:qs="rId11" r:cs="rId12"/>
           </a:graphicData>
         </a:graphic>
       </p:graphicFrame>
@@ -9560,7 +11071,7 @@
             <p:nvPr/>
           </p:nvPicPr>
           <p:blipFill rotWithShape="1">
-            <a:blip r:embed="rId16"/>
+            <a:blip r:embed="rId14"/>
             <a:srcRect r="52013" b="82989"/>
             <a:stretch/>
           </p:blipFill>
@@ -9589,7 +11100,7 @@
             <p:nvPr/>
           </p:nvPicPr>
           <p:blipFill rotWithShape="1">
-            <a:blip r:embed="rId16"/>
+            <a:blip r:embed="rId14"/>
             <a:srcRect t="91995" r="52013"/>
             <a:stretch/>
           </p:blipFill>
@@ -9606,66 +11117,6 @@
       </p:grpSp>
       <p:pic>
         <p:nvPicPr>
-          <p:cNvPr id="33" name="Picture 32">
-            <a:extLst>
-              <a:ext uri="{FF2B5EF4-FFF2-40B4-BE49-F238E27FC236}">
-                <a16:creationId xmlns:a16="http://schemas.microsoft.com/office/drawing/2014/main" id="{61C7D9E2-92AD-BE46-AEF4-164928515DD6}"/>
-              </a:ext>
-            </a:extLst>
-          </p:cNvPr>
-          <p:cNvPicPr>
-            <a:picLocks noChangeAspect="1"/>
-          </p:cNvPicPr>
-          <p:nvPr/>
-        </p:nvPicPr>
-        <p:blipFill>
-          <a:blip r:embed="rId17"/>
-          <a:stretch>
-            <a:fillRect/>
-          </a:stretch>
-        </p:blipFill>
-        <p:spPr>
-          <a:xfrm>
-            <a:off x="7170225" y="874657"/>
-            <a:ext cx="2468880" cy="633524"/>
-          </a:xfrm>
-          <a:prstGeom prst="rect">
-            <a:avLst/>
-          </a:prstGeom>
-        </p:spPr>
-      </p:pic>
-      <p:pic>
-        <p:nvPicPr>
-          <p:cNvPr id="34" name="Picture 33">
-            <a:extLst>
-              <a:ext uri="{FF2B5EF4-FFF2-40B4-BE49-F238E27FC236}">
-                <a16:creationId xmlns:a16="http://schemas.microsoft.com/office/drawing/2014/main" id="{39AED458-B014-D746-8096-7034B592E6AF}"/>
-              </a:ext>
-            </a:extLst>
-          </p:cNvPr>
-          <p:cNvPicPr>
-            <a:picLocks noChangeAspect="1"/>
-          </p:cNvPicPr>
-          <p:nvPr/>
-        </p:nvPicPr>
-        <p:blipFill>
-          <a:blip r:embed="rId18"/>
-          <a:stretch>
-            <a:fillRect/>
-          </a:stretch>
-        </p:blipFill>
-        <p:spPr>
-          <a:xfrm>
-            <a:off x="7170225" y="2199290"/>
-            <a:ext cx="2468880" cy="687473"/>
-          </a:xfrm>
-          <a:prstGeom prst="rect">
-            <a:avLst/>
-          </a:prstGeom>
-        </p:spPr>
-      </p:pic>
-      <p:pic>
-        <p:nvPicPr>
           <p:cNvPr id="38" name="Picture 37">
             <a:extLst>
               <a:ext uri="{FF2B5EF4-FFF2-40B4-BE49-F238E27FC236}">
@@ -9679,14 +11130,14 @@
           <p:nvPr/>
         </p:nvPicPr>
         <p:blipFill>
-          <a:blip r:embed="rId19"/>
+          <a:blip r:embed="rId15"/>
           <a:stretch>
             <a:fillRect/>
           </a:stretch>
         </p:blipFill>
         <p:spPr>
           <a:xfrm>
-            <a:off x="7159714" y="3535832"/>
+            <a:off x="7192372" y="3535832"/>
             <a:ext cx="2468880" cy="593611"/>
           </a:xfrm>
           <a:prstGeom prst="rect">
@@ -9694,10 +11145,186 @@
           </a:prstGeom>
         </p:spPr>
       </p:pic>
+      <p:graphicFrame>
+        <p:nvGraphicFramePr>
+          <p:cNvPr id="20" name="Diagram 19">
+            <a:extLst>
+              <a:ext uri="{FF2B5EF4-FFF2-40B4-BE49-F238E27FC236}">
+                <a16:creationId xmlns:a16="http://schemas.microsoft.com/office/drawing/2014/main" id="{E8592C82-1E63-E642-9AE8-94F3292002AA}"/>
+              </a:ext>
+            </a:extLst>
+          </p:cNvPr>
+          <p:cNvGraphicFramePr/>
+          <p:nvPr>
+            <p:extLst>
+              <p:ext uri="{D42A27DB-BD31-4B8C-83A1-F6EECF244321}">
+                <p14:modId xmlns:p14="http://schemas.microsoft.com/office/powerpoint/2010/main" val="2184136019"/>
+              </p:ext>
+            </p:extLst>
+          </p:nvPr>
+        </p:nvGraphicFramePr>
+        <p:xfrm>
+          <a:off x="4562391" y="299234"/>
+          <a:ext cx="3645339" cy="2796419"/>
+        </p:xfrm>
+        <a:graphic>
+          <a:graphicData uri="http://schemas.openxmlformats.org/drawingml/2006/diagram">
+            <dgm:relIds xmlns:dgm="http://schemas.openxmlformats.org/drawingml/2006/diagram" xmlns:r="http://schemas.openxmlformats.org/officeDocument/2006/relationships" r:dm="rId16" r:lo="rId17" r:qs="rId18" r:cs="rId19"/>
+          </a:graphicData>
+        </a:graphic>
+      </p:graphicFrame>
+      <p:pic>
+        <p:nvPicPr>
+          <p:cNvPr id="6" name="Picture 5">
+            <a:extLst>
+              <a:ext uri="{FF2B5EF4-FFF2-40B4-BE49-F238E27FC236}">
+                <a16:creationId xmlns:a16="http://schemas.microsoft.com/office/drawing/2014/main" id="{E9ABDB23-99D4-B44D-AB59-1F9C470A0701}"/>
+              </a:ext>
+            </a:extLst>
+          </p:cNvPr>
+          <p:cNvPicPr>
+            <a:picLocks noChangeAspect="1"/>
+          </p:cNvPicPr>
+          <p:nvPr/>
+        </p:nvPicPr>
+        <p:blipFill>
+          <a:blip r:embed="rId21"/>
+          <a:stretch>
+            <a:fillRect/>
+          </a:stretch>
+        </p:blipFill>
+        <p:spPr>
+          <a:xfrm>
+            <a:off x="5746132" y="514835"/>
+            <a:ext cx="2377440" cy="592116"/>
+          </a:xfrm>
+          <a:prstGeom prst="rect">
+            <a:avLst/>
+          </a:prstGeom>
+        </p:spPr>
+      </p:pic>
+      <p:pic>
+        <p:nvPicPr>
+          <p:cNvPr id="8" name="Picture 7">
+            <a:extLst>
+              <a:ext uri="{FF2B5EF4-FFF2-40B4-BE49-F238E27FC236}">
+                <a16:creationId xmlns:a16="http://schemas.microsoft.com/office/drawing/2014/main" id="{1C7A1E4F-CA28-9B4D-9EB6-776CD1BBA8E1}"/>
+              </a:ext>
+            </a:extLst>
+          </p:cNvPr>
+          <p:cNvPicPr>
+            <a:picLocks noChangeAspect="1"/>
+          </p:cNvPicPr>
+          <p:nvPr/>
+        </p:nvPicPr>
+        <p:blipFill>
+          <a:blip r:embed="rId22"/>
+          <a:stretch>
+            <a:fillRect/>
+          </a:stretch>
+        </p:blipFill>
+        <p:spPr>
+          <a:xfrm>
+            <a:off x="5746132" y="1682604"/>
+            <a:ext cx="2388415" cy="695556"/>
+          </a:xfrm>
+          <a:prstGeom prst="rect">
+            <a:avLst/>
+          </a:prstGeom>
+        </p:spPr>
+      </p:pic>
+      <p:cxnSp>
+        <p:nvCxnSpPr>
+          <p:cNvPr id="23" name="Straight Arrow Connector 22">
+            <a:extLst>
+              <a:ext uri="{FF2B5EF4-FFF2-40B4-BE49-F238E27FC236}">
+                <a16:creationId xmlns:a16="http://schemas.microsoft.com/office/drawing/2014/main" id="{FFED8F47-72F1-7440-85C0-966A3D60D710}"/>
+              </a:ext>
+            </a:extLst>
+          </p:cNvPr>
+          <p:cNvCxnSpPr>
+            <a:cxnSpLocks/>
+          </p:cNvCxnSpPr>
+          <p:nvPr/>
+        </p:nvCxnSpPr>
+        <p:spPr>
+          <a:xfrm>
+            <a:off x="5444132" y="2830286"/>
+            <a:ext cx="1087295" cy="385017"/>
+          </a:xfrm>
+          <a:prstGeom prst="straightConnector1">
+            <a:avLst/>
+          </a:prstGeom>
+          <a:ln w="57150">
+            <a:solidFill>
+              <a:srgbClr val="0070C0"/>
+            </a:solidFill>
+            <a:tailEnd type="triangle"/>
+          </a:ln>
+        </p:spPr>
+        <p:style>
+          <a:lnRef idx="1">
+            <a:schemeClr val="accent1"/>
+          </a:lnRef>
+          <a:fillRef idx="0">
+            <a:schemeClr val="accent1"/>
+          </a:fillRef>
+          <a:effectRef idx="0">
+            <a:schemeClr val="accent1"/>
+          </a:effectRef>
+          <a:fontRef idx="minor">
+            <a:schemeClr val="tx1"/>
+          </a:fontRef>
+        </p:style>
+      </p:cxnSp>
+      <p:cxnSp>
+        <p:nvCxnSpPr>
+          <p:cNvPr id="26" name="Straight Arrow Connector 25">
+            <a:extLst>
+              <a:ext uri="{FF2B5EF4-FFF2-40B4-BE49-F238E27FC236}">
+                <a16:creationId xmlns:a16="http://schemas.microsoft.com/office/drawing/2014/main" id="{BA7C7DA0-2E0C-AC4B-8DD1-0D5F1E16F39B}"/>
+              </a:ext>
+            </a:extLst>
+          </p:cNvPr>
+          <p:cNvCxnSpPr>
+            <a:cxnSpLocks/>
+          </p:cNvCxnSpPr>
+          <p:nvPr/>
+        </p:nvCxnSpPr>
+        <p:spPr>
+          <a:xfrm flipH="1">
+            <a:off x="3664309" y="2830286"/>
+            <a:ext cx="1087295" cy="385017"/>
+          </a:xfrm>
+          <a:prstGeom prst="straightConnector1">
+            <a:avLst/>
+          </a:prstGeom>
+          <a:ln w="57150">
+            <a:solidFill>
+              <a:srgbClr val="0070C0"/>
+            </a:solidFill>
+            <a:tailEnd type="triangle"/>
+          </a:ln>
+        </p:spPr>
+        <p:style>
+          <a:lnRef idx="1">
+            <a:schemeClr val="accent1"/>
+          </a:lnRef>
+          <a:fillRef idx="0">
+            <a:schemeClr val="accent1"/>
+          </a:fillRef>
+          <a:effectRef idx="0">
+            <a:schemeClr val="accent1"/>
+          </a:effectRef>
+          <a:fontRef idx="minor">
+            <a:schemeClr val="tx1"/>
+          </a:fontRef>
+        </p:style>
+      </p:cxnSp>
     </p:spTree>
     <p:extLst>
       <p:ext uri="{BB962C8B-B14F-4D97-AF65-F5344CB8AC3E}">
-        <p14:creationId xmlns:p14="http://schemas.microsoft.com/office/powerpoint/2010/main" val="4023289634"/>
+        <p14:creationId xmlns:p14="http://schemas.microsoft.com/office/powerpoint/2010/main" val="89957010"/>
       </p:ext>
     </p:extLst>
   </p:cSld>

</xml_diff>

<commit_message>
Figure for standard vs. direct x gate
</commit_message>
<xml_diff>
--- a/Figures/Figures.pptx
+++ b/Figures/Figures.pptx
@@ -7,6 +7,7 @@
   <p:sldIdLst>
     <p:sldId id="258" r:id="rId2"/>
     <p:sldId id="257" r:id="rId3"/>
+    <p:sldId id="259" r:id="rId4"/>
   </p:sldIdLst>
   <p:sldSz cx="12192000" cy="6858000"/>
   <p:notesSz cx="6858000" cy="9144000"/>
@@ -12773,6 +12774,170 @@
 </p:sld>
 </file>
 
+<file path=ppt/slides/slide3.xml><?xml version="1.0" encoding="utf-8"?>
+<p:sld xmlns:a="http://schemas.openxmlformats.org/drawingml/2006/main" xmlns:r="http://schemas.openxmlformats.org/officeDocument/2006/relationships" xmlns:p="http://schemas.openxmlformats.org/presentationml/2006/main">
+  <p:cSld>
+    <p:spTree>
+      <p:nvGrpSpPr>
+        <p:cNvPr id="1" name=""/>
+        <p:cNvGrpSpPr/>
+        <p:nvPr/>
+      </p:nvGrpSpPr>
+      <p:grpSpPr>
+        <a:xfrm>
+          <a:off x="0" y="0"/>
+          <a:ext cx="0" cy="0"/>
+          <a:chOff x="0" y="0"/>
+          <a:chExt cx="0" cy="0"/>
+        </a:xfrm>
+      </p:grpSpPr>
+      <p:pic>
+        <p:nvPicPr>
+          <p:cNvPr id="4" name="Picture 3">
+            <a:extLst>
+              <a:ext uri="{FF2B5EF4-FFF2-40B4-BE49-F238E27FC236}">
+                <a16:creationId xmlns:a16="http://schemas.microsoft.com/office/drawing/2014/main" id="{AF7CD195-AC04-CC4F-91DD-4A19111CAC8E}"/>
+              </a:ext>
+            </a:extLst>
+          </p:cNvPr>
+          <p:cNvPicPr>
+            <a:picLocks noChangeAspect="1"/>
+          </p:cNvPicPr>
+          <p:nvPr/>
+        </p:nvPicPr>
+        <p:blipFill rotWithShape="1">
+          <a:blip r:embed="rId2"/>
+          <a:srcRect l="7887"/>
+          <a:stretch/>
+        </p:blipFill>
+        <p:spPr>
+          <a:xfrm>
+            <a:off x="568785" y="503375"/>
+            <a:ext cx="5333627" cy="3941805"/>
+          </a:xfrm>
+          <a:prstGeom prst="rect">
+            <a:avLst/>
+          </a:prstGeom>
+        </p:spPr>
+      </p:pic>
+      <p:pic>
+        <p:nvPicPr>
+          <p:cNvPr id="5" name="Picture 4">
+            <a:extLst>
+              <a:ext uri="{FF2B5EF4-FFF2-40B4-BE49-F238E27FC236}">
+                <a16:creationId xmlns:a16="http://schemas.microsoft.com/office/drawing/2014/main" id="{0873C1A7-CE95-0345-8BD4-35F642218915}"/>
+              </a:ext>
+            </a:extLst>
+          </p:cNvPr>
+          <p:cNvPicPr>
+            <a:picLocks noChangeAspect="1"/>
+          </p:cNvPicPr>
+          <p:nvPr/>
+        </p:nvPicPr>
+        <p:blipFill rotWithShape="1">
+          <a:blip r:embed="rId3"/>
+          <a:srcRect l="8114" r="43538"/>
+          <a:stretch/>
+        </p:blipFill>
+        <p:spPr>
+          <a:xfrm>
+            <a:off x="6289589" y="494272"/>
+            <a:ext cx="2804984" cy="3932702"/>
+          </a:xfrm>
+          <a:prstGeom prst="rect">
+            <a:avLst/>
+          </a:prstGeom>
+        </p:spPr>
+      </p:pic>
+      <p:sp>
+        <p:nvSpPr>
+          <p:cNvPr id="7" name="TextBox 6">
+            <a:extLst>
+              <a:ext uri="{FF2B5EF4-FFF2-40B4-BE49-F238E27FC236}">
+                <a16:creationId xmlns:a16="http://schemas.microsoft.com/office/drawing/2014/main" id="{D0EE5C6A-6ED4-8E40-868D-D70266581AAA}"/>
+              </a:ext>
+            </a:extLst>
+          </p:cNvPr>
+          <p:cNvSpPr txBox="1"/>
+          <p:nvPr/>
+        </p:nvSpPr>
+        <p:spPr>
+          <a:xfrm>
+            <a:off x="665629" y="174215"/>
+            <a:ext cx="5164066" cy="430887"/>
+          </a:xfrm>
+          <a:prstGeom prst="rect">
+            <a:avLst/>
+          </a:prstGeom>
+          <a:noFill/>
+        </p:spPr>
+        <p:txBody>
+          <a:bodyPr wrap="square" rtlCol="0">
+            <a:spAutoFit/>
+          </a:bodyPr>
+          <a:lstStyle/>
+          <a:p>
+            <a:pPr algn="ctr"/>
+            <a:r>
+              <a:rPr lang="en-US" sz="2200" dirty="0">
+                <a:latin typeface="Avenir Book" panose="02000503020000020003" pitchFamily="2" charset="0"/>
+              </a:rPr>
+              <a:t>Standard X Gate</a:t>
+            </a:r>
+          </a:p>
+        </p:txBody>
+      </p:sp>
+      <p:sp>
+        <p:nvSpPr>
+          <p:cNvPr id="8" name="TextBox 7">
+            <a:extLst>
+              <a:ext uri="{FF2B5EF4-FFF2-40B4-BE49-F238E27FC236}">
+                <a16:creationId xmlns:a16="http://schemas.microsoft.com/office/drawing/2014/main" id="{B77F0E45-7FE0-D94C-BA7D-C19AE527E9F1}"/>
+              </a:ext>
+            </a:extLst>
+          </p:cNvPr>
+          <p:cNvSpPr txBox="1"/>
+          <p:nvPr/>
+        </p:nvSpPr>
+        <p:spPr>
+          <a:xfrm>
+            <a:off x="6434418" y="174215"/>
+            <a:ext cx="2660155" cy="430887"/>
+          </a:xfrm>
+          <a:prstGeom prst="rect">
+            <a:avLst/>
+          </a:prstGeom>
+          <a:noFill/>
+        </p:spPr>
+        <p:txBody>
+          <a:bodyPr wrap="square" rtlCol="0">
+            <a:spAutoFit/>
+          </a:bodyPr>
+          <a:lstStyle/>
+          <a:p>
+            <a:pPr algn="ctr"/>
+            <a:r>
+              <a:rPr lang="en-US" sz="2200" dirty="0">
+                <a:latin typeface="Avenir Book" panose="02000503020000020003" pitchFamily="2" charset="0"/>
+              </a:rPr>
+              <a:t>Direct X Gate</a:t>
+            </a:r>
+          </a:p>
+        </p:txBody>
+      </p:sp>
+    </p:spTree>
+    <p:extLst>
+      <p:ext uri="{BB962C8B-B14F-4D97-AF65-F5344CB8AC3E}">
+        <p14:creationId xmlns:p14="http://schemas.microsoft.com/office/powerpoint/2010/main" val="2232328772"/>
+      </p:ext>
+    </p:extLst>
+  </p:cSld>
+  <p:clrMapOvr>
+    <a:masterClrMapping/>
+  </p:clrMapOvr>
+</p:sld>
+</file>
+
 <file path=ppt/theme/theme1.xml><?xml version="1.0" encoding="utf-8"?>
 <a:theme xmlns:a="http://schemas.openxmlformats.org/drawingml/2006/main" name="Office Theme">
   <a:themeElements>

</xml_diff>